<commit_message>
adding figures to slide deck for AIMS
</commit_message>
<xml_diff>
--- a/figures/AIMS_paper/AIMS_paperfigures.pptx
+++ b/figures/AIMS_paper/AIMS_paperfigures.pptx
@@ -6,6 +6,14 @@
   </p:sldMasterIdLst>
   <p:sldIdLst>
     <p:sldId id="256" r:id="rId2"/>
+    <p:sldId id="263" r:id="rId3"/>
+    <p:sldId id="257" r:id="rId4"/>
+    <p:sldId id="258" r:id="rId5"/>
+    <p:sldId id="259" r:id="rId6"/>
+    <p:sldId id="264" r:id="rId7"/>
+    <p:sldId id="260" r:id="rId8"/>
+    <p:sldId id="261" r:id="rId9"/>
+    <p:sldId id="262" r:id="rId10"/>
   </p:sldIdLst>
   <p:sldSz cx="12192000" cy="6858000"/>
   <p:notesSz cx="6858000" cy="9144000"/>
@@ -104,6 +112,11 @@
       </a:defRPr>
     </a:lvl9pPr>
   </p:defaultTextStyle>
+  <p:extLst>
+    <p:ext uri="{EFAFB233-063F-42B5-8137-9DF3F51BA10A}">
+      <p15:sldGuideLst xmlns:p15="http://schemas.microsoft.com/office/powerpoint/2012/main"/>
+    </p:ext>
+  </p:extLst>
 </p:presentation>
 </file>
 
@@ -254,7 +267,7 @@
           <a:p>
             <a:fld id="{373D3AA0-5CD8-A64D-B5E6-377EEDA896B2}" type="datetimeFigureOut">
               <a:rPr lang="en-US" smtClean="0"/>
-              <a:t>9/27/23</a:t>
+              <a:t>10/11/23</a:t>
             </a:fld>
             <a:endParaRPr lang="en-US"/>
           </a:p>
@@ -452,7 +465,7 @@
           <a:p>
             <a:fld id="{373D3AA0-5CD8-A64D-B5E6-377EEDA896B2}" type="datetimeFigureOut">
               <a:rPr lang="en-US" smtClean="0"/>
-              <a:t>9/27/23</a:t>
+              <a:t>10/11/23</a:t>
             </a:fld>
             <a:endParaRPr lang="en-US"/>
           </a:p>
@@ -660,7 +673,7 @@
           <a:p>
             <a:fld id="{373D3AA0-5CD8-A64D-B5E6-377EEDA896B2}" type="datetimeFigureOut">
               <a:rPr lang="en-US" smtClean="0"/>
-              <a:t>9/27/23</a:t>
+              <a:t>10/11/23</a:t>
             </a:fld>
             <a:endParaRPr lang="en-US"/>
           </a:p>
@@ -858,7 +871,7 @@
           <a:p>
             <a:fld id="{373D3AA0-5CD8-A64D-B5E6-377EEDA896B2}" type="datetimeFigureOut">
               <a:rPr lang="en-US" smtClean="0"/>
-              <a:t>9/27/23</a:t>
+              <a:t>10/11/23</a:t>
             </a:fld>
             <a:endParaRPr lang="en-US"/>
           </a:p>
@@ -1133,7 +1146,7 @@
           <a:p>
             <a:fld id="{373D3AA0-5CD8-A64D-B5E6-377EEDA896B2}" type="datetimeFigureOut">
               <a:rPr lang="en-US" smtClean="0"/>
-              <a:t>9/27/23</a:t>
+              <a:t>10/11/23</a:t>
             </a:fld>
             <a:endParaRPr lang="en-US"/>
           </a:p>
@@ -1398,7 +1411,7 @@
           <a:p>
             <a:fld id="{373D3AA0-5CD8-A64D-B5E6-377EEDA896B2}" type="datetimeFigureOut">
               <a:rPr lang="en-US" smtClean="0"/>
-              <a:t>9/27/23</a:t>
+              <a:t>10/11/23</a:t>
             </a:fld>
             <a:endParaRPr lang="en-US"/>
           </a:p>
@@ -1810,7 +1823,7 @@
           <a:p>
             <a:fld id="{373D3AA0-5CD8-A64D-B5E6-377EEDA896B2}" type="datetimeFigureOut">
               <a:rPr lang="en-US" smtClean="0"/>
-              <a:t>9/27/23</a:t>
+              <a:t>10/11/23</a:t>
             </a:fld>
             <a:endParaRPr lang="en-US"/>
           </a:p>
@@ -1951,7 +1964,7 @@
           <a:p>
             <a:fld id="{373D3AA0-5CD8-A64D-B5E6-377EEDA896B2}" type="datetimeFigureOut">
               <a:rPr lang="en-US" smtClean="0"/>
-              <a:t>9/27/23</a:t>
+              <a:t>10/11/23</a:t>
             </a:fld>
             <a:endParaRPr lang="en-US"/>
           </a:p>
@@ -2064,7 +2077,7 @@
           <a:p>
             <a:fld id="{373D3AA0-5CD8-A64D-B5E6-377EEDA896B2}" type="datetimeFigureOut">
               <a:rPr lang="en-US" smtClean="0"/>
-              <a:t>9/27/23</a:t>
+              <a:t>10/11/23</a:t>
             </a:fld>
             <a:endParaRPr lang="en-US"/>
           </a:p>
@@ -2375,7 +2388,7 @@
           <a:p>
             <a:fld id="{373D3AA0-5CD8-A64D-B5E6-377EEDA896B2}" type="datetimeFigureOut">
               <a:rPr lang="en-US" smtClean="0"/>
-              <a:t>9/27/23</a:t>
+              <a:t>10/11/23</a:t>
             </a:fld>
             <a:endParaRPr lang="en-US"/>
           </a:p>
@@ -2663,7 +2676,7 @@
           <a:p>
             <a:fld id="{373D3AA0-5CD8-A64D-B5E6-377EEDA896B2}" type="datetimeFigureOut">
               <a:rPr lang="en-US" smtClean="0"/>
-              <a:t>9/27/23</a:t>
+              <a:t>10/11/23</a:t>
             </a:fld>
             <a:endParaRPr lang="en-US"/>
           </a:p>
@@ -2904,7 +2917,7 @@
           <a:p>
             <a:fld id="{373D3AA0-5CD8-A64D-B5E6-377EEDA896B2}" type="datetimeFigureOut">
               <a:rPr lang="en-US" smtClean="0"/>
-              <a:t>9/27/23</a:t>
+              <a:t>10/11/23</a:t>
             </a:fld>
             <a:endParaRPr lang="en-US"/>
           </a:p>
@@ -3362,6 +3375,783 @@
 </p:sld>
 </file>
 
+<file path=ppt/slides/slide2.xml><?xml version="1.0" encoding="utf-8"?>
+<p:sld xmlns:a="http://schemas.openxmlformats.org/drawingml/2006/main" xmlns:r="http://schemas.openxmlformats.org/officeDocument/2006/relationships" xmlns:p="http://schemas.openxmlformats.org/presentationml/2006/main">
+  <p:cSld>
+    <p:spTree>
+      <p:nvGrpSpPr>
+        <p:cNvPr id="1" name=""/>
+        <p:cNvGrpSpPr/>
+        <p:nvPr/>
+      </p:nvGrpSpPr>
+      <p:grpSpPr>
+        <a:xfrm>
+          <a:off x="0" y="0"/>
+          <a:ext cx="0" cy="0"/>
+          <a:chOff x="0" y="0"/>
+          <a:chExt cx="0" cy="0"/>
+        </a:xfrm>
+      </p:grpSpPr>
+      <p:sp>
+        <p:nvSpPr>
+          <p:cNvPr id="2" name="Title 1">
+            <a:extLst>
+              <a:ext uri="{FF2B5EF4-FFF2-40B4-BE49-F238E27FC236}">
+                <a16:creationId xmlns:a16="http://schemas.microsoft.com/office/drawing/2014/main" id="{5AA4663C-931B-F83B-124B-7C72804B3895}"/>
+              </a:ext>
+            </a:extLst>
+          </p:cNvPr>
+          <p:cNvSpPr>
+            <a:spLocks noGrp="1"/>
+          </p:cNvSpPr>
+          <p:nvPr>
+            <p:ph type="title"/>
+          </p:nvPr>
+        </p:nvSpPr>
+        <p:spPr>
+          <a:xfrm>
+            <a:off x="838200" y="2766218"/>
+            <a:ext cx="10515600" cy="1325563"/>
+          </a:xfrm>
+        </p:spPr>
+        <p:txBody>
+          <a:bodyPr/>
+          <a:lstStyle/>
+          <a:p>
+            <a:pPr algn="ctr"/>
+            <a:r>
+              <a:rPr lang="en-US" dirty="0"/>
+              <a:t>Study 1</a:t>
+            </a:r>
+          </a:p>
+        </p:txBody>
+      </p:sp>
+    </p:spTree>
+    <p:extLst>
+      <p:ext uri="{BB962C8B-B14F-4D97-AF65-F5344CB8AC3E}">
+        <p14:creationId xmlns:p14="http://schemas.microsoft.com/office/powerpoint/2010/main" val="1167645210"/>
+      </p:ext>
+    </p:extLst>
+  </p:cSld>
+  <p:clrMapOvr>
+    <a:masterClrMapping/>
+  </p:clrMapOvr>
+</p:sld>
+</file>
+
+<file path=ppt/slides/slide3.xml><?xml version="1.0" encoding="utf-8"?>
+<p:sld xmlns:a="http://schemas.openxmlformats.org/drawingml/2006/main" xmlns:r="http://schemas.openxmlformats.org/officeDocument/2006/relationships" xmlns:p="http://schemas.openxmlformats.org/presentationml/2006/main">
+  <p:cSld>
+    <p:spTree>
+      <p:nvGrpSpPr>
+        <p:cNvPr id="1" name=""/>
+        <p:cNvGrpSpPr/>
+        <p:nvPr/>
+      </p:nvGrpSpPr>
+      <p:grpSpPr>
+        <a:xfrm>
+          <a:off x="0" y="0"/>
+          <a:ext cx="0" cy="0"/>
+          <a:chOff x="0" y="0"/>
+          <a:chExt cx="0" cy="0"/>
+        </a:xfrm>
+      </p:grpSpPr>
+      <p:sp>
+        <p:nvSpPr>
+          <p:cNvPr id="2" name="Title 1">
+            <a:extLst>
+              <a:ext uri="{FF2B5EF4-FFF2-40B4-BE49-F238E27FC236}">
+                <a16:creationId xmlns:a16="http://schemas.microsoft.com/office/drawing/2014/main" id="{D87B2CE0-EDFF-4F9C-0961-9AD3EC44D7E7}"/>
+              </a:ext>
+            </a:extLst>
+          </p:cNvPr>
+          <p:cNvSpPr>
+            <a:spLocks noGrp="1"/>
+          </p:cNvSpPr>
+          <p:nvPr>
+            <p:ph type="title"/>
+          </p:nvPr>
+        </p:nvSpPr>
+        <p:spPr>
+          <a:xfrm>
+            <a:off x="440267" y="365125"/>
+            <a:ext cx="10913533" cy="1325563"/>
+          </a:xfrm>
+        </p:spPr>
+        <p:txBody>
+          <a:bodyPr>
+            <a:normAutofit fontScale="90000"/>
+          </a:bodyPr>
+          <a:lstStyle/>
+          <a:p>
+            <a:r>
+              <a:rPr lang="en-US" sz="3600" dirty="0"/>
+              <a:t>All dimensions of ELA are positively associated with reports of absorption into music</a:t>
+            </a:r>
+            <a:br>
+              <a:rPr lang="en-US" dirty="0"/>
+            </a:br>
+            <a:endParaRPr lang="en-US" dirty="0"/>
+          </a:p>
+        </p:txBody>
+      </p:sp>
+      <p:pic>
+        <p:nvPicPr>
+          <p:cNvPr id="6" name="Picture 5">
+            <a:extLst>
+              <a:ext uri="{FF2B5EF4-FFF2-40B4-BE49-F238E27FC236}">
+                <a16:creationId xmlns:a16="http://schemas.microsoft.com/office/drawing/2014/main" id="{63AFBDDA-037C-2015-C51F-DCE5655D69C0}"/>
+              </a:ext>
+            </a:extLst>
+          </p:cNvPr>
+          <p:cNvPicPr>
+            <a:picLocks noChangeAspect="1"/>
+          </p:cNvPicPr>
+          <p:nvPr/>
+        </p:nvPicPr>
+        <p:blipFill>
+          <a:blip r:embed="rId2">
+            <a:extLst>
+              <a:ext uri="{28A0092B-C50C-407E-A947-70E740481C1C}">
+                <a14:useLocalDpi xmlns:a14="http://schemas.microsoft.com/office/drawing/2010/main" val="0"/>
+              </a:ext>
+            </a:extLst>
+          </a:blip>
+          <a:stretch>
+            <a:fillRect/>
+          </a:stretch>
+        </p:blipFill>
+        <p:spPr>
+          <a:xfrm>
+            <a:off x="2876150" y="-330203"/>
+            <a:ext cx="7518406" cy="7518406"/>
+          </a:xfrm>
+          <a:prstGeom prst="rect">
+            <a:avLst/>
+          </a:prstGeom>
+        </p:spPr>
+      </p:pic>
+    </p:spTree>
+    <p:extLst>
+      <p:ext uri="{BB962C8B-B14F-4D97-AF65-F5344CB8AC3E}">
+        <p14:creationId xmlns:p14="http://schemas.microsoft.com/office/powerpoint/2010/main" val="1217206675"/>
+      </p:ext>
+    </p:extLst>
+  </p:cSld>
+  <p:clrMapOvr>
+    <a:masterClrMapping/>
+  </p:clrMapOvr>
+</p:sld>
+</file>
+
+<file path=ppt/slides/slide4.xml><?xml version="1.0" encoding="utf-8"?>
+<p:sld xmlns:a="http://schemas.openxmlformats.org/drawingml/2006/main" xmlns:r="http://schemas.openxmlformats.org/officeDocument/2006/relationships" xmlns:p="http://schemas.openxmlformats.org/presentationml/2006/main">
+  <p:cSld>
+    <p:spTree>
+      <p:nvGrpSpPr>
+        <p:cNvPr id="1" name=""/>
+        <p:cNvGrpSpPr/>
+        <p:nvPr/>
+      </p:nvGrpSpPr>
+      <p:grpSpPr>
+        <a:xfrm>
+          <a:off x="0" y="0"/>
+          <a:ext cx="0" cy="0"/>
+          <a:chOff x="0" y="0"/>
+          <a:chExt cx="0" cy="0"/>
+        </a:xfrm>
+      </p:grpSpPr>
+      <p:sp>
+        <p:nvSpPr>
+          <p:cNvPr id="2" name="Title 1">
+            <a:extLst>
+              <a:ext uri="{FF2B5EF4-FFF2-40B4-BE49-F238E27FC236}">
+                <a16:creationId xmlns:a16="http://schemas.microsoft.com/office/drawing/2014/main" id="{39DB58B9-412E-B46D-88D1-39CBCC173AAF}"/>
+              </a:ext>
+            </a:extLst>
+          </p:cNvPr>
+          <p:cNvSpPr>
+            <a:spLocks noGrp="1"/>
+          </p:cNvSpPr>
+          <p:nvPr>
+            <p:ph type="title"/>
+          </p:nvPr>
+        </p:nvSpPr>
+        <p:spPr/>
+        <p:txBody>
+          <a:bodyPr>
+            <a:normAutofit/>
+          </a:bodyPr>
+          <a:lstStyle/>
+          <a:p>
+            <a:r>
+              <a:rPr lang="en-US" sz="3200" dirty="0">
+                <a:solidFill>
+                  <a:srgbClr val="000000"/>
+                </a:solidFill>
+              </a:rPr>
+              <a:t>Absorption into music positively related to both healthy &amp; unhealthy music usage</a:t>
+            </a:r>
+            <a:endParaRPr lang="en-US" sz="3200" dirty="0"/>
+          </a:p>
+        </p:txBody>
+      </p:sp>
+      <p:pic>
+        <p:nvPicPr>
+          <p:cNvPr id="4" name="Picture 3">
+            <a:extLst>
+              <a:ext uri="{FF2B5EF4-FFF2-40B4-BE49-F238E27FC236}">
+                <a16:creationId xmlns:a16="http://schemas.microsoft.com/office/drawing/2014/main" id="{F0452ACA-7F8B-44C1-9AC7-47318C1A96D9}"/>
+              </a:ext>
+            </a:extLst>
+          </p:cNvPr>
+          <p:cNvPicPr>
+            <a:picLocks noChangeAspect="1"/>
+          </p:cNvPicPr>
+          <p:nvPr/>
+        </p:nvPicPr>
+        <p:blipFill>
+          <a:blip r:embed="rId2">
+            <a:extLst>
+              <a:ext uri="{28A0092B-C50C-407E-A947-70E740481C1C}">
+                <a14:useLocalDpi xmlns:a14="http://schemas.microsoft.com/office/drawing/2010/main" val="0"/>
+              </a:ext>
+            </a:extLst>
+          </a:blip>
+          <a:stretch>
+            <a:fillRect/>
+          </a:stretch>
+        </p:blipFill>
+        <p:spPr>
+          <a:xfrm>
+            <a:off x="1332157" y="2047303"/>
+            <a:ext cx="4117667" cy="4117667"/>
+          </a:xfrm>
+          <a:prstGeom prst="rect">
+            <a:avLst/>
+          </a:prstGeom>
+        </p:spPr>
+      </p:pic>
+      <p:pic>
+        <p:nvPicPr>
+          <p:cNvPr id="5" name="Picture 4">
+            <a:extLst>
+              <a:ext uri="{FF2B5EF4-FFF2-40B4-BE49-F238E27FC236}">
+                <a16:creationId xmlns:a16="http://schemas.microsoft.com/office/drawing/2014/main" id="{8F3567DD-E224-6756-95B1-068D35E8D83C}"/>
+              </a:ext>
+            </a:extLst>
+          </p:cNvPr>
+          <p:cNvPicPr>
+            <a:picLocks noChangeAspect="1"/>
+          </p:cNvPicPr>
+          <p:nvPr/>
+        </p:nvPicPr>
+        <p:blipFill>
+          <a:blip r:embed="rId3">
+            <a:extLst>
+              <a:ext uri="{28A0092B-C50C-407E-A947-70E740481C1C}">
+                <a14:useLocalDpi xmlns:a14="http://schemas.microsoft.com/office/drawing/2010/main" val="0"/>
+              </a:ext>
+            </a:extLst>
+          </a:blip>
+          <a:stretch>
+            <a:fillRect/>
+          </a:stretch>
+        </p:blipFill>
+        <p:spPr>
+          <a:xfrm>
+            <a:off x="6742176" y="2047304"/>
+            <a:ext cx="4117667" cy="4117667"/>
+          </a:xfrm>
+          <a:prstGeom prst="rect">
+            <a:avLst/>
+          </a:prstGeom>
+        </p:spPr>
+      </p:pic>
+    </p:spTree>
+    <p:extLst>
+      <p:ext uri="{BB962C8B-B14F-4D97-AF65-F5344CB8AC3E}">
+        <p14:creationId xmlns:p14="http://schemas.microsoft.com/office/powerpoint/2010/main" val="977975302"/>
+      </p:ext>
+    </p:extLst>
+  </p:cSld>
+  <p:clrMapOvr>
+    <a:masterClrMapping/>
+  </p:clrMapOvr>
+</p:sld>
+</file>
+
+<file path=ppt/slides/slide5.xml><?xml version="1.0" encoding="utf-8"?>
+<p:sld xmlns:a="http://schemas.openxmlformats.org/drawingml/2006/main" xmlns:r="http://schemas.openxmlformats.org/officeDocument/2006/relationships" xmlns:p="http://schemas.openxmlformats.org/presentationml/2006/main">
+  <p:cSld>
+    <p:spTree>
+      <p:nvGrpSpPr>
+        <p:cNvPr id="1" name=""/>
+        <p:cNvGrpSpPr/>
+        <p:nvPr/>
+      </p:nvGrpSpPr>
+      <p:grpSpPr>
+        <a:xfrm>
+          <a:off x="0" y="0"/>
+          <a:ext cx="0" cy="0"/>
+          <a:chOff x="0" y="0"/>
+          <a:chExt cx="0" cy="0"/>
+        </a:xfrm>
+      </p:grpSpPr>
+      <p:sp>
+        <p:nvSpPr>
+          <p:cNvPr id="2" name="Title 1">
+            <a:extLst>
+              <a:ext uri="{FF2B5EF4-FFF2-40B4-BE49-F238E27FC236}">
+                <a16:creationId xmlns:a16="http://schemas.microsoft.com/office/drawing/2014/main" id="{1C0B92B0-B777-087E-FF15-B5A5D74CDAAF}"/>
+              </a:ext>
+            </a:extLst>
+          </p:cNvPr>
+          <p:cNvSpPr>
+            <a:spLocks noGrp="1"/>
+          </p:cNvSpPr>
+          <p:nvPr>
+            <p:ph type="title"/>
+          </p:nvPr>
+        </p:nvSpPr>
+        <p:spPr>
+          <a:xfrm>
+            <a:off x="838200" y="144991"/>
+            <a:ext cx="10515600" cy="1325563"/>
+          </a:xfrm>
+        </p:spPr>
+        <p:txBody>
+          <a:bodyPr>
+            <a:normAutofit/>
+          </a:bodyPr>
+          <a:lstStyle/>
+          <a:p>
+            <a:r>
+              <a:rPr lang="en-US" sz="3200" dirty="0">
+                <a:solidFill>
+                  <a:srgbClr val="000000"/>
+                </a:solidFill>
+              </a:rPr>
+              <a:t>Absorption also positively related to resilience</a:t>
+            </a:r>
+            <a:endParaRPr lang="en-US" sz="3200" dirty="0"/>
+          </a:p>
+        </p:txBody>
+      </p:sp>
+      <p:pic>
+        <p:nvPicPr>
+          <p:cNvPr id="4" name="Picture 3">
+            <a:extLst>
+              <a:ext uri="{FF2B5EF4-FFF2-40B4-BE49-F238E27FC236}">
+                <a16:creationId xmlns:a16="http://schemas.microsoft.com/office/drawing/2014/main" id="{54849EC7-DE02-BDEC-6831-A657A05FEBC9}"/>
+              </a:ext>
+            </a:extLst>
+          </p:cNvPr>
+          <p:cNvPicPr>
+            <a:picLocks noChangeAspect="1"/>
+          </p:cNvPicPr>
+          <p:nvPr/>
+        </p:nvPicPr>
+        <p:blipFill>
+          <a:blip r:embed="rId2">
+            <a:extLst>
+              <a:ext uri="{28A0092B-C50C-407E-A947-70E740481C1C}">
+                <a14:useLocalDpi xmlns:a14="http://schemas.microsoft.com/office/drawing/2010/main" val="0"/>
+              </a:ext>
+            </a:extLst>
+          </a:blip>
+          <a:stretch>
+            <a:fillRect/>
+          </a:stretch>
+        </p:blipFill>
+        <p:spPr>
+          <a:xfrm>
+            <a:off x="3669792" y="1934159"/>
+            <a:ext cx="4340352" cy="4340352"/>
+          </a:xfrm>
+          <a:prstGeom prst="rect">
+            <a:avLst/>
+          </a:prstGeom>
+        </p:spPr>
+      </p:pic>
+    </p:spTree>
+    <p:extLst>
+      <p:ext uri="{BB962C8B-B14F-4D97-AF65-F5344CB8AC3E}">
+        <p14:creationId xmlns:p14="http://schemas.microsoft.com/office/powerpoint/2010/main" val="885908273"/>
+      </p:ext>
+    </p:extLst>
+  </p:cSld>
+  <p:clrMapOvr>
+    <a:masterClrMapping/>
+  </p:clrMapOvr>
+</p:sld>
+</file>
+
+<file path=ppt/slides/slide6.xml><?xml version="1.0" encoding="utf-8"?>
+<p:sld xmlns:a="http://schemas.openxmlformats.org/drawingml/2006/main" xmlns:r="http://schemas.openxmlformats.org/officeDocument/2006/relationships" xmlns:p="http://schemas.openxmlformats.org/presentationml/2006/main">
+  <p:cSld>
+    <p:spTree>
+      <p:nvGrpSpPr>
+        <p:cNvPr id="1" name=""/>
+        <p:cNvGrpSpPr/>
+        <p:nvPr/>
+      </p:nvGrpSpPr>
+      <p:grpSpPr>
+        <a:xfrm>
+          <a:off x="0" y="0"/>
+          <a:ext cx="0" cy="0"/>
+          <a:chOff x="0" y="0"/>
+          <a:chExt cx="0" cy="0"/>
+        </a:xfrm>
+      </p:grpSpPr>
+      <p:sp>
+        <p:nvSpPr>
+          <p:cNvPr id="2" name="Title 1">
+            <a:extLst>
+              <a:ext uri="{FF2B5EF4-FFF2-40B4-BE49-F238E27FC236}">
+                <a16:creationId xmlns:a16="http://schemas.microsoft.com/office/drawing/2014/main" id="{15E84D18-01E5-31EC-7C9A-668060D494A2}"/>
+              </a:ext>
+            </a:extLst>
+          </p:cNvPr>
+          <p:cNvSpPr>
+            <a:spLocks noGrp="1"/>
+          </p:cNvSpPr>
+          <p:nvPr>
+            <p:ph type="title"/>
+          </p:nvPr>
+        </p:nvSpPr>
+        <p:spPr>
+          <a:xfrm>
+            <a:off x="838200" y="2766218"/>
+            <a:ext cx="10515600" cy="1325563"/>
+          </a:xfrm>
+        </p:spPr>
+        <p:txBody>
+          <a:bodyPr/>
+          <a:lstStyle/>
+          <a:p>
+            <a:pPr algn="ctr"/>
+            <a:r>
+              <a:rPr lang="en-US" dirty="0"/>
+              <a:t>Study 2</a:t>
+            </a:r>
+          </a:p>
+        </p:txBody>
+      </p:sp>
+    </p:spTree>
+    <p:extLst>
+      <p:ext uri="{BB962C8B-B14F-4D97-AF65-F5344CB8AC3E}">
+        <p14:creationId xmlns:p14="http://schemas.microsoft.com/office/powerpoint/2010/main" val="3638951400"/>
+      </p:ext>
+    </p:extLst>
+  </p:cSld>
+  <p:clrMapOvr>
+    <a:masterClrMapping/>
+  </p:clrMapOvr>
+</p:sld>
+</file>
+
+<file path=ppt/slides/slide7.xml><?xml version="1.0" encoding="utf-8"?>
+<p:sld xmlns:a="http://schemas.openxmlformats.org/drawingml/2006/main" xmlns:r="http://schemas.openxmlformats.org/officeDocument/2006/relationships" xmlns:p="http://schemas.openxmlformats.org/presentationml/2006/main">
+  <p:cSld>
+    <p:spTree>
+      <p:nvGrpSpPr>
+        <p:cNvPr id="1" name=""/>
+        <p:cNvGrpSpPr/>
+        <p:nvPr/>
+      </p:nvGrpSpPr>
+      <p:grpSpPr>
+        <a:xfrm>
+          <a:off x="0" y="0"/>
+          <a:ext cx="0" cy="0"/>
+          <a:chOff x="0" y="0"/>
+          <a:chExt cx="0" cy="0"/>
+        </a:xfrm>
+      </p:grpSpPr>
+      <p:sp>
+        <p:nvSpPr>
+          <p:cNvPr id="2" name="Title 1">
+            <a:extLst>
+              <a:ext uri="{FF2B5EF4-FFF2-40B4-BE49-F238E27FC236}">
+                <a16:creationId xmlns:a16="http://schemas.microsoft.com/office/drawing/2014/main" id="{6AB496C7-BDD1-98A1-BB24-B9AC7FEBF76F}"/>
+              </a:ext>
+            </a:extLst>
+          </p:cNvPr>
+          <p:cNvSpPr>
+            <a:spLocks noGrp="1"/>
+          </p:cNvSpPr>
+          <p:nvPr>
+            <p:ph type="title"/>
+          </p:nvPr>
+        </p:nvSpPr>
+        <p:spPr/>
+        <p:txBody>
+          <a:bodyPr>
+            <a:normAutofit/>
+          </a:bodyPr>
+          <a:lstStyle/>
+          <a:p>
+            <a:r>
+              <a:rPr lang="en-US" sz="3200" dirty="0">
+                <a:solidFill>
+                  <a:srgbClr val="000000"/>
+                </a:solidFill>
+              </a:rPr>
+              <a:t>Conceptual replication of CHAOS &amp; threat associations with absorption (via AIMS)</a:t>
+            </a:r>
+            <a:endParaRPr lang="en-US" sz="3200" dirty="0"/>
+          </a:p>
+        </p:txBody>
+      </p:sp>
+      <p:pic>
+        <p:nvPicPr>
+          <p:cNvPr id="4" name="Picture 3">
+            <a:extLst>
+              <a:ext uri="{FF2B5EF4-FFF2-40B4-BE49-F238E27FC236}">
+                <a16:creationId xmlns:a16="http://schemas.microsoft.com/office/drawing/2014/main" id="{A3D53FC9-EF33-66A7-656E-7FC502F9BE81}"/>
+              </a:ext>
+            </a:extLst>
+          </p:cNvPr>
+          <p:cNvPicPr>
+            <a:picLocks noChangeAspect="1"/>
+          </p:cNvPicPr>
+          <p:nvPr/>
+        </p:nvPicPr>
+        <p:blipFill rotWithShape="1">
+          <a:blip r:embed="rId2">
+            <a:extLst>
+              <a:ext uri="{28A0092B-C50C-407E-A947-70E740481C1C}">
+                <a14:useLocalDpi xmlns:a14="http://schemas.microsoft.com/office/drawing/2010/main" val="0"/>
+              </a:ext>
+            </a:extLst>
+          </a:blip>
+          <a:srcRect t="16078" b="12960"/>
+          <a:stretch/>
+        </p:blipFill>
+        <p:spPr>
+          <a:xfrm>
+            <a:off x="3272140" y="1906241"/>
+            <a:ext cx="6201044" cy="4400367"/>
+          </a:xfrm>
+          <a:prstGeom prst="rect">
+            <a:avLst/>
+          </a:prstGeom>
+        </p:spPr>
+      </p:pic>
+    </p:spTree>
+    <p:extLst>
+      <p:ext uri="{BB962C8B-B14F-4D97-AF65-F5344CB8AC3E}">
+        <p14:creationId xmlns:p14="http://schemas.microsoft.com/office/powerpoint/2010/main" val="667018637"/>
+      </p:ext>
+    </p:extLst>
+  </p:cSld>
+  <p:clrMapOvr>
+    <a:masterClrMapping/>
+  </p:clrMapOvr>
+</p:sld>
+</file>
+
+<file path=ppt/slides/slide8.xml><?xml version="1.0" encoding="utf-8"?>
+<p:sld xmlns:a="http://schemas.openxmlformats.org/drawingml/2006/main" xmlns:r="http://schemas.openxmlformats.org/officeDocument/2006/relationships" xmlns:p="http://schemas.openxmlformats.org/presentationml/2006/main">
+  <p:cSld>
+    <p:spTree>
+      <p:nvGrpSpPr>
+        <p:cNvPr id="1" name=""/>
+        <p:cNvGrpSpPr/>
+        <p:nvPr/>
+      </p:nvGrpSpPr>
+      <p:grpSpPr>
+        <a:xfrm>
+          <a:off x="0" y="0"/>
+          <a:ext cx="0" cy="0"/>
+          <a:chOff x="0" y="0"/>
+          <a:chExt cx="0" cy="0"/>
+        </a:xfrm>
+      </p:grpSpPr>
+      <p:sp>
+        <p:nvSpPr>
+          <p:cNvPr id="2" name="Title 1">
+            <a:extLst>
+              <a:ext uri="{FF2B5EF4-FFF2-40B4-BE49-F238E27FC236}">
+                <a16:creationId xmlns:a16="http://schemas.microsoft.com/office/drawing/2014/main" id="{F17B7E66-9999-1D14-D0E7-3A0F39500B18}"/>
+              </a:ext>
+            </a:extLst>
+          </p:cNvPr>
+          <p:cNvSpPr>
+            <a:spLocks noGrp="1"/>
+          </p:cNvSpPr>
+          <p:nvPr>
+            <p:ph type="title"/>
+          </p:nvPr>
+        </p:nvSpPr>
+        <p:spPr/>
+        <p:txBody>
+          <a:bodyPr>
+            <a:normAutofit/>
+          </a:bodyPr>
+          <a:lstStyle/>
+          <a:p>
+            <a:r>
+              <a:rPr lang="en-US" sz="3200" dirty="0">
+                <a:solidFill>
+                  <a:srgbClr val="000000"/>
+                </a:solidFill>
+              </a:rPr>
+              <a:t>Absorption into music associated with using music for escapism </a:t>
+            </a:r>
+            <a:endParaRPr lang="en-US" sz="3200" dirty="0"/>
+          </a:p>
+        </p:txBody>
+      </p:sp>
+      <p:pic>
+        <p:nvPicPr>
+          <p:cNvPr id="4" name="Picture 3">
+            <a:extLst>
+              <a:ext uri="{FF2B5EF4-FFF2-40B4-BE49-F238E27FC236}">
+                <a16:creationId xmlns:a16="http://schemas.microsoft.com/office/drawing/2014/main" id="{9076CF1D-1B20-829C-75A0-0E4AE579B2CC}"/>
+              </a:ext>
+            </a:extLst>
+          </p:cNvPr>
+          <p:cNvPicPr>
+            <a:picLocks noChangeAspect="1"/>
+          </p:cNvPicPr>
+          <p:nvPr/>
+        </p:nvPicPr>
+        <p:blipFill>
+          <a:blip r:embed="rId2">
+            <a:extLst>
+              <a:ext uri="{28A0092B-C50C-407E-A947-70E740481C1C}">
+                <a14:useLocalDpi xmlns:a14="http://schemas.microsoft.com/office/drawing/2010/main" val="0"/>
+              </a:ext>
+            </a:extLst>
+          </a:blip>
+          <a:stretch>
+            <a:fillRect/>
+          </a:stretch>
+        </p:blipFill>
+        <p:spPr>
+          <a:xfrm>
+            <a:off x="3355448" y="2161691"/>
+            <a:ext cx="5481104" cy="3836773"/>
+          </a:xfrm>
+          <a:prstGeom prst="rect">
+            <a:avLst/>
+          </a:prstGeom>
+        </p:spPr>
+      </p:pic>
+    </p:spTree>
+    <p:extLst>
+      <p:ext uri="{BB962C8B-B14F-4D97-AF65-F5344CB8AC3E}">
+        <p14:creationId xmlns:p14="http://schemas.microsoft.com/office/powerpoint/2010/main" val="3956141494"/>
+      </p:ext>
+    </p:extLst>
+  </p:cSld>
+  <p:clrMapOvr>
+    <a:masterClrMapping/>
+  </p:clrMapOvr>
+</p:sld>
+</file>
+
+<file path=ppt/slides/slide9.xml><?xml version="1.0" encoding="utf-8"?>
+<p:sld xmlns:a="http://schemas.openxmlformats.org/drawingml/2006/main" xmlns:r="http://schemas.openxmlformats.org/officeDocument/2006/relationships" xmlns:p="http://schemas.openxmlformats.org/presentationml/2006/main">
+  <p:cSld>
+    <p:spTree>
+      <p:nvGrpSpPr>
+        <p:cNvPr id="1" name=""/>
+        <p:cNvGrpSpPr/>
+        <p:nvPr/>
+      </p:nvGrpSpPr>
+      <p:grpSpPr>
+        <a:xfrm>
+          <a:off x="0" y="0"/>
+          <a:ext cx="0" cy="0"/>
+          <a:chOff x="0" y="0"/>
+          <a:chExt cx="0" cy="0"/>
+        </a:xfrm>
+      </p:grpSpPr>
+      <p:sp>
+        <p:nvSpPr>
+          <p:cNvPr id="2" name="Title 1">
+            <a:extLst>
+              <a:ext uri="{FF2B5EF4-FFF2-40B4-BE49-F238E27FC236}">
+                <a16:creationId xmlns:a16="http://schemas.microsoft.com/office/drawing/2014/main" id="{A075C297-C22E-60CC-8F6A-9C0AB8157215}"/>
+              </a:ext>
+            </a:extLst>
+          </p:cNvPr>
+          <p:cNvSpPr>
+            <a:spLocks noGrp="1"/>
+          </p:cNvSpPr>
+          <p:nvPr>
+            <p:ph type="title"/>
+          </p:nvPr>
+        </p:nvSpPr>
+        <p:spPr/>
+        <p:txBody>
+          <a:bodyPr>
+            <a:normAutofit/>
+          </a:bodyPr>
+          <a:lstStyle/>
+          <a:p>
+            <a:r>
+              <a:rPr lang="en-US" sz="3200" dirty="0">
+                <a:solidFill>
+                  <a:srgbClr val="000000"/>
+                </a:solidFill>
+              </a:rPr>
+              <a:t>Absorption mediates the relationship between CHAOS and resilience</a:t>
+            </a:r>
+            <a:endParaRPr lang="en-US" sz="3200" dirty="0"/>
+          </a:p>
+        </p:txBody>
+      </p:sp>
+      <p:pic>
+        <p:nvPicPr>
+          <p:cNvPr id="4" name="Picture 3">
+            <a:extLst>
+              <a:ext uri="{FF2B5EF4-FFF2-40B4-BE49-F238E27FC236}">
+                <a16:creationId xmlns:a16="http://schemas.microsoft.com/office/drawing/2014/main" id="{7608EBE1-D671-B28C-6D61-6737521F1EBE}"/>
+              </a:ext>
+            </a:extLst>
+          </p:cNvPr>
+          <p:cNvPicPr>
+            <a:picLocks noChangeAspect="1"/>
+          </p:cNvPicPr>
+          <p:nvPr/>
+        </p:nvPicPr>
+        <p:blipFill rotWithShape="1">
+          <a:blip r:embed="rId2">
+            <a:extLst>
+              <a:ext uri="{28A0092B-C50C-407E-A947-70E740481C1C}">
+                <a14:useLocalDpi xmlns:a14="http://schemas.microsoft.com/office/drawing/2010/main" val="0"/>
+              </a:ext>
+            </a:extLst>
+          </a:blip>
+          <a:srcRect t="7955" b="58712"/>
+          <a:stretch/>
+        </p:blipFill>
+        <p:spPr>
+          <a:xfrm>
+            <a:off x="3564075" y="2273000"/>
+            <a:ext cx="5063850" cy="4219875"/>
+          </a:xfrm>
+          <a:prstGeom prst="rect">
+            <a:avLst/>
+          </a:prstGeom>
+        </p:spPr>
+      </p:pic>
+    </p:spTree>
+    <p:extLst>
+      <p:ext uri="{BB962C8B-B14F-4D97-AF65-F5344CB8AC3E}">
+        <p14:creationId xmlns:p14="http://schemas.microsoft.com/office/powerpoint/2010/main" val="1933607349"/>
+      </p:ext>
+    </p:extLst>
+  </p:cSld>
+  <p:clrMapOvr>
+    <a:masterClrMapping/>
+  </p:clrMapOvr>
+</p:sld>
+</file>
+
 <file path=ppt/theme/theme1.xml><?xml version="1.0" encoding="utf-8"?>
 <a:theme xmlns:a="http://schemas.openxmlformats.org/drawingml/2006/main" name="Office Theme">
   <a:themeElements>

</xml_diff>

<commit_message>
updates for M@H submission
</commit_message>
<xml_diff>
--- a/figures/AIMS_paper/AIMS_paperfigures.pptx
+++ b/figures/AIMS_paper/AIMS_paperfigures.pptx
@@ -4,16 +4,21 @@
   <p:sldMasterIdLst>
     <p:sldMasterId id="2147483648" r:id="rId1"/>
   </p:sldMasterIdLst>
+  <p:notesMasterIdLst>
+    <p:notesMasterId r:id="rId13"/>
+  </p:notesMasterIdLst>
   <p:sldIdLst>
     <p:sldId id="256" r:id="rId2"/>
     <p:sldId id="263" r:id="rId3"/>
-    <p:sldId id="257" r:id="rId4"/>
-    <p:sldId id="258" r:id="rId5"/>
-    <p:sldId id="259" r:id="rId6"/>
-    <p:sldId id="264" r:id="rId7"/>
-    <p:sldId id="260" r:id="rId8"/>
-    <p:sldId id="261" r:id="rId9"/>
-    <p:sldId id="262" r:id="rId10"/>
+    <p:sldId id="265" r:id="rId4"/>
+    <p:sldId id="266" r:id="rId5"/>
+    <p:sldId id="257" r:id="rId6"/>
+    <p:sldId id="258" r:id="rId7"/>
+    <p:sldId id="259" r:id="rId8"/>
+    <p:sldId id="264" r:id="rId9"/>
+    <p:sldId id="260" r:id="rId10"/>
+    <p:sldId id="261" r:id="rId11"/>
+    <p:sldId id="262" r:id="rId12"/>
   </p:sldIdLst>
   <p:sldSz cx="12192000" cy="6858000"/>
   <p:notesSz cx="6858000" cy="9144000"/>
@@ -120,6 +125,556 @@
 </p:presentation>
 </file>
 
+<file path=ppt/notesMasters/notesMaster1.xml><?xml version="1.0" encoding="utf-8"?>
+<p:notesMaster xmlns:a="http://schemas.openxmlformats.org/drawingml/2006/main" xmlns:r="http://schemas.openxmlformats.org/officeDocument/2006/relationships" xmlns:p="http://schemas.openxmlformats.org/presentationml/2006/main">
+  <p:cSld>
+    <p:bg>
+      <p:bgRef idx="1001">
+        <a:schemeClr val="bg1"/>
+      </p:bgRef>
+    </p:bg>
+    <p:spTree>
+      <p:nvGrpSpPr>
+        <p:cNvPr id="1" name=""/>
+        <p:cNvGrpSpPr/>
+        <p:nvPr/>
+      </p:nvGrpSpPr>
+      <p:grpSpPr>
+        <a:xfrm>
+          <a:off x="0" y="0"/>
+          <a:ext cx="0" cy="0"/>
+          <a:chOff x="0" y="0"/>
+          <a:chExt cx="0" cy="0"/>
+        </a:xfrm>
+      </p:grpSpPr>
+      <p:sp>
+        <p:nvSpPr>
+          <p:cNvPr id="2" name="Header Placeholder 1"/>
+          <p:cNvSpPr>
+            <a:spLocks noGrp="1"/>
+          </p:cNvSpPr>
+          <p:nvPr>
+            <p:ph type="hdr" sz="quarter"/>
+          </p:nvPr>
+        </p:nvSpPr>
+        <p:spPr>
+          <a:xfrm>
+            <a:off x="0" y="0"/>
+            <a:ext cx="2971800" cy="458788"/>
+          </a:xfrm>
+          <a:prstGeom prst="rect">
+            <a:avLst/>
+          </a:prstGeom>
+        </p:spPr>
+        <p:txBody>
+          <a:bodyPr vert="horz" lIns="91440" tIns="45720" rIns="91440" bIns="45720" rtlCol="0"/>
+          <a:lstStyle>
+            <a:lvl1pPr algn="l">
+              <a:defRPr sz="1200"/>
+            </a:lvl1pPr>
+          </a:lstStyle>
+          <a:p>
+            <a:endParaRPr lang="en-US"/>
+          </a:p>
+        </p:txBody>
+      </p:sp>
+      <p:sp>
+        <p:nvSpPr>
+          <p:cNvPr id="3" name="Date Placeholder 2"/>
+          <p:cNvSpPr>
+            <a:spLocks noGrp="1"/>
+          </p:cNvSpPr>
+          <p:nvPr>
+            <p:ph type="dt" idx="1"/>
+          </p:nvPr>
+        </p:nvSpPr>
+        <p:spPr>
+          <a:xfrm>
+            <a:off x="3884613" y="0"/>
+            <a:ext cx="2971800" cy="458788"/>
+          </a:xfrm>
+          <a:prstGeom prst="rect">
+            <a:avLst/>
+          </a:prstGeom>
+        </p:spPr>
+        <p:txBody>
+          <a:bodyPr vert="horz" lIns="91440" tIns="45720" rIns="91440" bIns="45720" rtlCol="0"/>
+          <a:lstStyle>
+            <a:lvl1pPr algn="r">
+              <a:defRPr sz="1200"/>
+            </a:lvl1pPr>
+          </a:lstStyle>
+          <a:p>
+            <a:fld id="{F860DE22-8EB4-A842-81DB-4420B7344D07}" type="datetimeFigureOut">
+              <a:rPr lang="en-US" smtClean="0"/>
+              <a:t>10/30/23</a:t>
+            </a:fld>
+            <a:endParaRPr lang="en-US"/>
+          </a:p>
+        </p:txBody>
+      </p:sp>
+      <p:sp>
+        <p:nvSpPr>
+          <p:cNvPr id="4" name="Slide Image Placeholder 3"/>
+          <p:cNvSpPr>
+            <a:spLocks noGrp="1" noRot="1" noChangeAspect="1"/>
+          </p:cNvSpPr>
+          <p:nvPr>
+            <p:ph type="sldImg" idx="2"/>
+          </p:nvPr>
+        </p:nvSpPr>
+        <p:spPr>
+          <a:xfrm>
+            <a:off x="685800" y="1143000"/>
+            <a:ext cx="5486400" cy="3086100"/>
+          </a:xfrm>
+          <a:prstGeom prst="rect">
+            <a:avLst/>
+          </a:prstGeom>
+          <a:noFill/>
+          <a:ln w="12700">
+            <a:solidFill>
+              <a:prstClr val="black"/>
+            </a:solidFill>
+          </a:ln>
+        </p:spPr>
+        <p:txBody>
+          <a:bodyPr vert="horz" lIns="91440" tIns="45720" rIns="91440" bIns="45720" rtlCol="0" anchor="ctr"/>
+          <a:lstStyle/>
+          <a:p>
+            <a:endParaRPr lang="en-US"/>
+          </a:p>
+        </p:txBody>
+      </p:sp>
+      <p:sp>
+        <p:nvSpPr>
+          <p:cNvPr id="5" name="Notes Placeholder 4"/>
+          <p:cNvSpPr>
+            <a:spLocks noGrp="1"/>
+          </p:cNvSpPr>
+          <p:nvPr>
+            <p:ph type="body" sz="quarter" idx="3"/>
+          </p:nvPr>
+        </p:nvSpPr>
+        <p:spPr>
+          <a:xfrm>
+            <a:off x="685800" y="4400550"/>
+            <a:ext cx="5486400" cy="3600450"/>
+          </a:xfrm>
+          <a:prstGeom prst="rect">
+            <a:avLst/>
+          </a:prstGeom>
+        </p:spPr>
+        <p:txBody>
+          <a:bodyPr vert="horz" lIns="91440" tIns="45720" rIns="91440" bIns="45720" rtlCol="0"/>
+          <a:lstStyle/>
+          <a:p>
+            <a:pPr lvl="0"/>
+            <a:r>
+              <a:rPr lang="en-US"/>
+              <a:t>Click to edit Master text styles</a:t>
+            </a:r>
+          </a:p>
+          <a:p>
+            <a:pPr lvl="1"/>
+            <a:r>
+              <a:rPr lang="en-US"/>
+              <a:t>Second level</a:t>
+            </a:r>
+          </a:p>
+          <a:p>
+            <a:pPr lvl="2"/>
+            <a:r>
+              <a:rPr lang="en-US"/>
+              <a:t>Third level</a:t>
+            </a:r>
+          </a:p>
+          <a:p>
+            <a:pPr lvl="3"/>
+            <a:r>
+              <a:rPr lang="en-US"/>
+              <a:t>Fourth level</a:t>
+            </a:r>
+          </a:p>
+          <a:p>
+            <a:pPr lvl="4"/>
+            <a:r>
+              <a:rPr lang="en-US"/>
+              <a:t>Fifth level</a:t>
+            </a:r>
+          </a:p>
+        </p:txBody>
+      </p:sp>
+      <p:sp>
+        <p:nvSpPr>
+          <p:cNvPr id="6" name="Footer Placeholder 5"/>
+          <p:cNvSpPr>
+            <a:spLocks noGrp="1"/>
+          </p:cNvSpPr>
+          <p:nvPr>
+            <p:ph type="ftr" sz="quarter" idx="4"/>
+          </p:nvPr>
+        </p:nvSpPr>
+        <p:spPr>
+          <a:xfrm>
+            <a:off x="0" y="8685213"/>
+            <a:ext cx="2971800" cy="458787"/>
+          </a:xfrm>
+          <a:prstGeom prst="rect">
+            <a:avLst/>
+          </a:prstGeom>
+        </p:spPr>
+        <p:txBody>
+          <a:bodyPr vert="horz" lIns="91440" tIns="45720" rIns="91440" bIns="45720" rtlCol="0" anchor="b"/>
+          <a:lstStyle>
+            <a:lvl1pPr algn="l">
+              <a:defRPr sz="1200"/>
+            </a:lvl1pPr>
+          </a:lstStyle>
+          <a:p>
+            <a:endParaRPr lang="en-US"/>
+          </a:p>
+        </p:txBody>
+      </p:sp>
+      <p:sp>
+        <p:nvSpPr>
+          <p:cNvPr id="7" name="Slide Number Placeholder 6"/>
+          <p:cNvSpPr>
+            <a:spLocks noGrp="1"/>
+          </p:cNvSpPr>
+          <p:nvPr>
+            <p:ph type="sldNum" sz="quarter" idx="5"/>
+          </p:nvPr>
+        </p:nvSpPr>
+        <p:spPr>
+          <a:xfrm>
+            <a:off x="3884613" y="8685213"/>
+            <a:ext cx="2971800" cy="458787"/>
+          </a:xfrm>
+          <a:prstGeom prst="rect">
+            <a:avLst/>
+          </a:prstGeom>
+        </p:spPr>
+        <p:txBody>
+          <a:bodyPr vert="horz" lIns="91440" tIns="45720" rIns="91440" bIns="45720" rtlCol="0" anchor="b"/>
+          <a:lstStyle>
+            <a:lvl1pPr algn="r">
+              <a:defRPr sz="1200"/>
+            </a:lvl1pPr>
+          </a:lstStyle>
+          <a:p>
+            <a:fld id="{AF63139F-56CF-E940-954B-77D17CA4B5B2}" type="slidenum">
+              <a:rPr lang="en-US" smtClean="0"/>
+              <a:t>‹#›</a:t>
+            </a:fld>
+            <a:endParaRPr lang="en-US"/>
+          </a:p>
+        </p:txBody>
+      </p:sp>
+    </p:spTree>
+    <p:extLst>
+      <p:ext uri="{BB962C8B-B14F-4D97-AF65-F5344CB8AC3E}">
+        <p14:creationId xmlns:p14="http://schemas.microsoft.com/office/powerpoint/2010/main" val="355309262"/>
+      </p:ext>
+    </p:extLst>
+  </p:cSld>
+  <p:clrMap bg1="lt1" tx1="dk1" bg2="lt2" tx2="dk2" accent1="accent1" accent2="accent2" accent3="accent3" accent4="accent4" accent5="accent5" accent6="accent6" hlink="hlink" folHlink="folHlink"/>
+  <p:notesStyle>
+    <a:lvl1pPr marL="0" algn="l" defTabSz="914400" rtl="0" eaLnBrk="1" latinLnBrk="0" hangingPunct="1">
+      <a:defRPr sz="1200" kern="1200">
+        <a:solidFill>
+          <a:schemeClr val="tx1"/>
+        </a:solidFill>
+        <a:latin typeface="+mn-lt"/>
+        <a:ea typeface="+mn-ea"/>
+        <a:cs typeface="+mn-cs"/>
+      </a:defRPr>
+    </a:lvl1pPr>
+    <a:lvl2pPr marL="457200" algn="l" defTabSz="914400" rtl="0" eaLnBrk="1" latinLnBrk="0" hangingPunct="1">
+      <a:defRPr sz="1200" kern="1200">
+        <a:solidFill>
+          <a:schemeClr val="tx1"/>
+        </a:solidFill>
+        <a:latin typeface="+mn-lt"/>
+        <a:ea typeface="+mn-ea"/>
+        <a:cs typeface="+mn-cs"/>
+      </a:defRPr>
+    </a:lvl2pPr>
+    <a:lvl3pPr marL="914400" algn="l" defTabSz="914400" rtl="0" eaLnBrk="1" latinLnBrk="0" hangingPunct="1">
+      <a:defRPr sz="1200" kern="1200">
+        <a:solidFill>
+          <a:schemeClr val="tx1"/>
+        </a:solidFill>
+        <a:latin typeface="+mn-lt"/>
+        <a:ea typeface="+mn-ea"/>
+        <a:cs typeface="+mn-cs"/>
+      </a:defRPr>
+    </a:lvl3pPr>
+    <a:lvl4pPr marL="1371600" algn="l" defTabSz="914400" rtl="0" eaLnBrk="1" latinLnBrk="0" hangingPunct="1">
+      <a:defRPr sz="1200" kern="1200">
+        <a:solidFill>
+          <a:schemeClr val="tx1"/>
+        </a:solidFill>
+        <a:latin typeface="+mn-lt"/>
+        <a:ea typeface="+mn-ea"/>
+        <a:cs typeface="+mn-cs"/>
+      </a:defRPr>
+    </a:lvl4pPr>
+    <a:lvl5pPr marL="1828800" algn="l" defTabSz="914400" rtl="0" eaLnBrk="1" latinLnBrk="0" hangingPunct="1">
+      <a:defRPr sz="1200" kern="1200">
+        <a:solidFill>
+          <a:schemeClr val="tx1"/>
+        </a:solidFill>
+        <a:latin typeface="+mn-lt"/>
+        <a:ea typeface="+mn-ea"/>
+        <a:cs typeface="+mn-cs"/>
+      </a:defRPr>
+    </a:lvl5pPr>
+    <a:lvl6pPr marL="2286000" algn="l" defTabSz="914400" rtl="0" eaLnBrk="1" latinLnBrk="0" hangingPunct="1">
+      <a:defRPr sz="1200" kern="1200">
+        <a:solidFill>
+          <a:schemeClr val="tx1"/>
+        </a:solidFill>
+        <a:latin typeface="+mn-lt"/>
+        <a:ea typeface="+mn-ea"/>
+        <a:cs typeface="+mn-cs"/>
+      </a:defRPr>
+    </a:lvl6pPr>
+    <a:lvl7pPr marL="2743200" algn="l" defTabSz="914400" rtl="0" eaLnBrk="1" latinLnBrk="0" hangingPunct="1">
+      <a:defRPr sz="1200" kern="1200">
+        <a:solidFill>
+          <a:schemeClr val="tx1"/>
+        </a:solidFill>
+        <a:latin typeface="+mn-lt"/>
+        <a:ea typeface="+mn-ea"/>
+        <a:cs typeface="+mn-cs"/>
+      </a:defRPr>
+    </a:lvl7pPr>
+    <a:lvl8pPr marL="3200400" algn="l" defTabSz="914400" rtl="0" eaLnBrk="1" latinLnBrk="0" hangingPunct="1">
+      <a:defRPr sz="1200" kern="1200">
+        <a:solidFill>
+          <a:schemeClr val="tx1"/>
+        </a:solidFill>
+        <a:latin typeface="+mn-lt"/>
+        <a:ea typeface="+mn-ea"/>
+        <a:cs typeface="+mn-cs"/>
+      </a:defRPr>
+    </a:lvl8pPr>
+    <a:lvl9pPr marL="3657600" algn="l" defTabSz="914400" rtl="0" eaLnBrk="1" latinLnBrk="0" hangingPunct="1">
+      <a:defRPr sz="1200" kern="1200">
+        <a:solidFill>
+          <a:schemeClr val="tx1"/>
+        </a:solidFill>
+        <a:latin typeface="+mn-lt"/>
+        <a:ea typeface="+mn-ea"/>
+        <a:cs typeface="+mn-cs"/>
+      </a:defRPr>
+    </a:lvl9pPr>
+  </p:notesStyle>
+</p:notesMaster>
+</file>
+
+<file path=ppt/notesSlides/notesSlide1.xml><?xml version="1.0" encoding="utf-8"?>
+<p:notes xmlns:a="http://schemas.openxmlformats.org/drawingml/2006/main" xmlns:r="http://schemas.openxmlformats.org/officeDocument/2006/relationships" xmlns:p="http://schemas.openxmlformats.org/presentationml/2006/main">
+  <p:cSld>
+    <p:spTree>
+      <p:nvGrpSpPr>
+        <p:cNvPr id="1" name=""/>
+        <p:cNvGrpSpPr/>
+        <p:nvPr/>
+      </p:nvGrpSpPr>
+      <p:grpSpPr>
+        <a:xfrm>
+          <a:off x="0" y="0"/>
+          <a:ext cx="0" cy="0"/>
+          <a:chOff x="0" y="0"/>
+          <a:chExt cx="0" cy="0"/>
+        </a:xfrm>
+      </p:grpSpPr>
+      <p:sp>
+        <p:nvSpPr>
+          <p:cNvPr id="2" name="Slide Image Placeholder 1"/>
+          <p:cNvSpPr>
+            <a:spLocks noGrp="1" noRot="1" noChangeAspect="1"/>
+          </p:cNvSpPr>
+          <p:nvPr>
+            <p:ph type="sldImg"/>
+          </p:nvPr>
+        </p:nvSpPr>
+        <p:spPr/>
+      </p:sp>
+      <p:sp>
+        <p:nvSpPr>
+          <p:cNvPr id="3" name="Notes Placeholder 2"/>
+          <p:cNvSpPr>
+            <a:spLocks noGrp="1"/>
+          </p:cNvSpPr>
+          <p:nvPr>
+            <p:ph type="body" idx="1"/>
+          </p:nvPr>
+        </p:nvSpPr>
+        <p:spPr/>
+        <p:txBody>
+          <a:bodyPr/>
+          <a:lstStyle/>
+          <a:p>
+            <a:r>
+              <a:rPr lang="en-US" dirty="0"/>
+              <a:t>Need to check for Study 2</a:t>
+            </a:r>
+          </a:p>
+        </p:txBody>
+      </p:sp>
+      <p:sp>
+        <p:nvSpPr>
+          <p:cNvPr id="4" name="Slide Number Placeholder 3"/>
+          <p:cNvSpPr>
+            <a:spLocks noGrp="1"/>
+          </p:cNvSpPr>
+          <p:nvPr>
+            <p:ph type="sldNum" sz="quarter" idx="5"/>
+          </p:nvPr>
+        </p:nvSpPr>
+        <p:spPr/>
+        <p:txBody>
+          <a:bodyPr/>
+          <a:lstStyle/>
+          <a:p>
+            <a:fld id="{AF63139F-56CF-E940-954B-77D17CA4B5B2}" type="slidenum">
+              <a:rPr lang="en-US" smtClean="0"/>
+              <a:t>6</a:t>
+            </a:fld>
+            <a:endParaRPr lang="en-US"/>
+          </a:p>
+        </p:txBody>
+      </p:sp>
+    </p:spTree>
+    <p:extLst>
+      <p:ext uri="{BB962C8B-B14F-4D97-AF65-F5344CB8AC3E}">
+        <p14:creationId xmlns:p14="http://schemas.microsoft.com/office/powerpoint/2010/main" val="3971914233"/>
+      </p:ext>
+    </p:extLst>
+  </p:cSld>
+  <p:clrMapOvr>
+    <a:masterClrMapping/>
+  </p:clrMapOvr>
+</p:notes>
+</file>
+
+<file path=ppt/notesSlides/notesSlide2.xml><?xml version="1.0" encoding="utf-8"?>
+<p:notes xmlns:a="http://schemas.openxmlformats.org/drawingml/2006/main" xmlns:r="http://schemas.openxmlformats.org/officeDocument/2006/relationships" xmlns:p="http://schemas.openxmlformats.org/presentationml/2006/main">
+  <p:cSld>
+    <p:spTree>
+      <p:nvGrpSpPr>
+        <p:cNvPr id="1" name=""/>
+        <p:cNvGrpSpPr/>
+        <p:nvPr/>
+      </p:nvGrpSpPr>
+      <p:grpSpPr>
+        <a:xfrm>
+          <a:off x="0" y="0"/>
+          <a:ext cx="0" cy="0"/>
+          <a:chOff x="0" y="0"/>
+          <a:chExt cx="0" cy="0"/>
+        </a:xfrm>
+      </p:grpSpPr>
+      <p:sp>
+        <p:nvSpPr>
+          <p:cNvPr id="2" name="Slide Image Placeholder 1"/>
+          <p:cNvSpPr>
+            <a:spLocks noGrp="1" noRot="1" noChangeAspect="1"/>
+          </p:cNvSpPr>
+          <p:nvPr>
+            <p:ph type="sldImg"/>
+          </p:nvPr>
+        </p:nvSpPr>
+        <p:spPr/>
+      </p:sp>
+      <p:sp>
+        <p:nvSpPr>
+          <p:cNvPr id="3" name="Notes Placeholder 2"/>
+          <p:cNvSpPr>
+            <a:spLocks noGrp="1"/>
+          </p:cNvSpPr>
+          <p:nvPr>
+            <p:ph type="body" idx="1"/>
+          </p:nvPr>
+        </p:nvSpPr>
+        <p:spPr/>
+        <p:txBody>
+          <a:bodyPr/>
+          <a:lstStyle/>
+          <a:p>
+            <a:r>
+              <a:rPr lang="en-US" sz="1800" b="0" i="0" u="none" strike="noStrike" dirty="0">
+                <a:solidFill>
+                  <a:srgbClr val="000000"/>
+                </a:solidFill>
+                <a:effectLst/>
+                <a:latin typeface="Times New Roman" panose="02020603050405020304" pitchFamily="18" charset="0"/>
+              </a:rPr>
+              <a:t>Secondary analyses of using subscales of escapism [pos &amp; neg]; interaction with </a:t>
+            </a:r>
+            <a:r>
+              <a:rPr lang="en-US" sz="1800" b="0" i="0" u="none" strike="noStrike" dirty="0" err="1">
+                <a:solidFill>
+                  <a:srgbClr val="000000"/>
+                </a:solidFill>
+                <a:effectLst/>
+                <a:latin typeface="Times New Roman" panose="02020603050405020304" pitchFamily="18" charset="0"/>
+              </a:rPr>
+              <a:t>pos+neg</a:t>
+            </a:r>
+            <a:r>
+              <a:rPr lang="en-US" sz="1800" b="0" i="0" u="none" strike="noStrike" dirty="0">
+                <a:solidFill>
+                  <a:srgbClr val="000000"/>
+                </a:solidFill>
+                <a:effectLst/>
+                <a:latin typeface="Times New Roman" panose="02020603050405020304" pitchFamily="18" charset="0"/>
+              </a:rPr>
+              <a:t> but with just AIMS</a:t>
+            </a:r>
+            <a:endParaRPr lang="en-US" dirty="0"/>
+          </a:p>
+        </p:txBody>
+      </p:sp>
+      <p:sp>
+        <p:nvSpPr>
+          <p:cNvPr id="4" name="Slide Number Placeholder 3"/>
+          <p:cNvSpPr>
+            <a:spLocks noGrp="1"/>
+          </p:cNvSpPr>
+          <p:nvPr>
+            <p:ph type="sldNum" sz="quarter" idx="5"/>
+          </p:nvPr>
+        </p:nvSpPr>
+        <p:spPr/>
+        <p:txBody>
+          <a:bodyPr/>
+          <a:lstStyle/>
+          <a:p>
+            <a:fld id="{AF63139F-56CF-E940-954B-77D17CA4B5B2}" type="slidenum">
+              <a:rPr lang="en-US" smtClean="0"/>
+              <a:t>10</a:t>
+            </a:fld>
+            <a:endParaRPr lang="en-US"/>
+          </a:p>
+        </p:txBody>
+      </p:sp>
+    </p:spTree>
+    <p:extLst>
+      <p:ext uri="{BB962C8B-B14F-4D97-AF65-F5344CB8AC3E}">
+        <p14:creationId xmlns:p14="http://schemas.microsoft.com/office/powerpoint/2010/main" val="901970332"/>
+      </p:ext>
+    </p:extLst>
+  </p:cSld>
+  <p:clrMapOvr>
+    <a:masterClrMapping/>
+  </p:clrMapOvr>
+</p:notes>
+</file>
+
 <file path=ppt/slideLayouts/slideLayout1.xml><?xml version="1.0" encoding="utf-8"?>
 <p:sldLayout xmlns:a="http://schemas.openxmlformats.org/drawingml/2006/main" xmlns:r="http://schemas.openxmlformats.org/officeDocument/2006/relationships" xmlns:p="http://schemas.openxmlformats.org/presentationml/2006/main" type="title" preserve="1">
   <p:cSld name="Title Slide">
@@ -267,7 +822,7 @@
           <a:p>
             <a:fld id="{373D3AA0-5CD8-A64D-B5E6-377EEDA896B2}" type="datetimeFigureOut">
               <a:rPr lang="en-US" smtClean="0"/>
-              <a:t>10/11/23</a:t>
+              <a:t>10/30/23</a:t>
             </a:fld>
             <a:endParaRPr lang="en-US"/>
           </a:p>
@@ -465,7 +1020,7 @@
           <a:p>
             <a:fld id="{373D3AA0-5CD8-A64D-B5E6-377EEDA896B2}" type="datetimeFigureOut">
               <a:rPr lang="en-US" smtClean="0"/>
-              <a:t>10/11/23</a:t>
+              <a:t>10/30/23</a:t>
             </a:fld>
             <a:endParaRPr lang="en-US"/>
           </a:p>
@@ -673,7 +1228,7 @@
           <a:p>
             <a:fld id="{373D3AA0-5CD8-A64D-B5E6-377EEDA896B2}" type="datetimeFigureOut">
               <a:rPr lang="en-US" smtClean="0"/>
-              <a:t>10/11/23</a:t>
+              <a:t>10/30/23</a:t>
             </a:fld>
             <a:endParaRPr lang="en-US"/>
           </a:p>
@@ -871,7 +1426,7 @@
           <a:p>
             <a:fld id="{373D3AA0-5CD8-A64D-B5E6-377EEDA896B2}" type="datetimeFigureOut">
               <a:rPr lang="en-US" smtClean="0"/>
-              <a:t>10/11/23</a:t>
+              <a:t>10/30/23</a:t>
             </a:fld>
             <a:endParaRPr lang="en-US"/>
           </a:p>
@@ -1146,7 +1701,7 @@
           <a:p>
             <a:fld id="{373D3AA0-5CD8-A64D-B5E6-377EEDA896B2}" type="datetimeFigureOut">
               <a:rPr lang="en-US" smtClean="0"/>
-              <a:t>10/11/23</a:t>
+              <a:t>10/30/23</a:t>
             </a:fld>
             <a:endParaRPr lang="en-US"/>
           </a:p>
@@ -1411,7 +1966,7 @@
           <a:p>
             <a:fld id="{373D3AA0-5CD8-A64D-B5E6-377EEDA896B2}" type="datetimeFigureOut">
               <a:rPr lang="en-US" smtClean="0"/>
-              <a:t>10/11/23</a:t>
+              <a:t>10/30/23</a:t>
             </a:fld>
             <a:endParaRPr lang="en-US"/>
           </a:p>
@@ -1823,7 +2378,7 @@
           <a:p>
             <a:fld id="{373D3AA0-5CD8-A64D-B5E6-377EEDA896B2}" type="datetimeFigureOut">
               <a:rPr lang="en-US" smtClean="0"/>
-              <a:t>10/11/23</a:t>
+              <a:t>10/30/23</a:t>
             </a:fld>
             <a:endParaRPr lang="en-US"/>
           </a:p>
@@ -1964,7 +2519,7 @@
           <a:p>
             <a:fld id="{373D3AA0-5CD8-A64D-B5E6-377EEDA896B2}" type="datetimeFigureOut">
               <a:rPr lang="en-US" smtClean="0"/>
-              <a:t>10/11/23</a:t>
+              <a:t>10/30/23</a:t>
             </a:fld>
             <a:endParaRPr lang="en-US"/>
           </a:p>
@@ -2077,7 +2632,7 @@
           <a:p>
             <a:fld id="{373D3AA0-5CD8-A64D-B5E6-377EEDA896B2}" type="datetimeFigureOut">
               <a:rPr lang="en-US" smtClean="0"/>
-              <a:t>10/11/23</a:t>
+              <a:t>10/30/23</a:t>
             </a:fld>
             <a:endParaRPr lang="en-US"/>
           </a:p>
@@ -2388,7 +2943,7 @@
           <a:p>
             <a:fld id="{373D3AA0-5CD8-A64D-B5E6-377EEDA896B2}" type="datetimeFigureOut">
               <a:rPr lang="en-US" smtClean="0"/>
-              <a:t>10/11/23</a:t>
+              <a:t>10/30/23</a:t>
             </a:fld>
             <a:endParaRPr lang="en-US"/>
           </a:p>
@@ -2676,7 +3231,7 @@
           <a:p>
             <a:fld id="{373D3AA0-5CD8-A64D-B5E6-377EEDA896B2}" type="datetimeFigureOut">
               <a:rPr lang="en-US" smtClean="0"/>
-              <a:t>10/11/23</a:t>
+              <a:t>10/30/23</a:t>
             </a:fld>
             <a:endParaRPr lang="en-US"/>
           </a:p>
@@ -2917,7 +3472,7 @@
           <a:p>
             <a:fld id="{373D3AA0-5CD8-A64D-B5E6-377EEDA896B2}" type="datetimeFigureOut">
               <a:rPr lang="en-US" smtClean="0"/>
-              <a:t>10/11/23</a:t>
+              <a:t>10/30/23</a:t>
             </a:fld>
             <a:endParaRPr lang="en-US"/>
           </a:p>
@@ -3375,6 +3930,207 @@
 </p:sld>
 </file>
 
+<file path=ppt/slides/slide10.xml><?xml version="1.0" encoding="utf-8"?>
+<p:sld xmlns:a="http://schemas.openxmlformats.org/drawingml/2006/main" xmlns:r="http://schemas.openxmlformats.org/officeDocument/2006/relationships" xmlns:p="http://schemas.openxmlformats.org/presentationml/2006/main">
+  <p:cSld>
+    <p:spTree>
+      <p:nvGrpSpPr>
+        <p:cNvPr id="1" name=""/>
+        <p:cNvGrpSpPr/>
+        <p:nvPr/>
+      </p:nvGrpSpPr>
+      <p:grpSpPr>
+        <a:xfrm>
+          <a:off x="0" y="0"/>
+          <a:ext cx="0" cy="0"/>
+          <a:chOff x="0" y="0"/>
+          <a:chExt cx="0" cy="0"/>
+        </a:xfrm>
+      </p:grpSpPr>
+      <p:sp>
+        <p:nvSpPr>
+          <p:cNvPr id="2" name="Title 1">
+            <a:extLst>
+              <a:ext uri="{FF2B5EF4-FFF2-40B4-BE49-F238E27FC236}">
+                <a16:creationId xmlns:a16="http://schemas.microsoft.com/office/drawing/2014/main" id="{F17B7E66-9999-1D14-D0E7-3A0F39500B18}"/>
+              </a:ext>
+            </a:extLst>
+          </p:cNvPr>
+          <p:cNvSpPr>
+            <a:spLocks noGrp="1"/>
+          </p:cNvSpPr>
+          <p:nvPr>
+            <p:ph type="title"/>
+          </p:nvPr>
+        </p:nvSpPr>
+        <p:spPr/>
+        <p:txBody>
+          <a:bodyPr>
+            <a:normAutofit/>
+          </a:bodyPr>
+          <a:lstStyle/>
+          <a:p>
+            <a:r>
+              <a:rPr lang="en-US" sz="3200" dirty="0">
+                <a:solidFill>
+                  <a:srgbClr val="000000"/>
+                </a:solidFill>
+              </a:rPr>
+              <a:t>Absorption into music associated with using music for escapism </a:t>
+            </a:r>
+            <a:endParaRPr lang="en-US" sz="3200" dirty="0"/>
+          </a:p>
+        </p:txBody>
+      </p:sp>
+      <p:pic>
+        <p:nvPicPr>
+          <p:cNvPr id="4" name="Picture 3">
+            <a:extLst>
+              <a:ext uri="{FF2B5EF4-FFF2-40B4-BE49-F238E27FC236}">
+                <a16:creationId xmlns:a16="http://schemas.microsoft.com/office/drawing/2014/main" id="{9076CF1D-1B20-829C-75A0-0E4AE579B2CC}"/>
+              </a:ext>
+            </a:extLst>
+          </p:cNvPr>
+          <p:cNvPicPr>
+            <a:picLocks noChangeAspect="1"/>
+          </p:cNvPicPr>
+          <p:nvPr/>
+        </p:nvPicPr>
+        <p:blipFill>
+          <a:blip r:embed="rId3">
+            <a:extLst>
+              <a:ext uri="{28A0092B-C50C-407E-A947-70E740481C1C}">
+                <a14:useLocalDpi xmlns:a14="http://schemas.microsoft.com/office/drawing/2010/main" val="0"/>
+              </a:ext>
+            </a:extLst>
+          </a:blip>
+          <a:stretch>
+            <a:fillRect/>
+          </a:stretch>
+        </p:blipFill>
+        <p:spPr>
+          <a:xfrm>
+            <a:off x="3355448" y="2161691"/>
+            <a:ext cx="5481104" cy="3836773"/>
+          </a:xfrm>
+          <a:prstGeom prst="rect">
+            <a:avLst/>
+          </a:prstGeom>
+        </p:spPr>
+      </p:pic>
+    </p:spTree>
+    <p:extLst>
+      <p:ext uri="{BB962C8B-B14F-4D97-AF65-F5344CB8AC3E}">
+        <p14:creationId xmlns:p14="http://schemas.microsoft.com/office/powerpoint/2010/main" val="3956141494"/>
+      </p:ext>
+    </p:extLst>
+  </p:cSld>
+  <p:clrMapOvr>
+    <a:masterClrMapping/>
+  </p:clrMapOvr>
+</p:sld>
+</file>
+
+<file path=ppt/slides/slide11.xml><?xml version="1.0" encoding="utf-8"?>
+<p:sld xmlns:a="http://schemas.openxmlformats.org/drawingml/2006/main" xmlns:r="http://schemas.openxmlformats.org/officeDocument/2006/relationships" xmlns:p="http://schemas.openxmlformats.org/presentationml/2006/main">
+  <p:cSld>
+    <p:spTree>
+      <p:nvGrpSpPr>
+        <p:cNvPr id="1" name=""/>
+        <p:cNvGrpSpPr/>
+        <p:nvPr/>
+      </p:nvGrpSpPr>
+      <p:grpSpPr>
+        <a:xfrm>
+          <a:off x="0" y="0"/>
+          <a:ext cx="0" cy="0"/>
+          <a:chOff x="0" y="0"/>
+          <a:chExt cx="0" cy="0"/>
+        </a:xfrm>
+      </p:grpSpPr>
+      <p:sp>
+        <p:nvSpPr>
+          <p:cNvPr id="2" name="Title 1">
+            <a:extLst>
+              <a:ext uri="{FF2B5EF4-FFF2-40B4-BE49-F238E27FC236}">
+                <a16:creationId xmlns:a16="http://schemas.microsoft.com/office/drawing/2014/main" id="{A075C297-C22E-60CC-8F6A-9C0AB8157215}"/>
+              </a:ext>
+            </a:extLst>
+          </p:cNvPr>
+          <p:cNvSpPr>
+            <a:spLocks noGrp="1"/>
+          </p:cNvSpPr>
+          <p:nvPr>
+            <p:ph type="title"/>
+          </p:nvPr>
+        </p:nvSpPr>
+        <p:spPr/>
+        <p:txBody>
+          <a:bodyPr>
+            <a:normAutofit/>
+          </a:bodyPr>
+          <a:lstStyle/>
+          <a:p>
+            <a:r>
+              <a:rPr lang="en-US" sz="3200" dirty="0">
+                <a:solidFill>
+                  <a:srgbClr val="000000"/>
+                </a:solidFill>
+              </a:rPr>
+              <a:t>Absorption mediates the relationship between CHAOS and resilience</a:t>
+            </a:r>
+            <a:endParaRPr lang="en-US" sz="3200" dirty="0"/>
+          </a:p>
+        </p:txBody>
+      </p:sp>
+      <p:pic>
+        <p:nvPicPr>
+          <p:cNvPr id="4" name="Picture 3">
+            <a:extLst>
+              <a:ext uri="{FF2B5EF4-FFF2-40B4-BE49-F238E27FC236}">
+                <a16:creationId xmlns:a16="http://schemas.microsoft.com/office/drawing/2014/main" id="{7608EBE1-D671-B28C-6D61-6737521F1EBE}"/>
+              </a:ext>
+            </a:extLst>
+          </p:cNvPr>
+          <p:cNvPicPr>
+            <a:picLocks noChangeAspect="1"/>
+          </p:cNvPicPr>
+          <p:nvPr/>
+        </p:nvPicPr>
+        <p:blipFill rotWithShape="1">
+          <a:blip r:embed="rId2">
+            <a:extLst>
+              <a:ext uri="{28A0092B-C50C-407E-A947-70E740481C1C}">
+                <a14:useLocalDpi xmlns:a14="http://schemas.microsoft.com/office/drawing/2010/main" val="0"/>
+              </a:ext>
+            </a:extLst>
+          </a:blip>
+          <a:srcRect t="7955" b="58712"/>
+          <a:stretch/>
+        </p:blipFill>
+        <p:spPr>
+          <a:xfrm>
+            <a:off x="3564075" y="2273000"/>
+            <a:ext cx="5063850" cy="4219875"/>
+          </a:xfrm>
+          <a:prstGeom prst="rect">
+            <a:avLst/>
+          </a:prstGeom>
+        </p:spPr>
+      </p:pic>
+    </p:spTree>
+    <p:extLst>
+      <p:ext uri="{BB962C8B-B14F-4D97-AF65-F5344CB8AC3E}">
+        <p14:creationId xmlns:p14="http://schemas.microsoft.com/office/powerpoint/2010/main" val="1933607349"/>
+      </p:ext>
+    </p:extLst>
+  </p:cSld>
+  <p:clrMapOvr>
+    <a:masterClrMapping/>
+  </p:clrMapOvr>
+</p:sld>
+</file>
+
 <file path=ppt/slides/slide2.xml><?xml version="1.0" encoding="utf-8"?>
 <p:sld xmlns:a="http://schemas.openxmlformats.org/drawingml/2006/main" xmlns:r="http://schemas.openxmlformats.org/officeDocument/2006/relationships" xmlns:p="http://schemas.openxmlformats.org/presentationml/2006/main">
   <p:cSld>
@@ -3422,6 +4178,13 @@
             <a:r>
               <a:rPr lang="en-US" dirty="0"/>
               <a:t>Study 1</a:t>
+            </a:r>
+            <a:br>
+              <a:rPr lang="en-US" dirty="0"/>
+            </a:br>
+            <a:r>
+              <a:rPr lang="en-US" dirty="0"/>
+              <a:t>move to conceptual organization</a:t>
             </a:r>
           </a:p>
         </p:txBody>
@@ -3461,6 +4224,459 @@
           <p:cNvPr id="2" name="Title 1">
             <a:extLst>
               <a:ext uri="{FF2B5EF4-FFF2-40B4-BE49-F238E27FC236}">
+                <a16:creationId xmlns:a16="http://schemas.microsoft.com/office/drawing/2014/main" id="{34854B05-007E-DBB2-DFA3-57CF9C27B7B2}"/>
+              </a:ext>
+            </a:extLst>
+          </p:cNvPr>
+          <p:cNvSpPr>
+            <a:spLocks noGrp="1"/>
+          </p:cNvSpPr>
+          <p:nvPr>
+            <p:ph type="title"/>
+          </p:nvPr>
+        </p:nvSpPr>
+        <p:spPr/>
+        <p:txBody>
+          <a:bodyPr/>
+          <a:lstStyle/>
+          <a:p>
+            <a:r>
+              <a:rPr lang="en-US" dirty="0"/>
+              <a:t>Results Outline</a:t>
+            </a:r>
+          </a:p>
+        </p:txBody>
+      </p:sp>
+      <p:sp>
+        <p:nvSpPr>
+          <p:cNvPr id="3" name="Content Placeholder 2">
+            <a:extLst>
+              <a:ext uri="{FF2B5EF4-FFF2-40B4-BE49-F238E27FC236}">
+                <a16:creationId xmlns:a16="http://schemas.microsoft.com/office/drawing/2014/main" id="{FF27D2FA-8EFC-A499-672E-2EE1568866E5}"/>
+              </a:ext>
+            </a:extLst>
+          </p:cNvPr>
+          <p:cNvSpPr>
+            <a:spLocks noGrp="1"/>
+          </p:cNvSpPr>
+          <p:nvPr>
+            <p:ph idx="1"/>
+          </p:nvPr>
+        </p:nvSpPr>
+        <p:spPr/>
+        <p:txBody>
+          <a:bodyPr>
+            <a:noAutofit/>
+          </a:bodyPr>
+          <a:lstStyle/>
+          <a:p>
+            <a:pPr fontAlgn="base">
+              <a:spcBef>
+                <a:spcPts val="0"/>
+              </a:spcBef>
+              <a:buFont typeface="+mj-lt"/>
+              <a:buAutoNum type="arabicPeriod"/>
+            </a:pPr>
+            <a:r>
+              <a:rPr lang="en-US" sz="2200" b="0" i="0" u="none" strike="noStrike" dirty="0">
+                <a:solidFill>
+                  <a:srgbClr val="000000"/>
+                </a:solidFill>
+                <a:effectLst/>
+                <a:latin typeface="Times New Roman" panose="02020603050405020304" pitchFamily="18" charset="0"/>
+              </a:rPr>
+              <a:t>More ELA → lower resilience + higher trait anxiety </a:t>
+            </a:r>
+          </a:p>
+          <a:p>
+            <a:pPr fontAlgn="base">
+              <a:spcBef>
+                <a:spcPts val="0"/>
+              </a:spcBef>
+              <a:buFont typeface="+mj-lt"/>
+              <a:buAutoNum type="arabicPeriod"/>
+            </a:pPr>
+            <a:r>
+              <a:rPr lang="en-US" sz="2200" b="0" i="0" u="none" strike="noStrike" dirty="0">
+                <a:solidFill>
+                  <a:srgbClr val="000000"/>
+                </a:solidFill>
+                <a:effectLst/>
+                <a:latin typeface="Times New Roman" panose="02020603050405020304" pitchFamily="18" charset="0"/>
+              </a:rPr>
+              <a:t>Correlation matrix (</a:t>
+            </a:r>
+            <a:r>
+              <a:rPr lang="en-US" sz="2200" b="0" i="0" u="none" strike="noStrike" dirty="0" err="1">
+                <a:solidFill>
+                  <a:srgbClr val="000000"/>
+                </a:solidFill>
+                <a:effectLst/>
+                <a:latin typeface="Times New Roman" panose="02020603050405020304" pitchFamily="18" charset="0"/>
+              </a:rPr>
+              <a:t>eBMRQ</a:t>
+            </a:r>
+            <a:r>
+              <a:rPr lang="en-US" sz="2200" b="0" i="0" u="none" strike="noStrike" dirty="0">
+                <a:solidFill>
+                  <a:srgbClr val="000000"/>
+                </a:solidFill>
+                <a:effectLst/>
+                <a:latin typeface="Times New Roman" panose="02020603050405020304" pitchFamily="18" charset="0"/>
+              </a:rPr>
+              <a:t> + ELA) [study 1]: four block figure (AIMS + threat for both)</a:t>
+            </a:r>
+          </a:p>
+          <a:p>
+            <a:pPr rtl="0" fontAlgn="base">
+              <a:spcBef>
+                <a:spcPts val="0"/>
+              </a:spcBef>
+              <a:spcAft>
+                <a:spcPts val="0"/>
+              </a:spcAft>
+              <a:buFont typeface="+mj-lt"/>
+              <a:buAutoNum type="arabicPeriod"/>
+            </a:pPr>
+            <a:r>
+              <a:rPr lang="en-US" sz="2200" b="0" i="0" u="none" strike="noStrike" dirty="0">
+                <a:solidFill>
+                  <a:srgbClr val="000000"/>
+                </a:solidFill>
+                <a:effectLst/>
+                <a:latin typeface="Times New Roman" panose="02020603050405020304" pitchFamily="18" charset="0"/>
+              </a:rPr>
+              <a:t>Correlation (?) replication (conceptual replication w/ AIMS → threat + chaos) [study 2]</a:t>
+            </a:r>
+          </a:p>
+          <a:p>
+            <a:pPr rtl="0" fontAlgn="base">
+              <a:spcBef>
+                <a:spcPts val="0"/>
+              </a:spcBef>
+              <a:spcAft>
+                <a:spcPts val="0"/>
+              </a:spcAft>
+              <a:buFont typeface="+mj-lt"/>
+              <a:buAutoNum type="arabicPeriod"/>
+            </a:pPr>
+            <a:r>
+              <a:rPr lang="en-US" sz="2200" b="0" i="0" u="none" strike="noStrike" dirty="0">
+                <a:solidFill>
+                  <a:srgbClr val="000000"/>
+                </a:solidFill>
+                <a:effectLst/>
+                <a:latin typeface="Times New Roman" panose="02020603050405020304" pitchFamily="18" charset="0"/>
+              </a:rPr>
+              <a:t>HUMS ~ absorption [try study 2]</a:t>
+            </a:r>
+          </a:p>
+          <a:p>
+            <a:pPr rtl="0" fontAlgn="base">
+              <a:spcBef>
+                <a:spcPts val="0"/>
+              </a:spcBef>
+              <a:spcAft>
+                <a:spcPts val="0"/>
+              </a:spcAft>
+              <a:buFont typeface="+mj-lt"/>
+              <a:buAutoNum type="arabicPeriod"/>
+            </a:pPr>
+            <a:r>
+              <a:rPr lang="en-US" sz="2200" b="0" i="0" u="none" strike="noStrike" dirty="0" err="1">
+                <a:solidFill>
+                  <a:srgbClr val="000000"/>
+                </a:solidFill>
+                <a:effectLst/>
+                <a:latin typeface="Times New Roman" panose="02020603050405020304" pitchFamily="18" charset="0"/>
+              </a:rPr>
+              <a:t>Escapsim</a:t>
+            </a:r>
+            <a:r>
+              <a:rPr lang="en-US" sz="2200" b="0" i="0" u="none" strike="noStrike" dirty="0">
+                <a:solidFill>
+                  <a:srgbClr val="000000"/>
+                </a:solidFill>
+                <a:effectLst/>
+                <a:latin typeface="Times New Roman" panose="02020603050405020304" pitchFamily="18" charset="0"/>
+              </a:rPr>
+              <a:t> ~ BMRQ + AIMS subscales (only sig. ‘Predictor’ is AIMS; use full score. Secondary analyses of using subscales of escapism [pos &amp; neg]; interaction with </a:t>
+            </a:r>
+            <a:r>
+              <a:rPr lang="en-US" sz="2200" b="0" i="0" u="none" strike="noStrike" dirty="0" err="1">
+                <a:solidFill>
+                  <a:srgbClr val="000000"/>
+                </a:solidFill>
+                <a:effectLst/>
+                <a:latin typeface="Times New Roman" panose="02020603050405020304" pitchFamily="18" charset="0"/>
+              </a:rPr>
+              <a:t>pos+neg</a:t>
+            </a:r>
+            <a:r>
+              <a:rPr lang="en-US" sz="2200" b="0" i="0" u="none" strike="noStrike" dirty="0">
+                <a:solidFill>
+                  <a:srgbClr val="000000"/>
+                </a:solidFill>
+                <a:effectLst/>
+                <a:latin typeface="Times New Roman" panose="02020603050405020304" pitchFamily="18" charset="0"/>
+              </a:rPr>
+              <a:t> but with just AIMS)</a:t>
+            </a:r>
+          </a:p>
+          <a:p>
+            <a:pPr rtl="0" fontAlgn="base">
+              <a:spcBef>
+                <a:spcPts val="0"/>
+              </a:spcBef>
+              <a:spcAft>
+                <a:spcPts val="0"/>
+              </a:spcAft>
+              <a:buFont typeface="+mj-lt"/>
+              <a:buAutoNum type="arabicPeriod"/>
+            </a:pPr>
+            <a:r>
+              <a:rPr lang="en-US" sz="2200" b="0" i="0" u="none" strike="noStrike" dirty="0">
+                <a:solidFill>
+                  <a:srgbClr val="000000"/>
+                </a:solidFill>
+                <a:effectLst/>
+                <a:latin typeface="Times New Roman" panose="02020603050405020304" pitchFamily="18" charset="0"/>
+              </a:rPr>
+              <a:t>Absorption → resilience</a:t>
+            </a:r>
+          </a:p>
+          <a:p>
+            <a:pPr rtl="0" fontAlgn="base">
+              <a:spcBef>
+                <a:spcPts val="0"/>
+              </a:spcBef>
+              <a:spcAft>
+                <a:spcPts val="0"/>
+              </a:spcAft>
+              <a:buFont typeface="+mj-lt"/>
+              <a:buAutoNum type="arabicPeriod"/>
+            </a:pPr>
+            <a:r>
+              <a:rPr lang="en-US" sz="2200" b="0" i="0" u="none" strike="noStrike" dirty="0">
+                <a:solidFill>
+                  <a:srgbClr val="000000"/>
+                </a:solidFill>
+                <a:effectLst/>
+                <a:latin typeface="Times New Roman" panose="02020603050405020304" pitchFamily="18" charset="0"/>
+              </a:rPr>
+              <a:t>Mediation model (CHAOS - AIMS - resilience) / (</a:t>
+            </a:r>
+            <a:r>
+              <a:rPr lang="en-US" sz="2200" dirty="0">
+                <a:solidFill>
+                  <a:srgbClr val="000000"/>
+                </a:solidFill>
+                <a:latin typeface="Times New Roman" panose="02020603050405020304" pitchFamily="18" charset="0"/>
+              </a:rPr>
+              <a:t>check </a:t>
+            </a:r>
+            <a:r>
+              <a:rPr lang="en-US" sz="2200" b="0" i="0" u="none" strike="noStrike" dirty="0">
+                <a:solidFill>
+                  <a:srgbClr val="000000"/>
+                </a:solidFill>
+                <a:effectLst/>
+                <a:latin typeface="Times New Roman" panose="02020603050405020304" pitchFamily="18" charset="0"/>
+              </a:rPr>
+              <a:t>STAI)</a:t>
+            </a:r>
+          </a:p>
+          <a:p>
+            <a:pPr marL="742950" lvl="1" indent="-285750" rtl="0" fontAlgn="base">
+              <a:spcBef>
+                <a:spcPts val="0"/>
+              </a:spcBef>
+              <a:spcAft>
+                <a:spcPts val="0"/>
+              </a:spcAft>
+              <a:buFont typeface="+mj-lt"/>
+              <a:buAutoNum type="arabicPeriod"/>
+            </a:pPr>
+            <a:r>
+              <a:rPr lang="en-US" sz="2200" b="0" i="0" u="none" strike="noStrike" dirty="0">
+                <a:solidFill>
+                  <a:srgbClr val="000000"/>
+                </a:solidFill>
+                <a:effectLst/>
+                <a:latin typeface="Times New Roman" panose="02020603050405020304" pitchFamily="18" charset="0"/>
+              </a:rPr>
+              <a:t>N.s. for just childhood</a:t>
+            </a:r>
+          </a:p>
+          <a:p>
+            <a:pPr marL="742950" lvl="1" indent="-285750" rtl="0" fontAlgn="base">
+              <a:spcBef>
+                <a:spcPts val="0"/>
+              </a:spcBef>
+              <a:spcAft>
+                <a:spcPts val="0"/>
+              </a:spcAft>
+              <a:buFont typeface="+mj-lt"/>
+              <a:buAutoNum type="arabicPeriod"/>
+            </a:pPr>
+            <a:r>
+              <a:rPr lang="en-US" sz="2200" b="0" i="0" u="none" strike="noStrike" dirty="0">
+                <a:solidFill>
+                  <a:srgbClr val="000000"/>
+                </a:solidFill>
+                <a:effectLst/>
+                <a:latin typeface="Times New Roman" panose="02020603050405020304" pitchFamily="18" charset="0"/>
+              </a:rPr>
+              <a:t>Significant for adolescence</a:t>
+            </a:r>
+          </a:p>
+          <a:p>
+            <a:pPr marL="742950" lvl="1" indent="-285750" rtl="0" fontAlgn="base">
+              <a:spcBef>
+                <a:spcPts val="0"/>
+              </a:spcBef>
+              <a:spcAft>
+                <a:spcPts val="0"/>
+              </a:spcAft>
+              <a:buFont typeface="+mj-lt"/>
+              <a:buAutoNum type="arabicPeriod"/>
+            </a:pPr>
+            <a:r>
+              <a:rPr lang="en-US" sz="2200" b="0" i="0" u="none" strike="noStrike" dirty="0">
+                <a:solidFill>
+                  <a:srgbClr val="000000"/>
+                </a:solidFill>
+                <a:effectLst/>
+                <a:latin typeface="Times New Roman" panose="02020603050405020304" pitchFamily="18" charset="0"/>
+              </a:rPr>
+              <a:t>CHAOS mediation remained sig w/ age as a covariate (cite music reward decreasing of age/retrospective reporting could be confound)</a:t>
+            </a:r>
+          </a:p>
+        </p:txBody>
+      </p:sp>
+    </p:spTree>
+    <p:extLst>
+      <p:ext uri="{BB962C8B-B14F-4D97-AF65-F5344CB8AC3E}">
+        <p14:creationId xmlns:p14="http://schemas.microsoft.com/office/powerpoint/2010/main" val="3071423805"/>
+      </p:ext>
+    </p:extLst>
+  </p:cSld>
+  <p:clrMapOvr>
+    <a:masterClrMapping/>
+  </p:clrMapOvr>
+</p:sld>
+</file>
+
+<file path=ppt/slides/slide4.xml><?xml version="1.0" encoding="utf-8"?>
+<p:sld xmlns:a="http://schemas.openxmlformats.org/drawingml/2006/main" xmlns:r="http://schemas.openxmlformats.org/officeDocument/2006/relationships" xmlns:p="http://schemas.openxmlformats.org/presentationml/2006/main">
+  <p:cSld>
+    <p:spTree>
+      <p:nvGrpSpPr>
+        <p:cNvPr id="1" name=""/>
+        <p:cNvGrpSpPr/>
+        <p:nvPr/>
+      </p:nvGrpSpPr>
+      <p:grpSpPr>
+        <a:xfrm>
+          <a:off x="0" y="0"/>
+          <a:ext cx="0" cy="0"/>
+          <a:chOff x="0" y="0"/>
+          <a:chExt cx="0" cy="0"/>
+        </a:xfrm>
+      </p:grpSpPr>
+      <p:sp>
+        <p:nvSpPr>
+          <p:cNvPr id="2" name="Title 1">
+            <a:extLst>
+              <a:ext uri="{FF2B5EF4-FFF2-40B4-BE49-F238E27FC236}">
+                <a16:creationId xmlns:a16="http://schemas.microsoft.com/office/drawing/2014/main" id="{CAC28911-70F8-9B00-7555-BB144162B56B}"/>
+              </a:ext>
+            </a:extLst>
+          </p:cNvPr>
+          <p:cNvSpPr>
+            <a:spLocks noGrp="1"/>
+          </p:cNvSpPr>
+          <p:nvPr>
+            <p:ph type="title"/>
+          </p:nvPr>
+        </p:nvSpPr>
+        <p:spPr/>
+        <p:txBody>
+          <a:bodyPr/>
+          <a:lstStyle/>
+          <a:p>
+            <a:r>
+              <a:rPr lang="en-US" dirty="0"/>
+              <a:t>ELA &amp; Mental Health Outcomes Table</a:t>
+            </a:r>
+          </a:p>
+        </p:txBody>
+      </p:sp>
+      <p:pic>
+        <p:nvPicPr>
+          <p:cNvPr id="5" name="Picture 4" descr="A table of numbers and text&#10;&#10;Description automatically generated with medium confidence">
+            <a:extLst>
+              <a:ext uri="{FF2B5EF4-FFF2-40B4-BE49-F238E27FC236}">
+                <a16:creationId xmlns:a16="http://schemas.microsoft.com/office/drawing/2014/main" id="{5D4C5A96-72E1-9B1D-7F2B-A95B701D3EFA}"/>
+              </a:ext>
+            </a:extLst>
+          </p:cNvPr>
+          <p:cNvPicPr>
+            <a:picLocks noChangeAspect="1"/>
+          </p:cNvPicPr>
+          <p:nvPr/>
+        </p:nvPicPr>
+        <p:blipFill>
+          <a:blip r:embed="rId2"/>
+          <a:stretch>
+            <a:fillRect/>
+          </a:stretch>
+        </p:blipFill>
+        <p:spPr>
+          <a:xfrm>
+            <a:off x="2088243" y="1419678"/>
+            <a:ext cx="7772400" cy="4631158"/>
+          </a:xfrm>
+          <a:prstGeom prst="rect">
+            <a:avLst/>
+          </a:prstGeom>
+        </p:spPr>
+      </p:pic>
+    </p:spTree>
+    <p:extLst>
+      <p:ext uri="{BB962C8B-B14F-4D97-AF65-F5344CB8AC3E}">
+        <p14:creationId xmlns:p14="http://schemas.microsoft.com/office/powerpoint/2010/main" val="1914168891"/>
+      </p:ext>
+    </p:extLst>
+  </p:cSld>
+  <p:clrMapOvr>
+    <a:masterClrMapping/>
+  </p:clrMapOvr>
+</p:sld>
+</file>
+
+<file path=ppt/slides/slide5.xml><?xml version="1.0" encoding="utf-8"?>
+<p:sld xmlns:a="http://schemas.openxmlformats.org/drawingml/2006/main" xmlns:r="http://schemas.openxmlformats.org/officeDocument/2006/relationships" xmlns:p="http://schemas.openxmlformats.org/presentationml/2006/main">
+  <p:cSld>
+    <p:spTree>
+      <p:nvGrpSpPr>
+        <p:cNvPr id="1" name=""/>
+        <p:cNvGrpSpPr/>
+        <p:nvPr/>
+      </p:nvGrpSpPr>
+      <p:grpSpPr>
+        <a:xfrm>
+          <a:off x="0" y="0"/>
+          <a:ext cx="0" cy="0"/>
+          <a:chOff x="0" y="0"/>
+          <a:chExt cx="0" cy="0"/>
+        </a:xfrm>
+      </p:grpSpPr>
+      <p:sp>
+        <p:nvSpPr>
+          <p:cNvPr id="2" name="Title 1">
+            <a:extLst>
+              <a:ext uri="{FF2B5EF4-FFF2-40B4-BE49-F238E27FC236}">
                 <a16:creationId xmlns:a16="http://schemas.microsoft.com/office/drawing/2014/main" id="{D87B2CE0-EDFF-4F9C-0961-9AD3EC44D7E7}"/>
               </a:ext>
             </a:extLst>
@@ -3544,7 +4760,7 @@
 </p:sld>
 </file>
 
-<file path=ppt/slides/slide4.xml><?xml version="1.0" encoding="utf-8"?>
+<file path=ppt/slides/slide6.xml><?xml version="1.0" encoding="utf-8"?>
 <p:sld xmlns:a="http://schemas.openxmlformats.org/drawingml/2006/main" xmlns:r="http://schemas.openxmlformats.org/officeDocument/2006/relationships" xmlns:p="http://schemas.openxmlformats.org/presentationml/2006/main">
   <p:cSld>
     <p:spTree>
@@ -3611,7 +4827,7 @@
           <p:nvPr/>
         </p:nvPicPr>
         <p:blipFill>
-          <a:blip r:embed="rId2">
+          <a:blip r:embed="rId3">
             <a:extLst>
               <a:ext uri="{28A0092B-C50C-407E-A947-70E740481C1C}">
                 <a14:useLocalDpi xmlns:a14="http://schemas.microsoft.com/office/drawing/2010/main" val="0"/>
@@ -3647,7 +4863,7 @@
           <p:nvPr/>
         </p:nvPicPr>
         <p:blipFill>
-          <a:blip r:embed="rId3">
+          <a:blip r:embed="rId4">
             <a:extLst>
               <a:ext uri="{28A0092B-C50C-407E-A947-70E740481C1C}">
                 <a14:useLocalDpi xmlns:a14="http://schemas.microsoft.com/office/drawing/2010/main" val="0"/>
@@ -3681,7 +4897,7 @@
 </p:sld>
 </file>
 
-<file path=ppt/slides/slide5.xml><?xml version="1.0" encoding="utf-8"?>
+<file path=ppt/slides/slide7.xml><?xml version="1.0" encoding="utf-8"?>
 <p:sld xmlns:a="http://schemas.openxmlformats.org/drawingml/2006/main" xmlns:r="http://schemas.openxmlformats.org/officeDocument/2006/relationships" xmlns:p="http://schemas.openxmlformats.org/presentationml/2006/main">
   <p:cSld>
     <p:spTree>
@@ -3787,170 +5003,6 @@
 </p:sld>
 </file>
 
-<file path=ppt/slides/slide6.xml><?xml version="1.0" encoding="utf-8"?>
-<p:sld xmlns:a="http://schemas.openxmlformats.org/drawingml/2006/main" xmlns:r="http://schemas.openxmlformats.org/officeDocument/2006/relationships" xmlns:p="http://schemas.openxmlformats.org/presentationml/2006/main">
-  <p:cSld>
-    <p:spTree>
-      <p:nvGrpSpPr>
-        <p:cNvPr id="1" name=""/>
-        <p:cNvGrpSpPr/>
-        <p:nvPr/>
-      </p:nvGrpSpPr>
-      <p:grpSpPr>
-        <a:xfrm>
-          <a:off x="0" y="0"/>
-          <a:ext cx="0" cy="0"/>
-          <a:chOff x="0" y="0"/>
-          <a:chExt cx="0" cy="0"/>
-        </a:xfrm>
-      </p:grpSpPr>
-      <p:sp>
-        <p:nvSpPr>
-          <p:cNvPr id="2" name="Title 1">
-            <a:extLst>
-              <a:ext uri="{FF2B5EF4-FFF2-40B4-BE49-F238E27FC236}">
-                <a16:creationId xmlns:a16="http://schemas.microsoft.com/office/drawing/2014/main" id="{15E84D18-01E5-31EC-7C9A-668060D494A2}"/>
-              </a:ext>
-            </a:extLst>
-          </p:cNvPr>
-          <p:cNvSpPr>
-            <a:spLocks noGrp="1"/>
-          </p:cNvSpPr>
-          <p:nvPr>
-            <p:ph type="title"/>
-          </p:nvPr>
-        </p:nvSpPr>
-        <p:spPr>
-          <a:xfrm>
-            <a:off x="838200" y="2766218"/>
-            <a:ext cx="10515600" cy="1325563"/>
-          </a:xfrm>
-        </p:spPr>
-        <p:txBody>
-          <a:bodyPr/>
-          <a:lstStyle/>
-          <a:p>
-            <a:pPr algn="ctr"/>
-            <a:r>
-              <a:rPr lang="en-US" dirty="0"/>
-              <a:t>Study 2</a:t>
-            </a:r>
-          </a:p>
-        </p:txBody>
-      </p:sp>
-    </p:spTree>
-    <p:extLst>
-      <p:ext uri="{BB962C8B-B14F-4D97-AF65-F5344CB8AC3E}">
-        <p14:creationId xmlns:p14="http://schemas.microsoft.com/office/powerpoint/2010/main" val="3638951400"/>
-      </p:ext>
-    </p:extLst>
-  </p:cSld>
-  <p:clrMapOvr>
-    <a:masterClrMapping/>
-  </p:clrMapOvr>
-</p:sld>
-</file>
-
-<file path=ppt/slides/slide7.xml><?xml version="1.0" encoding="utf-8"?>
-<p:sld xmlns:a="http://schemas.openxmlformats.org/drawingml/2006/main" xmlns:r="http://schemas.openxmlformats.org/officeDocument/2006/relationships" xmlns:p="http://schemas.openxmlformats.org/presentationml/2006/main">
-  <p:cSld>
-    <p:spTree>
-      <p:nvGrpSpPr>
-        <p:cNvPr id="1" name=""/>
-        <p:cNvGrpSpPr/>
-        <p:nvPr/>
-      </p:nvGrpSpPr>
-      <p:grpSpPr>
-        <a:xfrm>
-          <a:off x="0" y="0"/>
-          <a:ext cx="0" cy="0"/>
-          <a:chOff x="0" y="0"/>
-          <a:chExt cx="0" cy="0"/>
-        </a:xfrm>
-      </p:grpSpPr>
-      <p:sp>
-        <p:nvSpPr>
-          <p:cNvPr id="2" name="Title 1">
-            <a:extLst>
-              <a:ext uri="{FF2B5EF4-FFF2-40B4-BE49-F238E27FC236}">
-                <a16:creationId xmlns:a16="http://schemas.microsoft.com/office/drawing/2014/main" id="{6AB496C7-BDD1-98A1-BB24-B9AC7FEBF76F}"/>
-              </a:ext>
-            </a:extLst>
-          </p:cNvPr>
-          <p:cNvSpPr>
-            <a:spLocks noGrp="1"/>
-          </p:cNvSpPr>
-          <p:nvPr>
-            <p:ph type="title"/>
-          </p:nvPr>
-        </p:nvSpPr>
-        <p:spPr/>
-        <p:txBody>
-          <a:bodyPr>
-            <a:normAutofit/>
-          </a:bodyPr>
-          <a:lstStyle/>
-          <a:p>
-            <a:r>
-              <a:rPr lang="en-US" sz="3200" dirty="0">
-                <a:solidFill>
-                  <a:srgbClr val="000000"/>
-                </a:solidFill>
-              </a:rPr>
-              <a:t>Conceptual replication of CHAOS &amp; threat associations with absorption (via AIMS)</a:t>
-            </a:r>
-            <a:endParaRPr lang="en-US" sz="3200" dirty="0"/>
-          </a:p>
-        </p:txBody>
-      </p:sp>
-      <p:pic>
-        <p:nvPicPr>
-          <p:cNvPr id="4" name="Picture 3">
-            <a:extLst>
-              <a:ext uri="{FF2B5EF4-FFF2-40B4-BE49-F238E27FC236}">
-                <a16:creationId xmlns:a16="http://schemas.microsoft.com/office/drawing/2014/main" id="{A3D53FC9-EF33-66A7-656E-7FC502F9BE81}"/>
-              </a:ext>
-            </a:extLst>
-          </p:cNvPr>
-          <p:cNvPicPr>
-            <a:picLocks noChangeAspect="1"/>
-          </p:cNvPicPr>
-          <p:nvPr/>
-        </p:nvPicPr>
-        <p:blipFill rotWithShape="1">
-          <a:blip r:embed="rId2">
-            <a:extLst>
-              <a:ext uri="{28A0092B-C50C-407E-A947-70E740481C1C}">
-                <a14:useLocalDpi xmlns:a14="http://schemas.microsoft.com/office/drawing/2010/main" val="0"/>
-              </a:ext>
-            </a:extLst>
-          </a:blip>
-          <a:srcRect t="16078" b="12960"/>
-          <a:stretch/>
-        </p:blipFill>
-        <p:spPr>
-          <a:xfrm>
-            <a:off x="3272140" y="1906241"/>
-            <a:ext cx="6201044" cy="4400367"/>
-          </a:xfrm>
-          <a:prstGeom prst="rect">
-            <a:avLst/>
-          </a:prstGeom>
-        </p:spPr>
-      </p:pic>
-    </p:spTree>
-    <p:extLst>
-      <p:ext uri="{BB962C8B-B14F-4D97-AF65-F5344CB8AC3E}">
-        <p14:creationId xmlns:p14="http://schemas.microsoft.com/office/powerpoint/2010/main" val="667018637"/>
-      </p:ext>
-    </p:extLst>
-  </p:cSld>
-  <p:clrMapOvr>
-    <a:masterClrMapping/>
-  </p:clrMapOvr>
-</p:sld>
-</file>
-
 <file path=ppt/slides/slide8.xml><?xml version="1.0" encoding="utf-8"?>
 <p:sld xmlns:a="http://schemas.openxmlformats.org/drawingml/2006/main" xmlns:r="http://schemas.openxmlformats.org/officeDocument/2006/relationships" xmlns:p="http://schemas.openxmlformats.org/presentationml/2006/main">
   <p:cSld>
@@ -3973,7 +5025,7 @@
           <p:cNvPr id="2" name="Title 1">
             <a:extLst>
               <a:ext uri="{FF2B5EF4-FFF2-40B4-BE49-F238E27FC236}">
-                <a16:creationId xmlns:a16="http://schemas.microsoft.com/office/drawing/2014/main" id="{F17B7E66-9999-1D14-D0E7-3A0F39500B18}"/>
+                <a16:creationId xmlns:a16="http://schemas.microsoft.com/office/drawing/2014/main" id="{15E84D18-01E5-31EC-7C9A-668060D494A2}"/>
               </a:ext>
             </a:extLst>
           </p:cNvPr>
@@ -3984,65 +5036,28 @@
             <p:ph type="title"/>
           </p:nvPr>
         </p:nvSpPr>
-        <p:spPr/>
-        <p:txBody>
-          <a:bodyPr>
-            <a:normAutofit/>
-          </a:bodyPr>
-          <a:lstStyle/>
-          <a:p>
-            <a:r>
-              <a:rPr lang="en-US" sz="3200" dirty="0">
-                <a:solidFill>
-                  <a:srgbClr val="000000"/>
-                </a:solidFill>
-              </a:rPr>
-              <a:t>Absorption into music associated with using music for escapism </a:t>
-            </a:r>
-            <a:endParaRPr lang="en-US" sz="3200" dirty="0"/>
-          </a:p>
-        </p:txBody>
-      </p:sp>
-      <p:pic>
-        <p:nvPicPr>
-          <p:cNvPr id="4" name="Picture 3">
-            <a:extLst>
-              <a:ext uri="{FF2B5EF4-FFF2-40B4-BE49-F238E27FC236}">
-                <a16:creationId xmlns:a16="http://schemas.microsoft.com/office/drawing/2014/main" id="{9076CF1D-1B20-829C-75A0-0E4AE579B2CC}"/>
-              </a:ext>
-            </a:extLst>
-          </p:cNvPr>
-          <p:cNvPicPr>
-            <a:picLocks noChangeAspect="1"/>
-          </p:cNvPicPr>
-          <p:nvPr/>
-        </p:nvPicPr>
-        <p:blipFill>
-          <a:blip r:embed="rId2">
-            <a:extLst>
-              <a:ext uri="{28A0092B-C50C-407E-A947-70E740481C1C}">
-                <a14:useLocalDpi xmlns:a14="http://schemas.microsoft.com/office/drawing/2010/main" val="0"/>
-              </a:ext>
-            </a:extLst>
-          </a:blip>
-          <a:stretch>
-            <a:fillRect/>
-          </a:stretch>
-        </p:blipFill>
         <p:spPr>
           <a:xfrm>
-            <a:off x="3355448" y="2161691"/>
-            <a:ext cx="5481104" cy="3836773"/>
+            <a:off x="838200" y="2766218"/>
+            <a:ext cx="10515600" cy="1325563"/>
           </a:xfrm>
-          <a:prstGeom prst="rect">
-            <a:avLst/>
-          </a:prstGeom>
         </p:spPr>
-      </p:pic>
+        <p:txBody>
+          <a:bodyPr/>
+          <a:lstStyle/>
+          <a:p>
+            <a:pPr algn="ctr"/>
+            <a:r>
+              <a:rPr lang="en-US" dirty="0"/>
+              <a:t>Study 2</a:t>
+            </a:r>
+          </a:p>
+        </p:txBody>
+      </p:sp>
     </p:spTree>
     <p:extLst>
       <p:ext uri="{BB962C8B-B14F-4D97-AF65-F5344CB8AC3E}">
-        <p14:creationId xmlns:p14="http://schemas.microsoft.com/office/powerpoint/2010/main" val="3956141494"/>
+        <p14:creationId xmlns:p14="http://schemas.microsoft.com/office/powerpoint/2010/main" val="3638951400"/>
       </p:ext>
     </p:extLst>
   </p:cSld>
@@ -4074,7 +5089,7 @@
           <p:cNvPr id="2" name="Title 1">
             <a:extLst>
               <a:ext uri="{FF2B5EF4-FFF2-40B4-BE49-F238E27FC236}">
-                <a16:creationId xmlns:a16="http://schemas.microsoft.com/office/drawing/2014/main" id="{A075C297-C22E-60CC-8F6A-9C0AB8157215}"/>
+                <a16:creationId xmlns:a16="http://schemas.microsoft.com/office/drawing/2014/main" id="{6AB496C7-BDD1-98A1-BB24-B9AC7FEBF76F}"/>
               </a:ext>
             </a:extLst>
           </p:cNvPr>
@@ -4098,7 +5113,7 @@
                   <a:srgbClr val="000000"/>
                 </a:solidFill>
               </a:rPr>
-              <a:t>Absorption mediates the relationship between CHAOS and resilience</a:t>
+              <a:t>Conceptual replication of CHAOS &amp; threat associations with absorption (via AIMS)</a:t>
             </a:r>
             <a:endParaRPr lang="en-US" sz="3200" dirty="0"/>
           </a:p>
@@ -4109,7 +5124,7 @@
           <p:cNvPr id="4" name="Picture 3">
             <a:extLst>
               <a:ext uri="{FF2B5EF4-FFF2-40B4-BE49-F238E27FC236}">
-                <a16:creationId xmlns:a16="http://schemas.microsoft.com/office/drawing/2014/main" id="{7608EBE1-D671-B28C-6D61-6737521F1EBE}"/>
+                <a16:creationId xmlns:a16="http://schemas.microsoft.com/office/drawing/2014/main" id="{A3D53FC9-EF33-66A7-656E-7FC502F9BE81}"/>
               </a:ext>
             </a:extLst>
           </p:cNvPr>
@@ -4126,13 +5141,13 @@
               </a:ext>
             </a:extLst>
           </a:blip>
-          <a:srcRect t="7955" b="58712"/>
+          <a:srcRect t="16078" b="12960"/>
           <a:stretch/>
         </p:blipFill>
         <p:spPr>
           <a:xfrm>
-            <a:off x="3564075" y="2273000"/>
-            <a:ext cx="5063850" cy="4219875"/>
+            <a:off x="3272140" y="1906241"/>
+            <a:ext cx="6201044" cy="4400367"/>
           </a:xfrm>
           <a:prstGeom prst="rect">
             <a:avLst/>
@@ -4142,7 +5157,7 @@
     </p:spTree>
     <p:extLst>
       <p:ext uri="{BB962C8B-B14F-4D97-AF65-F5344CB8AC3E}">
-        <p14:creationId xmlns:p14="http://schemas.microsoft.com/office/powerpoint/2010/main" val="1933607349"/>
+        <p14:creationId xmlns:p14="http://schemas.microsoft.com/office/powerpoint/2010/main" val="667018637"/>
       </p:ext>
     </p:extLst>
   </p:cSld>
@@ -4445,4 +5460,299 @@
     </a:ext>
   </a:extLst>
 </a:theme>
+</file>
+
+<file path=ppt/theme/theme2.xml><?xml version="1.0" encoding="utf-8"?>
+<a:theme xmlns:a="http://schemas.openxmlformats.org/drawingml/2006/main" name="Office Theme">
+  <a:themeElements>
+    <a:clrScheme name="Office">
+      <a:dk1>
+        <a:sysClr val="windowText" lastClr="000000"/>
+      </a:dk1>
+      <a:lt1>
+        <a:sysClr val="window" lastClr="FFFFFF"/>
+      </a:lt1>
+      <a:dk2>
+        <a:srgbClr val="44546A"/>
+      </a:dk2>
+      <a:lt2>
+        <a:srgbClr val="E7E6E6"/>
+      </a:lt2>
+      <a:accent1>
+        <a:srgbClr val="4472C4"/>
+      </a:accent1>
+      <a:accent2>
+        <a:srgbClr val="ED7D31"/>
+      </a:accent2>
+      <a:accent3>
+        <a:srgbClr val="A5A5A5"/>
+      </a:accent3>
+      <a:accent4>
+        <a:srgbClr val="FFC000"/>
+      </a:accent4>
+      <a:accent5>
+        <a:srgbClr val="5B9BD5"/>
+      </a:accent5>
+      <a:accent6>
+        <a:srgbClr val="70AD47"/>
+      </a:accent6>
+      <a:hlink>
+        <a:srgbClr val="0563C1"/>
+      </a:hlink>
+      <a:folHlink>
+        <a:srgbClr val="954F72"/>
+      </a:folHlink>
+    </a:clrScheme>
+    <a:fontScheme name="Office">
+      <a:majorFont>
+        <a:latin typeface="Calibri Light" panose="020F0302020204030204"/>
+        <a:ea typeface=""/>
+        <a:cs typeface=""/>
+        <a:font script="Jpan" typeface="游ゴシック Light"/>
+        <a:font script="Hang" typeface="맑은 고딕"/>
+        <a:font script="Hans" typeface="等线 Light"/>
+        <a:font script="Hant" typeface="新細明體"/>
+        <a:font script="Arab" typeface="Times New Roman"/>
+        <a:font script="Hebr" typeface="Times New Roman"/>
+        <a:font script="Thai" typeface="Angsana New"/>
+        <a:font script="Ethi" typeface="Nyala"/>
+        <a:font script="Beng" typeface="Vrinda"/>
+        <a:font script="Gujr" typeface="Shruti"/>
+        <a:font script="Khmr" typeface="MoolBoran"/>
+        <a:font script="Knda" typeface="Tunga"/>
+        <a:font script="Guru" typeface="Raavi"/>
+        <a:font script="Cans" typeface="Euphemia"/>
+        <a:font script="Cher" typeface="Plantagenet Cherokee"/>
+        <a:font script="Yiii" typeface="Microsoft Yi Baiti"/>
+        <a:font script="Tibt" typeface="Microsoft Himalaya"/>
+        <a:font script="Thaa" typeface="MV Boli"/>
+        <a:font script="Deva" typeface="Mangal"/>
+        <a:font script="Telu" typeface="Gautami"/>
+        <a:font script="Taml" typeface="Latha"/>
+        <a:font script="Syrc" typeface="Estrangelo Edessa"/>
+        <a:font script="Orya" typeface="Kalinga"/>
+        <a:font script="Mlym" typeface="Kartika"/>
+        <a:font script="Laoo" typeface="DokChampa"/>
+        <a:font script="Sinh" typeface="Iskoola Pota"/>
+        <a:font script="Mong" typeface="Mongolian Baiti"/>
+        <a:font script="Viet" typeface="Times New Roman"/>
+        <a:font script="Uigh" typeface="Microsoft Uighur"/>
+        <a:font script="Geor" typeface="Sylfaen"/>
+        <a:font script="Armn" typeface="Arial"/>
+        <a:font script="Bugi" typeface="Leelawadee UI"/>
+        <a:font script="Bopo" typeface="Microsoft JhengHei"/>
+        <a:font script="Java" typeface="Javanese Text"/>
+        <a:font script="Lisu" typeface="Segoe UI"/>
+        <a:font script="Mymr" typeface="Myanmar Text"/>
+        <a:font script="Nkoo" typeface="Ebrima"/>
+        <a:font script="Olck" typeface="Nirmala UI"/>
+        <a:font script="Osma" typeface="Ebrima"/>
+        <a:font script="Phag" typeface="Phagspa"/>
+        <a:font script="Syrn" typeface="Estrangelo Edessa"/>
+        <a:font script="Syrj" typeface="Estrangelo Edessa"/>
+        <a:font script="Syre" typeface="Estrangelo Edessa"/>
+        <a:font script="Sora" typeface="Nirmala UI"/>
+        <a:font script="Tale" typeface="Microsoft Tai Le"/>
+        <a:font script="Talu" typeface="Microsoft New Tai Lue"/>
+        <a:font script="Tfng" typeface="Ebrima"/>
+      </a:majorFont>
+      <a:minorFont>
+        <a:latin typeface="Calibri" panose="020F0502020204030204"/>
+        <a:ea typeface=""/>
+        <a:cs typeface=""/>
+        <a:font script="Jpan" typeface="游ゴシック"/>
+        <a:font script="Hang" typeface="맑은 고딕"/>
+        <a:font script="Hans" typeface="等线"/>
+        <a:font script="Hant" typeface="新細明體"/>
+        <a:font script="Arab" typeface="Arial"/>
+        <a:font script="Hebr" typeface="Arial"/>
+        <a:font script="Thai" typeface="Cordia New"/>
+        <a:font script="Ethi" typeface="Nyala"/>
+        <a:font script="Beng" typeface="Vrinda"/>
+        <a:font script="Gujr" typeface="Shruti"/>
+        <a:font script="Khmr" typeface="DaunPenh"/>
+        <a:font script="Knda" typeface="Tunga"/>
+        <a:font script="Guru" typeface="Raavi"/>
+        <a:font script="Cans" typeface="Euphemia"/>
+        <a:font script="Cher" typeface="Plantagenet Cherokee"/>
+        <a:font script="Yiii" typeface="Microsoft Yi Baiti"/>
+        <a:font script="Tibt" typeface="Microsoft Himalaya"/>
+        <a:font script="Thaa" typeface="MV Boli"/>
+        <a:font script="Deva" typeface="Mangal"/>
+        <a:font script="Telu" typeface="Gautami"/>
+        <a:font script="Taml" typeface="Latha"/>
+        <a:font script="Syrc" typeface="Estrangelo Edessa"/>
+        <a:font script="Orya" typeface="Kalinga"/>
+        <a:font script="Mlym" typeface="Kartika"/>
+        <a:font script="Laoo" typeface="DokChampa"/>
+        <a:font script="Sinh" typeface="Iskoola Pota"/>
+        <a:font script="Mong" typeface="Mongolian Baiti"/>
+        <a:font script="Viet" typeface="Arial"/>
+        <a:font script="Uigh" typeface="Microsoft Uighur"/>
+        <a:font script="Geor" typeface="Sylfaen"/>
+        <a:font script="Armn" typeface="Arial"/>
+        <a:font script="Bugi" typeface="Leelawadee UI"/>
+        <a:font script="Bopo" typeface="Microsoft JhengHei"/>
+        <a:font script="Java" typeface="Javanese Text"/>
+        <a:font script="Lisu" typeface="Segoe UI"/>
+        <a:font script="Mymr" typeface="Myanmar Text"/>
+        <a:font script="Nkoo" typeface="Ebrima"/>
+        <a:font script="Olck" typeface="Nirmala UI"/>
+        <a:font script="Osma" typeface="Ebrima"/>
+        <a:font script="Phag" typeface="Phagspa"/>
+        <a:font script="Syrn" typeface="Estrangelo Edessa"/>
+        <a:font script="Syrj" typeface="Estrangelo Edessa"/>
+        <a:font script="Syre" typeface="Estrangelo Edessa"/>
+        <a:font script="Sora" typeface="Nirmala UI"/>
+        <a:font script="Tale" typeface="Microsoft Tai Le"/>
+        <a:font script="Talu" typeface="Microsoft New Tai Lue"/>
+        <a:font script="Tfng" typeface="Ebrima"/>
+      </a:minorFont>
+    </a:fontScheme>
+    <a:fmtScheme name="Office">
+      <a:fillStyleLst>
+        <a:solidFill>
+          <a:schemeClr val="phClr"/>
+        </a:solidFill>
+        <a:gradFill rotWithShape="1">
+          <a:gsLst>
+            <a:gs pos="0">
+              <a:schemeClr val="phClr">
+                <a:lumMod val="110000"/>
+                <a:satMod val="105000"/>
+                <a:tint val="67000"/>
+              </a:schemeClr>
+            </a:gs>
+            <a:gs pos="50000">
+              <a:schemeClr val="phClr">
+                <a:lumMod val="105000"/>
+                <a:satMod val="103000"/>
+                <a:tint val="73000"/>
+              </a:schemeClr>
+            </a:gs>
+            <a:gs pos="100000">
+              <a:schemeClr val="phClr">
+                <a:lumMod val="105000"/>
+                <a:satMod val="109000"/>
+                <a:tint val="81000"/>
+              </a:schemeClr>
+            </a:gs>
+          </a:gsLst>
+          <a:lin ang="5400000" scaled="0"/>
+        </a:gradFill>
+        <a:gradFill rotWithShape="1">
+          <a:gsLst>
+            <a:gs pos="0">
+              <a:schemeClr val="phClr">
+                <a:satMod val="103000"/>
+                <a:lumMod val="102000"/>
+                <a:tint val="94000"/>
+              </a:schemeClr>
+            </a:gs>
+            <a:gs pos="50000">
+              <a:schemeClr val="phClr">
+                <a:satMod val="110000"/>
+                <a:lumMod val="100000"/>
+                <a:shade val="100000"/>
+              </a:schemeClr>
+            </a:gs>
+            <a:gs pos="100000">
+              <a:schemeClr val="phClr">
+                <a:lumMod val="99000"/>
+                <a:satMod val="120000"/>
+                <a:shade val="78000"/>
+              </a:schemeClr>
+            </a:gs>
+          </a:gsLst>
+          <a:lin ang="5400000" scaled="0"/>
+        </a:gradFill>
+      </a:fillStyleLst>
+      <a:lnStyleLst>
+        <a:ln w="6350" cap="flat" cmpd="sng" algn="ctr">
+          <a:solidFill>
+            <a:schemeClr val="phClr"/>
+          </a:solidFill>
+          <a:prstDash val="solid"/>
+          <a:miter lim="800000"/>
+        </a:ln>
+        <a:ln w="12700" cap="flat" cmpd="sng" algn="ctr">
+          <a:solidFill>
+            <a:schemeClr val="phClr"/>
+          </a:solidFill>
+          <a:prstDash val="solid"/>
+          <a:miter lim="800000"/>
+        </a:ln>
+        <a:ln w="19050" cap="flat" cmpd="sng" algn="ctr">
+          <a:solidFill>
+            <a:schemeClr val="phClr"/>
+          </a:solidFill>
+          <a:prstDash val="solid"/>
+          <a:miter lim="800000"/>
+        </a:ln>
+      </a:lnStyleLst>
+      <a:effectStyleLst>
+        <a:effectStyle>
+          <a:effectLst/>
+        </a:effectStyle>
+        <a:effectStyle>
+          <a:effectLst/>
+        </a:effectStyle>
+        <a:effectStyle>
+          <a:effectLst>
+            <a:outerShdw blurRad="57150" dist="19050" dir="5400000" algn="ctr" rotWithShape="0">
+              <a:srgbClr val="000000">
+                <a:alpha val="63000"/>
+              </a:srgbClr>
+            </a:outerShdw>
+          </a:effectLst>
+        </a:effectStyle>
+      </a:effectStyleLst>
+      <a:bgFillStyleLst>
+        <a:solidFill>
+          <a:schemeClr val="phClr"/>
+        </a:solidFill>
+        <a:solidFill>
+          <a:schemeClr val="phClr">
+            <a:tint val="95000"/>
+            <a:satMod val="170000"/>
+          </a:schemeClr>
+        </a:solidFill>
+        <a:gradFill rotWithShape="1">
+          <a:gsLst>
+            <a:gs pos="0">
+              <a:schemeClr val="phClr">
+                <a:tint val="93000"/>
+                <a:satMod val="150000"/>
+                <a:shade val="98000"/>
+                <a:lumMod val="102000"/>
+              </a:schemeClr>
+            </a:gs>
+            <a:gs pos="50000">
+              <a:schemeClr val="phClr">
+                <a:tint val="98000"/>
+                <a:satMod val="130000"/>
+                <a:shade val="90000"/>
+                <a:lumMod val="103000"/>
+              </a:schemeClr>
+            </a:gs>
+            <a:gs pos="100000">
+              <a:schemeClr val="phClr">
+                <a:shade val="63000"/>
+                <a:satMod val="120000"/>
+              </a:schemeClr>
+            </a:gs>
+          </a:gsLst>
+          <a:lin ang="5400000" scaled="0"/>
+        </a:gradFill>
+      </a:bgFillStyleLst>
+    </a:fmtScheme>
+  </a:themeElements>
+  <a:objectDefaults/>
+  <a:extraClrSchemeLst/>
+  <a:extLst>
+    <a:ext uri="{05A4C25C-085E-4340-85A3-A5531E510DB2}">
+      <thm15:themeFamily xmlns:thm15="http://schemas.microsoft.com/office/thememl/2012/main" name="Office Theme" id="{62F939B6-93AF-4DB8-9C6B-D6C7DFDC589F}" vid="{4A3C46E8-61CC-4603-A589-7422A47A8E4A}"/>
+    </a:ext>
+  </a:extLst>
+</a:theme>
 </file>
</xml_diff>

<commit_message>
adding results for AIMS paper
</commit_message>
<xml_diff>
--- a/figures/AIMS_paper/AIMS_paperfigures.pptx
+++ b/figures/AIMS_paper/AIMS_paperfigures.pptx
@@ -5,7 +5,7 @@
     <p:sldMasterId id="2147483648" r:id="rId1"/>
   </p:sldMasterIdLst>
   <p:notesMasterIdLst>
-    <p:notesMasterId r:id="rId13"/>
+    <p:notesMasterId r:id="rId14"/>
   </p:notesMasterIdLst>
   <p:sldIdLst>
     <p:sldId id="256" r:id="rId2"/>
@@ -14,11 +14,12 @@
     <p:sldId id="266" r:id="rId5"/>
     <p:sldId id="257" r:id="rId6"/>
     <p:sldId id="258" r:id="rId7"/>
-    <p:sldId id="259" r:id="rId8"/>
-    <p:sldId id="264" r:id="rId9"/>
-    <p:sldId id="260" r:id="rId10"/>
-    <p:sldId id="261" r:id="rId11"/>
-    <p:sldId id="262" r:id="rId12"/>
+    <p:sldId id="267" r:id="rId8"/>
+    <p:sldId id="259" r:id="rId9"/>
+    <p:sldId id="264" r:id="rId10"/>
+    <p:sldId id="260" r:id="rId11"/>
+    <p:sldId id="261" r:id="rId12"/>
+    <p:sldId id="262" r:id="rId13"/>
   </p:sldIdLst>
   <p:sldSz cx="12192000" cy="6858000"/>
   <p:notesSz cx="6858000" cy="9144000"/>
@@ -207,7 +208,7 @@
           <a:p>
             <a:fld id="{F860DE22-8EB4-A842-81DB-4420B7344D07}" type="datetimeFigureOut">
               <a:rPr lang="en-US" smtClean="0"/>
-              <a:t>10/30/23</a:t>
+              <a:t>11/8/23</a:t>
             </a:fld>
             <a:endParaRPr lang="en-US"/>
           </a:p>
@@ -520,7 +521,7 @@
           <a:p>
             <a:r>
               <a:rPr lang="en-US" dirty="0"/>
-              <a:t>Need to check for Study 2</a:t>
+              <a:t>How do we account for the fact that there are more questions on Unhealthy compared to Healthy?</a:t>
             </a:r>
           </a:p>
         </p:txBody>
@@ -656,7 +657,7 @@
           <a:p>
             <a:fld id="{AF63139F-56CF-E940-954B-77D17CA4B5B2}" type="slidenum">
               <a:rPr lang="en-US" smtClean="0"/>
-              <a:t>10</a:t>
+              <a:t>11</a:t>
             </a:fld>
             <a:endParaRPr lang="en-US"/>
           </a:p>
@@ -822,7 +823,7 @@
           <a:p>
             <a:fld id="{373D3AA0-5CD8-A64D-B5E6-377EEDA896B2}" type="datetimeFigureOut">
               <a:rPr lang="en-US" smtClean="0"/>
-              <a:t>10/30/23</a:t>
+              <a:t>11/8/23</a:t>
             </a:fld>
             <a:endParaRPr lang="en-US"/>
           </a:p>
@@ -1020,7 +1021,7 @@
           <a:p>
             <a:fld id="{373D3AA0-5CD8-A64D-B5E6-377EEDA896B2}" type="datetimeFigureOut">
               <a:rPr lang="en-US" smtClean="0"/>
-              <a:t>10/30/23</a:t>
+              <a:t>11/8/23</a:t>
             </a:fld>
             <a:endParaRPr lang="en-US"/>
           </a:p>
@@ -1228,7 +1229,7 @@
           <a:p>
             <a:fld id="{373D3AA0-5CD8-A64D-B5E6-377EEDA896B2}" type="datetimeFigureOut">
               <a:rPr lang="en-US" smtClean="0"/>
-              <a:t>10/30/23</a:t>
+              <a:t>11/8/23</a:t>
             </a:fld>
             <a:endParaRPr lang="en-US"/>
           </a:p>
@@ -1426,7 +1427,7 @@
           <a:p>
             <a:fld id="{373D3AA0-5CD8-A64D-B5E6-377EEDA896B2}" type="datetimeFigureOut">
               <a:rPr lang="en-US" smtClean="0"/>
-              <a:t>10/30/23</a:t>
+              <a:t>11/8/23</a:t>
             </a:fld>
             <a:endParaRPr lang="en-US"/>
           </a:p>
@@ -1701,7 +1702,7 @@
           <a:p>
             <a:fld id="{373D3AA0-5CD8-A64D-B5E6-377EEDA896B2}" type="datetimeFigureOut">
               <a:rPr lang="en-US" smtClean="0"/>
-              <a:t>10/30/23</a:t>
+              <a:t>11/8/23</a:t>
             </a:fld>
             <a:endParaRPr lang="en-US"/>
           </a:p>
@@ -1966,7 +1967,7 @@
           <a:p>
             <a:fld id="{373D3AA0-5CD8-A64D-B5E6-377EEDA896B2}" type="datetimeFigureOut">
               <a:rPr lang="en-US" smtClean="0"/>
-              <a:t>10/30/23</a:t>
+              <a:t>11/8/23</a:t>
             </a:fld>
             <a:endParaRPr lang="en-US"/>
           </a:p>
@@ -2378,7 +2379,7 @@
           <a:p>
             <a:fld id="{373D3AA0-5CD8-A64D-B5E6-377EEDA896B2}" type="datetimeFigureOut">
               <a:rPr lang="en-US" smtClean="0"/>
-              <a:t>10/30/23</a:t>
+              <a:t>11/8/23</a:t>
             </a:fld>
             <a:endParaRPr lang="en-US"/>
           </a:p>
@@ -2519,7 +2520,7 @@
           <a:p>
             <a:fld id="{373D3AA0-5CD8-A64D-B5E6-377EEDA896B2}" type="datetimeFigureOut">
               <a:rPr lang="en-US" smtClean="0"/>
-              <a:t>10/30/23</a:t>
+              <a:t>11/8/23</a:t>
             </a:fld>
             <a:endParaRPr lang="en-US"/>
           </a:p>
@@ -2632,7 +2633,7 @@
           <a:p>
             <a:fld id="{373D3AA0-5CD8-A64D-B5E6-377EEDA896B2}" type="datetimeFigureOut">
               <a:rPr lang="en-US" smtClean="0"/>
-              <a:t>10/30/23</a:t>
+              <a:t>11/8/23</a:t>
             </a:fld>
             <a:endParaRPr lang="en-US"/>
           </a:p>
@@ -2943,7 +2944,7 @@
           <a:p>
             <a:fld id="{373D3AA0-5CD8-A64D-B5E6-377EEDA896B2}" type="datetimeFigureOut">
               <a:rPr lang="en-US" smtClean="0"/>
-              <a:t>10/30/23</a:t>
+              <a:t>11/8/23</a:t>
             </a:fld>
             <a:endParaRPr lang="en-US"/>
           </a:p>
@@ -3231,7 +3232,7 @@
           <a:p>
             <a:fld id="{373D3AA0-5CD8-A64D-B5E6-377EEDA896B2}" type="datetimeFigureOut">
               <a:rPr lang="en-US" smtClean="0"/>
-              <a:t>10/30/23</a:t>
+              <a:t>11/8/23</a:t>
             </a:fld>
             <a:endParaRPr lang="en-US"/>
           </a:p>
@@ -3472,7 +3473,7 @@
           <a:p>
             <a:fld id="{373D3AA0-5CD8-A64D-B5E6-377EEDA896B2}" type="datetimeFigureOut">
               <a:rPr lang="en-US" smtClean="0"/>
-              <a:t>10/30/23</a:t>
+              <a:t>11/8/23</a:t>
             </a:fld>
             <a:endParaRPr lang="en-US"/>
           </a:p>
@@ -3952,6 +3953,106 @@
           <p:cNvPr id="2" name="Title 1">
             <a:extLst>
               <a:ext uri="{FF2B5EF4-FFF2-40B4-BE49-F238E27FC236}">
+                <a16:creationId xmlns:a16="http://schemas.microsoft.com/office/drawing/2014/main" id="{6AB496C7-BDD1-98A1-BB24-B9AC7FEBF76F}"/>
+              </a:ext>
+            </a:extLst>
+          </p:cNvPr>
+          <p:cNvSpPr>
+            <a:spLocks noGrp="1"/>
+          </p:cNvSpPr>
+          <p:nvPr>
+            <p:ph type="title"/>
+          </p:nvPr>
+        </p:nvSpPr>
+        <p:spPr/>
+        <p:txBody>
+          <a:bodyPr>
+            <a:normAutofit/>
+          </a:bodyPr>
+          <a:lstStyle/>
+          <a:p>
+            <a:r>
+              <a:rPr lang="en-US" sz="3200" dirty="0">
+                <a:solidFill>
+                  <a:srgbClr val="000000"/>
+                </a:solidFill>
+              </a:rPr>
+              <a:t>Conceptual replication of CHAOS &amp; threat associations with absorption (via AIMS)</a:t>
+            </a:r>
+            <a:endParaRPr lang="en-US" sz="3200" dirty="0"/>
+          </a:p>
+        </p:txBody>
+      </p:sp>
+      <p:pic>
+        <p:nvPicPr>
+          <p:cNvPr id="4" name="Picture 3">
+            <a:extLst>
+              <a:ext uri="{FF2B5EF4-FFF2-40B4-BE49-F238E27FC236}">
+                <a16:creationId xmlns:a16="http://schemas.microsoft.com/office/drawing/2014/main" id="{A3D53FC9-EF33-66A7-656E-7FC502F9BE81}"/>
+              </a:ext>
+            </a:extLst>
+          </p:cNvPr>
+          <p:cNvPicPr>
+            <a:picLocks noChangeAspect="1"/>
+          </p:cNvPicPr>
+          <p:nvPr/>
+        </p:nvPicPr>
+        <p:blipFill rotWithShape="1">
+          <a:blip r:embed="rId2">
+            <a:extLst>
+              <a:ext uri="{28A0092B-C50C-407E-A947-70E740481C1C}">
+                <a14:useLocalDpi xmlns:a14="http://schemas.microsoft.com/office/drawing/2010/main" val="0"/>
+              </a:ext>
+            </a:extLst>
+          </a:blip>
+          <a:srcRect t="16078" b="12960"/>
+          <a:stretch/>
+        </p:blipFill>
+        <p:spPr>
+          <a:xfrm>
+            <a:off x="3272140" y="1906241"/>
+            <a:ext cx="6201044" cy="4400367"/>
+          </a:xfrm>
+          <a:prstGeom prst="rect">
+            <a:avLst/>
+          </a:prstGeom>
+        </p:spPr>
+      </p:pic>
+    </p:spTree>
+    <p:extLst>
+      <p:ext uri="{BB962C8B-B14F-4D97-AF65-F5344CB8AC3E}">
+        <p14:creationId xmlns:p14="http://schemas.microsoft.com/office/powerpoint/2010/main" val="667018637"/>
+      </p:ext>
+    </p:extLst>
+  </p:cSld>
+  <p:clrMapOvr>
+    <a:masterClrMapping/>
+  </p:clrMapOvr>
+</p:sld>
+</file>
+
+<file path=ppt/slides/slide11.xml><?xml version="1.0" encoding="utf-8"?>
+<p:sld xmlns:a="http://schemas.openxmlformats.org/drawingml/2006/main" xmlns:r="http://schemas.openxmlformats.org/officeDocument/2006/relationships" xmlns:p="http://schemas.openxmlformats.org/presentationml/2006/main">
+  <p:cSld>
+    <p:spTree>
+      <p:nvGrpSpPr>
+        <p:cNvPr id="1" name=""/>
+        <p:cNvGrpSpPr/>
+        <p:nvPr/>
+      </p:nvGrpSpPr>
+      <p:grpSpPr>
+        <a:xfrm>
+          <a:off x="0" y="0"/>
+          <a:ext cx="0" cy="0"/>
+          <a:chOff x="0" y="0"/>
+          <a:chExt cx="0" cy="0"/>
+        </a:xfrm>
+      </p:grpSpPr>
+      <p:sp>
+        <p:nvSpPr>
+          <p:cNvPr id="2" name="Title 1">
+            <a:extLst>
+              <a:ext uri="{FF2B5EF4-FFF2-40B4-BE49-F238E27FC236}">
                 <a16:creationId xmlns:a16="http://schemas.microsoft.com/office/drawing/2014/main" id="{F17B7E66-9999-1D14-D0E7-3A0F39500B18}"/>
               </a:ext>
             </a:extLst>
@@ -4031,7 +4132,7 @@
 </p:sld>
 </file>
 
-<file path=ppt/slides/slide11.xml><?xml version="1.0" encoding="utf-8"?>
+<file path=ppt/slides/slide12.xml><?xml version="1.0" encoding="utf-8"?>
 <p:sld xmlns:a="http://schemas.openxmlformats.org/drawingml/2006/main" xmlns:r="http://schemas.openxmlformats.org/officeDocument/2006/relationships" xmlns:p="http://schemas.openxmlformats.org/presentationml/2006/main">
   <p:cSld>
     <p:spTree>
@@ -4806,7 +4907,7 @@
                   <a:srgbClr val="000000"/>
                 </a:solidFill>
               </a:rPr>
-              <a:t>Absorption into music positively related to both healthy &amp; unhealthy music usage</a:t>
+              <a:t>Study 1: Absorption related to both healthy + unhealthy music usage, but more strongly associated with healthy music usage</a:t>
             </a:r>
             <a:endParaRPr lang="en-US" sz="3200" dirty="0"/>
           </a:p>
@@ -4814,10 +4915,10 @@
       </p:sp>
       <p:pic>
         <p:nvPicPr>
-          <p:cNvPr id="4" name="Picture 3">
-            <a:extLst>
-              <a:ext uri="{FF2B5EF4-FFF2-40B4-BE49-F238E27FC236}">
-                <a16:creationId xmlns:a16="http://schemas.microsoft.com/office/drawing/2014/main" id="{F0452ACA-7F8B-44C1-9AC7-47318C1A96D9}"/>
+          <p:cNvPr id="12" name="Picture 11" descr="A graph of different colored lines&#10;&#10;Description automatically generated">
+            <a:extLst>
+              <a:ext uri="{FF2B5EF4-FFF2-40B4-BE49-F238E27FC236}">
+                <a16:creationId xmlns:a16="http://schemas.microsoft.com/office/drawing/2014/main" id="{D6917EA8-5D49-C9C9-8EBB-EA2659D6C4B7}"/>
               </a:ext>
             </a:extLst>
           </p:cNvPr>
@@ -4827,57 +4928,15 @@
           <p:nvPr/>
         </p:nvPicPr>
         <p:blipFill>
-          <a:blip r:embed="rId3">
-            <a:extLst>
-              <a:ext uri="{28A0092B-C50C-407E-A947-70E740481C1C}">
-                <a14:useLocalDpi xmlns:a14="http://schemas.microsoft.com/office/drawing/2010/main" val="0"/>
-              </a:ext>
-            </a:extLst>
-          </a:blip>
+          <a:blip r:embed="rId3"/>
           <a:stretch>
             <a:fillRect/>
           </a:stretch>
         </p:blipFill>
         <p:spPr>
           <a:xfrm>
-            <a:off x="1332157" y="2047303"/>
-            <a:ext cx="4117667" cy="4117667"/>
-          </a:xfrm>
-          <a:prstGeom prst="rect">
-            <a:avLst/>
-          </a:prstGeom>
-        </p:spPr>
-      </p:pic>
-      <p:pic>
-        <p:nvPicPr>
-          <p:cNvPr id="5" name="Picture 4">
-            <a:extLst>
-              <a:ext uri="{FF2B5EF4-FFF2-40B4-BE49-F238E27FC236}">
-                <a16:creationId xmlns:a16="http://schemas.microsoft.com/office/drawing/2014/main" id="{8F3567DD-E224-6756-95B1-068D35E8D83C}"/>
-              </a:ext>
-            </a:extLst>
-          </p:cNvPr>
-          <p:cNvPicPr>
-            <a:picLocks noChangeAspect="1"/>
-          </p:cNvPicPr>
-          <p:nvPr/>
-        </p:nvPicPr>
-        <p:blipFill>
-          <a:blip r:embed="rId4">
-            <a:extLst>
-              <a:ext uri="{28A0092B-C50C-407E-A947-70E740481C1C}">
-                <a14:useLocalDpi xmlns:a14="http://schemas.microsoft.com/office/drawing/2010/main" val="0"/>
-              </a:ext>
-            </a:extLst>
-          </a:blip>
-          <a:stretch>
-            <a:fillRect/>
-          </a:stretch>
-        </p:blipFill>
-        <p:spPr>
-          <a:xfrm>
-            <a:off x="6742176" y="2047304"/>
-            <a:ext cx="4117667" cy="4117667"/>
+            <a:off x="2895600" y="1574800"/>
+            <a:ext cx="5054600" cy="5054600"/>
           </a:xfrm>
           <a:prstGeom prst="rect">
             <a:avLst/>
@@ -4919,6 +4978,99 @@
           <p:cNvPr id="2" name="Title 1">
             <a:extLst>
               <a:ext uri="{FF2B5EF4-FFF2-40B4-BE49-F238E27FC236}">
+                <a16:creationId xmlns:a16="http://schemas.microsoft.com/office/drawing/2014/main" id="{A3190345-97BC-7CC5-DC57-E4DB3EFC6265}"/>
+              </a:ext>
+            </a:extLst>
+          </p:cNvPr>
+          <p:cNvSpPr>
+            <a:spLocks noGrp="1"/>
+          </p:cNvSpPr>
+          <p:nvPr>
+            <p:ph type="title"/>
+          </p:nvPr>
+        </p:nvSpPr>
+        <p:spPr>
+          <a:xfrm>
+            <a:off x="838200" y="0"/>
+            <a:ext cx="10515600" cy="1325563"/>
+          </a:xfrm>
+        </p:spPr>
+        <p:txBody>
+          <a:bodyPr/>
+          <a:lstStyle/>
+          <a:p>
+            <a:r>
+              <a:rPr lang="en-US" dirty="0"/>
+              <a:t>Study 2 Conceptual Replication</a:t>
+            </a:r>
+          </a:p>
+        </p:txBody>
+      </p:sp>
+      <p:pic>
+        <p:nvPicPr>
+          <p:cNvPr id="12" name="Picture 11" descr="A graph of a music score&#10;&#10;Description automatically generated with medium confidence">
+            <a:extLst>
+              <a:ext uri="{FF2B5EF4-FFF2-40B4-BE49-F238E27FC236}">
+                <a16:creationId xmlns:a16="http://schemas.microsoft.com/office/drawing/2014/main" id="{3A252C55-C523-F653-E375-06ADDCBAF1FB}"/>
+              </a:ext>
+            </a:extLst>
+          </p:cNvPr>
+          <p:cNvPicPr>
+            <a:picLocks noChangeAspect="1"/>
+          </p:cNvPicPr>
+          <p:nvPr/>
+        </p:nvPicPr>
+        <p:blipFill>
+          <a:blip r:embed="rId2"/>
+          <a:stretch>
+            <a:fillRect/>
+          </a:stretch>
+        </p:blipFill>
+        <p:spPr>
+          <a:xfrm>
+            <a:off x="2933700" y="1325563"/>
+            <a:ext cx="5092700" cy="5092700"/>
+          </a:xfrm>
+          <a:prstGeom prst="rect">
+            <a:avLst/>
+          </a:prstGeom>
+        </p:spPr>
+      </p:pic>
+    </p:spTree>
+    <p:extLst>
+      <p:ext uri="{BB962C8B-B14F-4D97-AF65-F5344CB8AC3E}">
+        <p14:creationId xmlns:p14="http://schemas.microsoft.com/office/powerpoint/2010/main" val="2008467378"/>
+      </p:ext>
+    </p:extLst>
+  </p:cSld>
+  <p:clrMapOvr>
+    <a:masterClrMapping/>
+  </p:clrMapOvr>
+</p:sld>
+</file>
+
+<file path=ppt/slides/slide8.xml><?xml version="1.0" encoding="utf-8"?>
+<p:sld xmlns:a="http://schemas.openxmlformats.org/drawingml/2006/main" xmlns:r="http://schemas.openxmlformats.org/officeDocument/2006/relationships" xmlns:p="http://schemas.openxmlformats.org/presentationml/2006/main">
+  <p:cSld>
+    <p:spTree>
+      <p:nvGrpSpPr>
+        <p:cNvPr id="1" name=""/>
+        <p:cNvGrpSpPr/>
+        <p:nvPr/>
+      </p:nvGrpSpPr>
+      <p:grpSpPr>
+        <a:xfrm>
+          <a:off x="0" y="0"/>
+          <a:ext cx="0" cy="0"/>
+          <a:chOff x="0" y="0"/>
+          <a:chExt cx="0" cy="0"/>
+        </a:xfrm>
+      </p:grpSpPr>
+      <p:sp>
+        <p:nvSpPr>
+          <p:cNvPr id="2" name="Title 1">
+            <a:extLst>
+              <a:ext uri="{FF2B5EF4-FFF2-40B4-BE49-F238E27FC236}">
                 <a16:creationId xmlns:a16="http://schemas.microsoft.com/office/drawing/2014/main" id="{1C0B92B0-B777-087E-FF15-B5A5D74CDAAF}"/>
               </a:ext>
             </a:extLst>
@@ -5003,70 +5155,6 @@
 </p:sld>
 </file>
 
-<file path=ppt/slides/slide8.xml><?xml version="1.0" encoding="utf-8"?>
-<p:sld xmlns:a="http://schemas.openxmlformats.org/drawingml/2006/main" xmlns:r="http://schemas.openxmlformats.org/officeDocument/2006/relationships" xmlns:p="http://schemas.openxmlformats.org/presentationml/2006/main">
-  <p:cSld>
-    <p:spTree>
-      <p:nvGrpSpPr>
-        <p:cNvPr id="1" name=""/>
-        <p:cNvGrpSpPr/>
-        <p:nvPr/>
-      </p:nvGrpSpPr>
-      <p:grpSpPr>
-        <a:xfrm>
-          <a:off x="0" y="0"/>
-          <a:ext cx="0" cy="0"/>
-          <a:chOff x="0" y="0"/>
-          <a:chExt cx="0" cy="0"/>
-        </a:xfrm>
-      </p:grpSpPr>
-      <p:sp>
-        <p:nvSpPr>
-          <p:cNvPr id="2" name="Title 1">
-            <a:extLst>
-              <a:ext uri="{FF2B5EF4-FFF2-40B4-BE49-F238E27FC236}">
-                <a16:creationId xmlns:a16="http://schemas.microsoft.com/office/drawing/2014/main" id="{15E84D18-01E5-31EC-7C9A-668060D494A2}"/>
-              </a:ext>
-            </a:extLst>
-          </p:cNvPr>
-          <p:cNvSpPr>
-            <a:spLocks noGrp="1"/>
-          </p:cNvSpPr>
-          <p:nvPr>
-            <p:ph type="title"/>
-          </p:nvPr>
-        </p:nvSpPr>
-        <p:spPr>
-          <a:xfrm>
-            <a:off x="838200" y="2766218"/>
-            <a:ext cx="10515600" cy="1325563"/>
-          </a:xfrm>
-        </p:spPr>
-        <p:txBody>
-          <a:bodyPr/>
-          <a:lstStyle/>
-          <a:p>
-            <a:pPr algn="ctr"/>
-            <a:r>
-              <a:rPr lang="en-US" dirty="0"/>
-              <a:t>Study 2</a:t>
-            </a:r>
-          </a:p>
-        </p:txBody>
-      </p:sp>
-    </p:spTree>
-    <p:extLst>
-      <p:ext uri="{BB962C8B-B14F-4D97-AF65-F5344CB8AC3E}">
-        <p14:creationId xmlns:p14="http://schemas.microsoft.com/office/powerpoint/2010/main" val="3638951400"/>
-      </p:ext>
-    </p:extLst>
-  </p:cSld>
-  <p:clrMapOvr>
-    <a:masterClrMapping/>
-  </p:clrMapOvr>
-</p:sld>
-</file>
-
 <file path=ppt/slides/slide9.xml><?xml version="1.0" encoding="utf-8"?>
 <p:sld xmlns:a="http://schemas.openxmlformats.org/drawingml/2006/main" xmlns:r="http://schemas.openxmlformats.org/officeDocument/2006/relationships" xmlns:p="http://schemas.openxmlformats.org/presentationml/2006/main">
   <p:cSld>
@@ -5089,7 +5177,7 @@
           <p:cNvPr id="2" name="Title 1">
             <a:extLst>
               <a:ext uri="{FF2B5EF4-FFF2-40B4-BE49-F238E27FC236}">
-                <a16:creationId xmlns:a16="http://schemas.microsoft.com/office/drawing/2014/main" id="{6AB496C7-BDD1-98A1-BB24-B9AC7FEBF76F}"/>
+                <a16:creationId xmlns:a16="http://schemas.microsoft.com/office/drawing/2014/main" id="{15E84D18-01E5-31EC-7C9A-668060D494A2}"/>
               </a:ext>
             </a:extLst>
           </p:cNvPr>
@@ -5100,64 +5188,28 @@
             <p:ph type="title"/>
           </p:nvPr>
         </p:nvSpPr>
-        <p:spPr/>
-        <p:txBody>
-          <a:bodyPr>
-            <a:normAutofit/>
-          </a:bodyPr>
-          <a:lstStyle/>
-          <a:p>
-            <a:r>
-              <a:rPr lang="en-US" sz="3200" dirty="0">
-                <a:solidFill>
-                  <a:srgbClr val="000000"/>
-                </a:solidFill>
-              </a:rPr>
-              <a:t>Conceptual replication of CHAOS &amp; threat associations with absorption (via AIMS)</a:t>
-            </a:r>
-            <a:endParaRPr lang="en-US" sz="3200" dirty="0"/>
-          </a:p>
-        </p:txBody>
-      </p:sp>
-      <p:pic>
-        <p:nvPicPr>
-          <p:cNvPr id="4" name="Picture 3">
-            <a:extLst>
-              <a:ext uri="{FF2B5EF4-FFF2-40B4-BE49-F238E27FC236}">
-                <a16:creationId xmlns:a16="http://schemas.microsoft.com/office/drawing/2014/main" id="{A3D53FC9-EF33-66A7-656E-7FC502F9BE81}"/>
-              </a:ext>
-            </a:extLst>
-          </p:cNvPr>
-          <p:cNvPicPr>
-            <a:picLocks noChangeAspect="1"/>
-          </p:cNvPicPr>
-          <p:nvPr/>
-        </p:nvPicPr>
-        <p:blipFill rotWithShape="1">
-          <a:blip r:embed="rId2">
-            <a:extLst>
-              <a:ext uri="{28A0092B-C50C-407E-A947-70E740481C1C}">
-                <a14:useLocalDpi xmlns:a14="http://schemas.microsoft.com/office/drawing/2010/main" val="0"/>
-              </a:ext>
-            </a:extLst>
-          </a:blip>
-          <a:srcRect t="16078" b="12960"/>
-          <a:stretch/>
-        </p:blipFill>
         <p:spPr>
           <a:xfrm>
-            <a:off x="3272140" y="1906241"/>
-            <a:ext cx="6201044" cy="4400367"/>
+            <a:off x="838200" y="2766218"/>
+            <a:ext cx="10515600" cy="1325563"/>
           </a:xfrm>
-          <a:prstGeom prst="rect">
-            <a:avLst/>
-          </a:prstGeom>
         </p:spPr>
-      </p:pic>
+        <p:txBody>
+          <a:bodyPr/>
+          <a:lstStyle/>
+          <a:p>
+            <a:pPr algn="ctr"/>
+            <a:r>
+              <a:rPr lang="en-US" dirty="0"/>
+              <a:t>Study 2</a:t>
+            </a:r>
+          </a:p>
+        </p:txBody>
+      </p:sp>
     </p:spTree>
     <p:extLst>
       <p:ext uri="{BB962C8B-B14F-4D97-AF65-F5344CB8AC3E}">
-        <p14:creationId xmlns:p14="http://schemas.microsoft.com/office/powerpoint/2010/main" val="667018637"/>
+        <p14:creationId xmlns:p14="http://schemas.microsoft.com/office/powerpoint/2010/main" val="3638951400"/>
       </p:ext>
     </p:extLst>
   </p:cSld>

</xml_diff>

<commit_message>
updates to absorption plots
</commit_message>
<xml_diff>
--- a/figures/AIMS_paper/AIMS_paperfigures.pptx
+++ b/figures/AIMS_paper/AIMS_paperfigures.pptx
@@ -5,21 +5,18 @@
     <p:sldMasterId id="2147483648" r:id="rId1"/>
   </p:sldMasterIdLst>
   <p:notesMasterIdLst>
-    <p:notesMasterId r:id="rId14"/>
+    <p:notesMasterId r:id="rId11"/>
   </p:notesMasterIdLst>
   <p:sldIdLst>
     <p:sldId id="256" r:id="rId2"/>
-    <p:sldId id="263" r:id="rId3"/>
-    <p:sldId id="265" r:id="rId4"/>
-    <p:sldId id="266" r:id="rId5"/>
+    <p:sldId id="265" r:id="rId3"/>
+    <p:sldId id="266" r:id="rId4"/>
+    <p:sldId id="267" r:id="rId5"/>
     <p:sldId id="257" r:id="rId6"/>
     <p:sldId id="258" r:id="rId7"/>
-    <p:sldId id="267" r:id="rId8"/>
-    <p:sldId id="259" r:id="rId9"/>
-    <p:sldId id="264" r:id="rId10"/>
-    <p:sldId id="260" r:id="rId11"/>
-    <p:sldId id="261" r:id="rId12"/>
-    <p:sldId id="262" r:id="rId13"/>
+    <p:sldId id="259" r:id="rId8"/>
+    <p:sldId id="261" r:id="rId9"/>
+    <p:sldId id="262" r:id="rId10"/>
   </p:sldIdLst>
   <p:sldSz cx="12192000" cy="6858000"/>
   <p:notesSz cx="6858000" cy="9144000"/>
@@ -208,7 +205,7 @@
           <a:p>
             <a:fld id="{F860DE22-8EB4-A842-81DB-4420B7344D07}" type="datetimeFigureOut">
               <a:rPr lang="en-US" smtClean="0"/>
-              <a:t>11/8/23</a:t>
+              <a:t>11/13/23</a:t>
             </a:fld>
             <a:endParaRPr lang="en-US"/>
           </a:p>
@@ -519,10 +516,7 @@
           <a:bodyPr/>
           <a:lstStyle/>
           <a:p>
-            <a:r>
-              <a:rPr lang="en-US" dirty="0"/>
-              <a:t>How do we account for the fact that there are more questions on Unhealthy compared to Healthy?</a:t>
-            </a:r>
+            <a:endParaRPr lang="en-US" dirty="0"/>
           </a:p>
         </p:txBody>
       </p:sp>
@@ -543,7 +537,7 @@
           <a:p>
             <a:fld id="{AF63139F-56CF-E940-954B-77D17CA4B5B2}" type="slidenum">
               <a:rPr lang="en-US" smtClean="0"/>
-              <a:t>6</a:t>
+              <a:t>4</a:t>
             </a:fld>
             <a:endParaRPr lang="en-US"/>
           </a:p>
@@ -552,7 +546,7 @@
     </p:spTree>
     <p:extLst>
       <p:ext uri="{BB962C8B-B14F-4D97-AF65-F5344CB8AC3E}">
-        <p14:creationId xmlns:p14="http://schemas.microsoft.com/office/powerpoint/2010/main" val="3971914233"/>
+        <p14:creationId xmlns:p14="http://schemas.microsoft.com/office/powerpoint/2010/main" val="1514138945"/>
       </p:ext>
     </p:extLst>
   </p:cSld>
@@ -607,6 +601,177 @@
           <a:lstStyle/>
           <a:p>
             <a:r>
+              <a:rPr lang="en-US" dirty="0"/>
+              <a:t>How do we account for the fact that there are more questions on Unhealthy compared to Healthy?</a:t>
+            </a:r>
+          </a:p>
+        </p:txBody>
+      </p:sp>
+      <p:sp>
+        <p:nvSpPr>
+          <p:cNvPr id="4" name="Slide Number Placeholder 3"/>
+          <p:cNvSpPr>
+            <a:spLocks noGrp="1"/>
+          </p:cNvSpPr>
+          <p:nvPr>
+            <p:ph type="sldNum" sz="quarter" idx="5"/>
+          </p:nvPr>
+        </p:nvSpPr>
+        <p:spPr/>
+        <p:txBody>
+          <a:bodyPr/>
+          <a:lstStyle/>
+          <a:p>
+            <a:fld id="{AF63139F-56CF-E940-954B-77D17CA4B5B2}" type="slidenum">
+              <a:rPr lang="en-US" smtClean="0"/>
+              <a:t>6</a:t>
+            </a:fld>
+            <a:endParaRPr lang="en-US"/>
+          </a:p>
+        </p:txBody>
+      </p:sp>
+    </p:spTree>
+    <p:extLst>
+      <p:ext uri="{BB962C8B-B14F-4D97-AF65-F5344CB8AC3E}">
+        <p14:creationId xmlns:p14="http://schemas.microsoft.com/office/powerpoint/2010/main" val="3971914233"/>
+      </p:ext>
+    </p:extLst>
+  </p:cSld>
+  <p:clrMapOvr>
+    <a:masterClrMapping/>
+  </p:clrMapOvr>
+</p:notes>
+</file>
+
+<file path=ppt/notesSlides/notesSlide3.xml><?xml version="1.0" encoding="utf-8"?>
+<p:notes xmlns:a="http://schemas.openxmlformats.org/drawingml/2006/main" xmlns:r="http://schemas.openxmlformats.org/officeDocument/2006/relationships" xmlns:p="http://schemas.openxmlformats.org/presentationml/2006/main">
+  <p:cSld>
+    <p:spTree>
+      <p:nvGrpSpPr>
+        <p:cNvPr id="1" name=""/>
+        <p:cNvGrpSpPr/>
+        <p:nvPr/>
+      </p:nvGrpSpPr>
+      <p:grpSpPr>
+        <a:xfrm>
+          <a:off x="0" y="0"/>
+          <a:ext cx="0" cy="0"/>
+          <a:chOff x="0" y="0"/>
+          <a:chExt cx="0" cy="0"/>
+        </a:xfrm>
+      </p:grpSpPr>
+      <p:sp>
+        <p:nvSpPr>
+          <p:cNvPr id="2" name="Slide Image Placeholder 1"/>
+          <p:cNvSpPr>
+            <a:spLocks noGrp="1" noRot="1" noChangeAspect="1"/>
+          </p:cNvSpPr>
+          <p:nvPr>
+            <p:ph type="sldImg"/>
+          </p:nvPr>
+        </p:nvSpPr>
+        <p:spPr/>
+      </p:sp>
+      <p:sp>
+        <p:nvSpPr>
+          <p:cNvPr id="3" name="Notes Placeholder 2"/>
+          <p:cNvSpPr>
+            <a:spLocks noGrp="1"/>
+          </p:cNvSpPr>
+          <p:nvPr>
+            <p:ph type="body" idx="1"/>
+          </p:nvPr>
+        </p:nvSpPr>
+        <p:spPr/>
+        <p:txBody>
+          <a:bodyPr/>
+          <a:lstStyle/>
+          <a:p>
+            <a:endParaRPr lang="en-US"/>
+          </a:p>
+        </p:txBody>
+      </p:sp>
+      <p:sp>
+        <p:nvSpPr>
+          <p:cNvPr id="4" name="Slide Number Placeholder 3"/>
+          <p:cNvSpPr>
+            <a:spLocks noGrp="1"/>
+          </p:cNvSpPr>
+          <p:nvPr>
+            <p:ph type="sldNum" sz="quarter" idx="5"/>
+          </p:nvPr>
+        </p:nvSpPr>
+        <p:spPr/>
+        <p:txBody>
+          <a:bodyPr/>
+          <a:lstStyle/>
+          <a:p>
+            <a:fld id="{AF63139F-56CF-E940-954B-77D17CA4B5B2}" type="slidenum">
+              <a:rPr lang="en-US" smtClean="0"/>
+              <a:t>7</a:t>
+            </a:fld>
+            <a:endParaRPr lang="en-US"/>
+          </a:p>
+        </p:txBody>
+      </p:sp>
+    </p:spTree>
+    <p:extLst>
+      <p:ext uri="{BB962C8B-B14F-4D97-AF65-F5344CB8AC3E}">
+        <p14:creationId xmlns:p14="http://schemas.microsoft.com/office/powerpoint/2010/main" val="133030558"/>
+      </p:ext>
+    </p:extLst>
+  </p:cSld>
+  <p:clrMapOvr>
+    <a:masterClrMapping/>
+  </p:clrMapOvr>
+</p:notes>
+</file>
+
+<file path=ppt/notesSlides/notesSlide4.xml><?xml version="1.0" encoding="utf-8"?>
+<p:notes xmlns:a="http://schemas.openxmlformats.org/drawingml/2006/main" xmlns:r="http://schemas.openxmlformats.org/officeDocument/2006/relationships" xmlns:p="http://schemas.openxmlformats.org/presentationml/2006/main">
+  <p:cSld>
+    <p:spTree>
+      <p:nvGrpSpPr>
+        <p:cNvPr id="1" name=""/>
+        <p:cNvGrpSpPr/>
+        <p:nvPr/>
+      </p:nvGrpSpPr>
+      <p:grpSpPr>
+        <a:xfrm>
+          <a:off x="0" y="0"/>
+          <a:ext cx="0" cy="0"/>
+          <a:chOff x="0" y="0"/>
+          <a:chExt cx="0" cy="0"/>
+        </a:xfrm>
+      </p:grpSpPr>
+      <p:sp>
+        <p:nvSpPr>
+          <p:cNvPr id="2" name="Slide Image Placeholder 1"/>
+          <p:cNvSpPr>
+            <a:spLocks noGrp="1" noRot="1" noChangeAspect="1"/>
+          </p:cNvSpPr>
+          <p:nvPr>
+            <p:ph type="sldImg"/>
+          </p:nvPr>
+        </p:nvSpPr>
+        <p:spPr/>
+      </p:sp>
+      <p:sp>
+        <p:nvSpPr>
+          <p:cNvPr id="3" name="Notes Placeholder 2"/>
+          <p:cNvSpPr>
+            <a:spLocks noGrp="1"/>
+          </p:cNvSpPr>
+          <p:nvPr>
+            <p:ph type="body" idx="1"/>
+          </p:nvPr>
+        </p:nvSpPr>
+        <p:spPr/>
+        <p:txBody>
+          <a:bodyPr/>
+          <a:lstStyle/>
+          <a:p>
+            <a:r>
               <a:rPr lang="en-US" sz="1800" b="0" i="0" u="none" strike="noStrike" dirty="0">
                 <a:solidFill>
                   <a:srgbClr val="000000"/>
@@ -657,7 +822,7 @@
           <a:p>
             <a:fld id="{AF63139F-56CF-E940-954B-77D17CA4B5B2}" type="slidenum">
               <a:rPr lang="en-US" smtClean="0"/>
-              <a:t>11</a:t>
+              <a:t>8</a:t>
             </a:fld>
             <a:endParaRPr lang="en-US"/>
           </a:p>
@@ -823,7 +988,7 @@
           <a:p>
             <a:fld id="{373D3AA0-5CD8-A64D-B5E6-377EEDA896B2}" type="datetimeFigureOut">
               <a:rPr lang="en-US" smtClean="0"/>
-              <a:t>11/8/23</a:t>
+              <a:t>11/13/23</a:t>
             </a:fld>
             <a:endParaRPr lang="en-US"/>
           </a:p>
@@ -1021,7 +1186,7 @@
           <a:p>
             <a:fld id="{373D3AA0-5CD8-A64D-B5E6-377EEDA896B2}" type="datetimeFigureOut">
               <a:rPr lang="en-US" smtClean="0"/>
-              <a:t>11/8/23</a:t>
+              <a:t>11/13/23</a:t>
             </a:fld>
             <a:endParaRPr lang="en-US"/>
           </a:p>
@@ -1229,7 +1394,7 @@
           <a:p>
             <a:fld id="{373D3AA0-5CD8-A64D-B5E6-377EEDA896B2}" type="datetimeFigureOut">
               <a:rPr lang="en-US" smtClean="0"/>
-              <a:t>11/8/23</a:t>
+              <a:t>11/13/23</a:t>
             </a:fld>
             <a:endParaRPr lang="en-US"/>
           </a:p>
@@ -1427,7 +1592,7 @@
           <a:p>
             <a:fld id="{373D3AA0-5CD8-A64D-B5E6-377EEDA896B2}" type="datetimeFigureOut">
               <a:rPr lang="en-US" smtClean="0"/>
-              <a:t>11/8/23</a:t>
+              <a:t>11/13/23</a:t>
             </a:fld>
             <a:endParaRPr lang="en-US"/>
           </a:p>
@@ -1702,7 +1867,7 @@
           <a:p>
             <a:fld id="{373D3AA0-5CD8-A64D-B5E6-377EEDA896B2}" type="datetimeFigureOut">
               <a:rPr lang="en-US" smtClean="0"/>
-              <a:t>11/8/23</a:t>
+              <a:t>11/13/23</a:t>
             </a:fld>
             <a:endParaRPr lang="en-US"/>
           </a:p>
@@ -1967,7 +2132,7 @@
           <a:p>
             <a:fld id="{373D3AA0-5CD8-A64D-B5E6-377EEDA896B2}" type="datetimeFigureOut">
               <a:rPr lang="en-US" smtClean="0"/>
-              <a:t>11/8/23</a:t>
+              <a:t>11/13/23</a:t>
             </a:fld>
             <a:endParaRPr lang="en-US"/>
           </a:p>
@@ -2379,7 +2544,7 @@
           <a:p>
             <a:fld id="{373D3AA0-5CD8-A64D-B5E6-377EEDA896B2}" type="datetimeFigureOut">
               <a:rPr lang="en-US" smtClean="0"/>
-              <a:t>11/8/23</a:t>
+              <a:t>11/13/23</a:t>
             </a:fld>
             <a:endParaRPr lang="en-US"/>
           </a:p>
@@ -2520,7 +2685,7 @@
           <a:p>
             <a:fld id="{373D3AA0-5CD8-A64D-B5E6-377EEDA896B2}" type="datetimeFigureOut">
               <a:rPr lang="en-US" smtClean="0"/>
-              <a:t>11/8/23</a:t>
+              <a:t>11/13/23</a:t>
             </a:fld>
             <a:endParaRPr lang="en-US"/>
           </a:p>
@@ -2633,7 +2798,7 @@
           <a:p>
             <a:fld id="{373D3AA0-5CD8-A64D-B5E6-377EEDA896B2}" type="datetimeFigureOut">
               <a:rPr lang="en-US" smtClean="0"/>
-              <a:t>11/8/23</a:t>
+              <a:t>11/13/23</a:t>
             </a:fld>
             <a:endParaRPr lang="en-US"/>
           </a:p>
@@ -2944,7 +3109,7 @@
           <a:p>
             <a:fld id="{373D3AA0-5CD8-A64D-B5E6-377EEDA896B2}" type="datetimeFigureOut">
               <a:rPr lang="en-US" smtClean="0"/>
-              <a:t>11/8/23</a:t>
+              <a:t>11/13/23</a:t>
             </a:fld>
             <a:endParaRPr lang="en-US"/>
           </a:p>
@@ -3232,7 +3397,7 @@
           <a:p>
             <a:fld id="{373D3AA0-5CD8-A64D-B5E6-377EEDA896B2}" type="datetimeFigureOut">
               <a:rPr lang="en-US" smtClean="0"/>
-              <a:t>11/8/23</a:t>
+              <a:t>11/13/23</a:t>
             </a:fld>
             <a:endParaRPr lang="en-US"/>
           </a:p>
@@ -3473,7 +3638,7 @@
           <a:p>
             <a:fld id="{373D3AA0-5CD8-A64D-B5E6-377EEDA896B2}" type="datetimeFigureOut">
               <a:rPr lang="en-US" smtClean="0"/>
-              <a:t>11/8/23</a:t>
+              <a:t>11/13/23</a:t>
             </a:fld>
             <a:endParaRPr lang="en-US"/>
           </a:p>
@@ -3931,307 +4096,6 @@
 </p:sld>
 </file>
 
-<file path=ppt/slides/slide10.xml><?xml version="1.0" encoding="utf-8"?>
-<p:sld xmlns:a="http://schemas.openxmlformats.org/drawingml/2006/main" xmlns:r="http://schemas.openxmlformats.org/officeDocument/2006/relationships" xmlns:p="http://schemas.openxmlformats.org/presentationml/2006/main">
-  <p:cSld>
-    <p:spTree>
-      <p:nvGrpSpPr>
-        <p:cNvPr id="1" name=""/>
-        <p:cNvGrpSpPr/>
-        <p:nvPr/>
-      </p:nvGrpSpPr>
-      <p:grpSpPr>
-        <a:xfrm>
-          <a:off x="0" y="0"/>
-          <a:ext cx="0" cy="0"/>
-          <a:chOff x="0" y="0"/>
-          <a:chExt cx="0" cy="0"/>
-        </a:xfrm>
-      </p:grpSpPr>
-      <p:sp>
-        <p:nvSpPr>
-          <p:cNvPr id="2" name="Title 1">
-            <a:extLst>
-              <a:ext uri="{FF2B5EF4-FFF2-40B4-BE49-F238E27FC236}">
-                <a16:creationId xmlns:a16="http://schemas.microsoft.com/office/drawing/2014/main" id="{6AB496C7-BDD1-98A1-BB24-B9AC7FEBF76F}"/>
-              </a:ext>
-            </a:extLst>
-          </p:cNvPr>
-          <p:cNvSpPr>
-            <a:spLocks noGrp="1"/>
-          </p:cNvSpPr>
-          <p:nvPr>
-            <p:ph type="title"/>
-          </p:nvPr>
-        </p:nvSpPr>
-        <p:spPr/>
-        <p:txBody>
-          <a:bodyPr>
-            <a:normAutofit/>
-          </a:bodyPr>
-          <a:lstStyle/>
-          <a:p>
-            <a:r>
-              <a:rPr lang="en-US" sz="3200" dirty="0">
-                <a:solidFill>
-                  <a:srgbClr val="000000"/>
-                </a:solidFill>
-              </a:rPr>
-              <a:t>Conceptual replication of CHAOS &amp; threat associations with absorption (via AIMS)</a:t>
-            </a:r>
-            <a:endParaRPr lang="en-US" sz="3200" dirty="0"/>
-          </a:p>
-        </p:txBody>
-      </p:sp>
-      <p:pic>
-        <p:nvPicPr>
-          <p:cNvPr id="4" name="Picture 3">
-            <a:extLst>
-              <a:ext uri="{FF2B5EF4-FFF2-40B4-BE49-F238E27FC236}">
-                <a16:creationId xmlns:a16="http://schemas.microsoft.com/office/drawing/2014/main" id="{A3D53FC9-EF33-66A7-656E-7FC502F9BE81}"/>
-              </a:ext>
-            </a:extLst>
-          </p:cNvPr>
-          <p:cNvPicPr>
-            <a:picLocks noChangeAspect="1"/>
-          </p:cNvPicPr>
-          <p:nvPr/>
-        </p:nvPicPr>
-        <p:blipFill rotWithShape="1">
-          <a:blip r:embed="rId2">
-            <a:extLst>
-              <a:ext uri="{28A0092B-C50C-407E-A947-70E740481C1C}">
-                <a14:useLocalDpi xmlns:a14="http://schemas.microsoft.com/office/drawing/2010/main" val="0"/>
-              </a:ext>
-            </a:extLst>
-          </a:blip>
-          <a:srcRect t="16078" b="12960"/>
-          <a:stretch/>
-        </p:blipFill>
-        <p:spPr>
-          <a:xfrm>
-            <a:off x="3272140" y="1906241"/>
-            <a:ext cx="6201044" cy="4400367"/>
-          </a:xfrm>
-          <a:prstGeom prst="rect">
-            <a:avLst/>
-          </a:prstGeom>
-        </p:spPr>
-      </p:pic>
-    </p:spTree>
-    <p:extLst>
-      <p:ext uri="{BB962C8B-B14F-4D97-AF65-F5344CB8AC3E}">
-        <p14:creationId xmlns:p14="http://schemas.microsoft.com/office/powerpoint/2010/main" val="667018637"/>
-      </p:ext>
-    </p:extLst>
-  </p:cSld>
-  <p:clrMapOvr>
-    <a:masterClrMapping/>
-  </p:clrMapOvr>
-</p:sld>
-</file>
-
-<file path=ppt/slides/slide11.xml><?xml version="1.0" encoding="utf-8"?>
-<p:sld xmlns:a="http://schemas.openxmlformats.org/drawingml/2006/main" xmlns:r="http://schemas.openxmlformats.org/officeDocument/2006/relationships" xmlns:p="http://schemas.openxmlformats.org/presentationml/2006/main">
-  <p:cSld>
-    <p:spTree>
-      <p:nvGrpSpPr>
-        <p:cNvPr id="1" name=""/>
-        <p:cNvGrpSpPr/>
-        <p:nvPr/>
-      </p:nvGrpSpPr>
-      <p:grpSpPr>
-        <a:xfrm>
-          <a:off x="0" y="0"/>
-          <a:ext cx="0" cy="0"/>
-          <a:chOff x="0" y="0"/>
-          <a:chExt cx="0" cy="0"/>
-        </a:xfrm>
-      </p:grpSpPr>
-      <p:sp>
-        <p:nvSpPr>
-          <p:cNvPr id="2" name="Title 1">
-            <a:extLst>
-              <a:ext uri="{FF2B5EF4-FFF2-40B4-BE49-F238E27FC236}">
-                <a16:creationId xmlns:a16="http://schemas.microsoft.com/office/drawing/2014/main" id="{F17B7E66-9999-1D14-D0E7-3A0F39500B18}"/>
-              </a:ext>
-            </a:extLst>
-          </p:cNvPr>
-          <p:cNvSpPr>
-            <a:spLocks noGrp="1"/>
-          </p:cNvSpPr>
-          <p:nvPr>
-            <p:ph type="title"/>
-          </p:nvPr>
-        </p:nvSpPr>
-        <p:spPr/>
-        <p:txBody>
-          <a:bodyPr>
-            <a:normAutofit/>
-          </a:bodyPr>
-          <a:lstStyle/>
-          <a:p>
-            <a:r>
-              <a:rPr lang="en-US" sz="3200" dirty="0">
-                <a:solidFill>
-                  <a:srgbClr val="000000"/>
-                </a:solidFill>
-              </a:rPr>
-              <a:t>Absorption into music associated with using music for escapism </a:t>
-            </a:r>
-            <a:endParaRPr lang="en-US" sz="3200" dirty="0"/>
-          </a:p>
-        </p:txBody>
-      </p:sp>
-      <p:pic>
-        <p:nvPicPr>
-          <p:cNvPr id="4" name="Picture 3">
-            <a:extLst>
-              <a:ext uri="{FF2B5EF4-FFF2-40B4-BE49-F238E27FC236}">
-                <a16:creationId xmlns:a16="http://schemas.microsoft.com/office/drawing/2014/main" id="{9076CF1D-1B20-829C-75A0-0E4AE579B2CC}"/>
-              </a:ext>
-            </a:extLst>
-          </p:cNvPr>
-          <p:cNvPicPr>
-            <a:picLocks noChangeAspect="1"/>
-          </p:cNvPicPr>
-          <p:nvPr/>
-        </p:nvPicPr>
-        <p:blipFill>
-          <a:blip r:embed="rId3">
-            <a:extLst>
-              <a:ext uri="{28A0092B-C50C-407E-A947-70E740481C1C}">
-                <a14:useLocalDpi xmlns:a14="http://schemas.microsoft.com/office/drawing/2010/main" val="0"/>
-              </a:ext>
-            </a:extLst>
-          </a:blip>
-          <a:stretch>
-            <a:fillRect/>
-          </a:stretch>
-        </p:blipFill>
-        <p:spPr>
-          <a:xfrm>
-            <a:off x="3355448" y="2161691"/>
-            <a:ext cx="5481104" cy="3836773"/>
-          </a:xfrm>
-          <a:prstGeom prst="rect">
-            <a:avLst/>
-          </a:prstGeom>
-        </p:spPr>
-      </p:pic>
-    </p:spTree>
-    <p:extLst>
-      <p:ext uri="{BB962C8B-B14F-4D97-AF65-F5344CB8AC3E}">
-        <p14:creationId xmlns:p14="http://schemas.microsoft.com/office/powerpoint/2010/main" val="3956141494"/>
-      </p:ext>
-    </p:extLst>
-  </p:cSld>
-  <p:clrMapOvr>
-    <a:masterClrMapping/>
-  </p:clrMapOvr>
-</p:sld>
-</file>
-
-<file path=ppt/slides/slide12.xml><?xml version="1.0" encoding="utf-8"?>
-<p:sld xmlns:a="http://schemas.openxmlformats.org/drawingml/2006/main" xmlns:r="http://schemas.openxmlformats.org/officeDocument/2006/relationships" xmlns:p="http://schemas.openxmlformats.org/presentationml/2006/main">
-  <p:cSld>
-    <p:spTree>
-      <p:nvGrpSpPr>
-        <p:cNvPr id="1" name=""/>
-        <p:cNvGrpSpPr/>
-        <p:nvPr/>
-      </p:nvGrpSpPr>
-      <p:grpSpPr>
-        <a:xfrm>
-          <a:off x="0" y="0"/>
-          <a:ext cx="0" cy="0"/>
-          <a:chOff x="0" y="0"/>
-          <a:chExt cx="0" cy="0"/>
-        </a:xfrm>
-      </p:grpSpPr>
-      <p:sp>
-        <p:nvSpPr>
-          <p:cNvPr id="2" name="Title 1">
-            <a:extLst>
-              <a:ext uri="{FF2B5EF4-FFF2-40B4-BE49-F238E27FC236}">
-                <a16:creationId xmlns:a16="http://schemas.microsoft.com/office/drawing/2014/main" id="{A075C297-C22E-60CC-8F6A-9C0AB8157215}"/>
-              </a:ext>
-            </a:extLst>
-          </p:cNvPr>
-          <p:cNvSpPr>
-            <a:spLocks noGrp="1"/>
-          </p:cNvSpPr>
-          <p:nvPr>
-            <p:ph type="title"/>
-          </p:nvPr>
-        </p:nvSpPr>
-        <p:spPr/>
-        <p:txBody>
-          <a:bodyPr>
-            <a:normAutofit/>
-          </a:bodyPr>
-          <a:lstStyle/>
-          <a:p>
-            <a:r>
-              <a:rPr lang="en-US" sz="3200" dirty="0">
-                <a:solidFill>
-                  <a:srgbClr val="000000"/>
-                </a:solidFill>
-              </a:rPr>
-              <a:t>Absorption mediates the relationship between CHAOS and resilience</a:t>
-            </a:r>
-            <a:endParaRPr lang="en-US" sz="3200" dirty="0"/>
-          </a:p>
-        </p:txBody>
-      </p:sp>
-      <p:pic>
-        <p:nvPicPr>
-          <p:cNvPr id="4" name="Picture 3">
-            <a:extLst>
-              <a:ext uri="{FF2B5EF4-FFF2-40B4-BE49-F238E27FC236}">
-                <a16:creationId xmlns:a16="http://schemas.microsoft.com/office/drawing/2014/main" id="{7608EBE1-D671-B28C-6D61-6737521F1EBE}"/>
-              </a:ext>
-            </a:extLst>
-          </p:cNvPr>
-          <p:cNvPicPr>
-            <a:picLocks noChangeAspect="1"/>
-          </p:cNvPicPr>
-          <p:nvPr/>
-        </p:nvPicPr>
-        <p:blipFill rotWithShape="1">
-          <a:blip r:embed="rId2">
-            <a:extLst>
-              <a:ext uri="{28A0092B-C50C-407E-A947-70E740481C1C}">
-                <a14:useLocalDpi xmlns:a14="http://schemas.microsoft.com/office/drawing/2010/main" val="0"/>
-              </a:ext>
-            </a:extLst>
-          </a:blip>
-          <a:srcRect t="7955" b="58712"/>
-          <a:stretch/>
-        </p:blipFill>
-        <p:spPr>
-          <a:xfrm>
-            <a:off x="3564075" y="2273000"/>
-            <a:ext cx="5063850" cy="4219875"/>
-          </a:xfrm>
-          <a:prstGeom prst="rect">
-            <a:avLst/>
-          </a:prstGeom>
-        </p:spPr>
-      </p:pic>
-    </p:spTree>
-    <p:extLst>
-      <p:ext uri="{BB962C8B-B14F-4D97-AF65-F5344CB8AC3E}">
-        <p14:creationId xmlns:p14="http://schemas.microsoft.com/office/powerpoint/2010/main" val="1933607349"/>
-      </p:ext>
-    </p:extLst>
-  </p:cSld>
-  <p:clrMapOvr>
-    <a:masterClrMapping/>
-  </p:clrMapOvr>
-</p:sld>
-</file>
-
 <file path=ppt/slides/slide2.xml><?xml version="1.0" encoding="utf-8"?>
 <p:sld xmlns:a="http://schemas.openxmlformats.org/drawingml/2006/main" xmlns:r="http://schemas.openxmlformats.org/officeDocument/2006/relationships" xmlns:p="http://schemas.openxmlformats.org/presentationml/2006/main">
   <p:cSld>
@@ -4254,7 +4118,7 @@
           <p:cNvPr id="2" name="Title 1">
             <a:extLst>
               <a:ext uri="{FF2B5EF4-FFF2-40B4-BE49-F238E27FC236}">
-                <a16:creationId xmlns:a16="http://schemas.microsoft.com/office/drawing/2014/main" id="{5AA4663C-931B-F83B-124B-7C72804B3895}"/>
+                <a16:creationId xmlns:a16="http://schemas.microsoft.com/office/drawing/2014/main" id="{34854B05-007E-DBB2-DFA3-57CF9C27B7B2}"/>
               </a:ext>
             </a:extLst>
           </p:cNvPr>
@@ -4267,7 +4131,7 @@
         </p:nvSpPr>
         <p:spPr>
           <a:xfrm>
-            <a:off x="838200" y="2766218"/>
+            <a:off x="838200" y="-101600"/>
             <a:ext cx="10515600" cy="1325563"/>
           </a:xfrm>
         </p:spPr>
@@ -4275,72 +4139,6 @@
           <a:bodyPr/>
           <a:lstStyle/>
           <a:p>
-            <a:pPr algn="ctr"/>
-            <a:r>
-              <a:rPr lang="en-US" dirty="0"/>
-              <a:t>Study 1</a:t>
-            </a:r>
-            <a:br>
-              <a:rPr lang="en-US" dirty="0"/>
-            </a:br>
-            <a:r>
-              <a:rPr lang="en-US" dirty="0"/>
-              <a:t>move to conceptual organization</a:t>
-            </a:r>
-          </a:p>
-        </p:txBody>
-      </p:sp>
-    </p:spTree>
-    <p:extLst>
-      <p:ext uri="{BB962C8B-B14F-4D97-AF65-F5344CB8AC3E}">
-        <p14:creationId xmlns:p14="http://schemas.microsoft.com/office/powerpoint/2010/main" val="1167645210"/>
-      </p:ext>
-    </p:extLst>
-  </p:cSld>
-  <p:clrMapOvr>
-    <a:masterClrMapping/>
-  </p:clrMapOvr>
-</p:sld>
-</file>
-
-<file path=ppt/slides/slide3.xml><?xml version="1.0" encoding="utf-8"?>
-<p:sld xmlns:a="http://schemas.openxmlformats.org/drawingml/2006/main" xmlns:r="http://schemas.openxmlformats.org/officeDocument/2006/relationships" xmlns:p="http://schemas.openxmlformats.org/presentationml/2006/main">
-  <p:cSld>
-    <p:spTree>
-      <p:nvGrpSpPr>
-        <p:cNvPr id="1" name=""/>
-        <p:cNvGrpSpPr/>
-        <p:nvPr/>
-      </p:nvGrpSpPr>
-      <p:grpSpPr>
-        <a:xfrm>
-          <a:off x="0" y="0"/>
-          <a:ext cx="0" cy="0"/>
-          <a:chOff x="0" y="0"/>
-          <a:chExt cx="0" cy="0"/>
-        </a:xfrm>
-      </p:grpSpPr>
-      <p:sp>
-        <p:nvSpPr>
-          <p:cNvPr id="2" name="Title 1">
-            <a:extLst>
-              <a:ext uri="{FF2B5EF4-FFF2-40B4-BE49-F238E27FC236}">
-                <a16:creationId xmlns:a16="http://schemas.microsoft.com/office/drawing/2014/main" id="{34854B05-007E-DBB2-DFA3-57CF9C27B7B2}"/>
-              </a:ext>
-            </a:extLst>
-          </p:cNvPr>
-          <p:cNvSpPr>
-            <a:spLocks noGrp="1"/>
-          </p:cNvSpPr>
-          <p:nvPr>
-            <p:ph type="title"/>
-          </p:nvPr>
-        </p:nvSpPr>
-        <p:spPr/>
-        <p:txBody>
-          <a:bodyPr/>
-          <a:lstStyle/>
-          <a:p>
             <a:r>
               <a:rPr lang="en-US" dirty="0"/>
               <a:t>Results Outline</a:t>
@@ -4364,7 +4162,12 @@
             <p:ph idx="1"/>
           </p:nvPr>
         </p:nvSpPr>
-        <p:spPr/>
+        <p:spPr>
+          <a:xfrm>
+            <a:off x="838200" y="1008062"/>
+            <a:ext cx="10515600" cy="4791075"/>
+          </a:xfrm>
+        </p:spPr>
         <p:txBody>
           <a:bodyPr>
             <a:noAutofit/>
@@ -4384,7 +4187,6 @@
                   <a:srgbClr val="000000"/>
                 </a:solidFill>
                 <a:effectLst/>
-                <a:latin typeface="Times New Roman" panose="02020603050405020304" pitchFamily="18" charset="0"/>
               </a:rPr>
               <a:t>More ELA → lower resilience + higher trait anxiety </a:t>
             </a:r>
@@ -4398,34 +4200,22 @@
               <a:buAutoNum type="arabicPeriod"/>
             </a:pPr>
             <a:r>
+              <a:rPr lang="en-US" sz="2200" b="0" i="0" u="none" strike="noStrike" dirty="0" err="1">
+                <a:solidFill>
+                  <a:srgbClr val="000000"/>
+                </a:solidFill>
+                <a:effectLst/>
+              </a:rPr>
+              <a:t>eBMRQ</a:t>
+            </a:r>
+            <a:r>
               <a:rPr lang="en-US" sz="2200" b="0" i="0" u="none" strike="noStrike" dirty="0">
                 <a:solidFill>
                   <a:srgbClr val="000000"/>
                 </a:solidFill>
                 <a:effectLst/>
-                <a:latin typeface="Times New Roman" panose="02020603050405020304" pitchFamily="18" charset="0"/>
               </a:rPr>
-              <a:t>Correlation matrix (</a:t>
-            </a:r>
-            <a:r>
-              <a:rPr lang="en-US" sz="2200" b="0" i="0" u="none" strike="noStrike" dirty="0" err="1">
-                <a:solidFill>
-                  <a:srgbClr val="000000"/>
-                </a:solidFill>
-                <a:effectLst/>
-                <a:latin typeface="Times New Roman" panose="02020603050405020304" pitchFamily="18" charset="0"/>
-              </a:rPr>
-              <a:t>eBMRQ</a:t>
-            </a:r>
-            <a:r>
-              <a:rPr lang="en-US" sz="2200" b="0" i="0" u="none" strike="noStrike" dirty="0">
-                <a:solidFill>
-                  <a:srgbClr val="000000"/>
-                </a:solidFill>
-                <a:effectLst/>
-                <a:latin typeface="Times New Roman" panose="02020603050405020304" pitchFamily="18" charset="0"/>
-              </a:rPr>
-              <a:t> + ELA) [study 1]: four block figure (AIMS + threat for both)</a:t>
+              <a:t> + ELA: four block figure (AIMS + threat/CHAOS for both studies)</a:t>
             </a:r>
           </a:p>
           <a:p>
@@ -4445,9 +4235,8 @@
                   <a:srgbClr val="000000"/>
                 </a:solidFill>
                 <a:effectLst/>
-                <a:latin typeface="Times New Roman" panose="02020603050405020304" pitchFamily="18" charset="0"/>
               </a:rPr>
-              <a:t>Correlation (?) replication (conceptual replication w/ AIMS → threat + chaos) [study 2]</a:t>
+              <a:t>HUMS ~ absorption [both studies; AIMS more related to positive music usage] (what is AIMS? This and next result) </a:t>
             </a:r>
           </a:p>
           <a:p>
@@ -4467,9 +4256,83 @@
                   <a:srgbClr val="000000"/>
                 </a:solidFill>
                 <a:effectLst/>
-                <a:latin typeface="Times New Roman" panose="02020603050405020304" pitchFamily="18" charset="0"/>
               </a:rPr>
-              <a:t>HUMS ~ absorption [try study 2]</a:t>
+              <a:t>Escapism ~ BMRQ + AIMS subscales (only sig. ‘Predictor’ is AIMS; use full score.</a:t>
+            </a:r>
+          </a:p>
+          <a:p>
+            <a:pPr lvl="1" fontAlgn="base">
+              <a:spcBef>
+                <a:spcPts val="0"/>
+              </a:spcBef>
+              <a:buFont typeface="+mj-lt"/>
+              <a:buAutoNum type="arabicPeriod"/>
+            </a:pPr>
+            <a:r>
+              <a:rPr lang="en-US" sz="1800" b="0" i="0" u="none" strike="noStrike" dirty="0">
+                <a:solidFill>
+                  <a:srgbClr val="000000"/>
+                </a:solidFill>
+                <a:effectLst/>
+              </a:rPr>
+              <a:t>interaction with </a:t>
+            </a:r>
+            <a:r>
+              <a:rPr lang="en-US" sz="1800" b="0" i="0" u="none" strike="noStrike" dirty="0" err="1">
+                <a:solidFill>
+                  <a:srgbClr val="000000"/>
+                </a:solidFill>
+                <a:effectLst/>
+              </a:rPr>
+              <a:t>pos+neg</a:t>
+            </a:r>
+            <a:r>
+              <a:rPr lang="en-US" sz="1800" b="0" i="0" u="none" strike="noStrike" dirty="0">
+                <a:solidFill>
+                  <a:srgbClr val="000000"/>
+                </a:solidFill>
+                <a:effectLst/>
+              </a:rPr>
+              <a:t> but with just AIMS</a:t>
+            </a:r>
+          </a:p>
+          <a:p>
+            <a:pPr lvl="1" fontAlgn="base">
+              <a:spcBef>
+                <a:spcPts val="0"/>
+              </a:spcBef>
+              <a:buFont typeface="+mj-lt"/>
+              <a:buAutoNum type="arabicPeriod"/>
+            </a:pPr>
+            <a:r>
+              <a:rPr lang="en-US" sz="1800" b="0" i="0" u="none" strike="noStrike" dirty="0">
+                <a:solidFill>
+                  <a:srgbClr val="000000"/>
+                </a:solidFill>
+                <a:effectLst/>
+              </a:rPr>
+              <a:t>Secondary analyses of </a:t>
+            </a:r>
+            <a:r>
+              <a:rPr lang="en-US" sz="1800" b="0" i="0" u="none" strike="noStrike" dirty="0">
+                <a:solidFill>
+                  <a:srgbClr val="000000"/>
+                </a:solidFill>
+                <a:effectLst/>
+                <a:highlight>
+                  <a:srgbClr val="FFFF00"/>
+                </a:highlight>
+              </a:rPr>
+              <a:t>using subscales of escapism [pos &amp; neg</a:t>
+            </a:r>
+            <a:r>
+              <a:rPr lang="en-US" sz="1800" b="0" i="0" u="none" strike="noStrike" dirty="0">
+                <a:solidFill>
+                  <a:srgbClr val="000000"/>
+                </a:solidFill>
+                <a:effectLst/>
+              </a:rPr>
+              <a:t>]</a:t>
             </a:r>
           </a:p>
           <a:p>
@@ -4484,44 +4347,13 @@
               <a:buAutoNum type="arabicPeriod"/>
             </a:pPr>
             <a:r>
-              <a:rPr lang="en-US" sz="2200" b="0" i="0" u="none" strike="noStrike" dirty="0" err="1">
-                <a:solidFill>
-                  <a:srgbClr val="000000"/>
-                </a:solidFill>
-                <a:effectLst/>
-                <a:latin typeface="Times New Roman" panose="02020603050405020304" pitchFamily="18" charset="0"/>
-              </a:rPr>
-              <a:t>Escapsim</a:t>
-            </a:r>
-            <a:r>
               <a:rPr lang="en-US" sz="2200" b="0" i="0" u="none" strike="noStrike" dirty="0">
                 <a:solidFill>
                   <a:srgbClr val="000000"/>
                 </a:solidFill>
                 <a:effectLst/>
-                <a:latin typeface="Times New Roman" panose="02020603050405020304" pitchFamily="18" charset="0"/>
               </a:rPr>
-              <a:t> ~ BMRQ + AIMS subscales (only sig. ‘Predictor’ is AIMS; use full score. Secondary analyses of using subscales of escapism [pos &amp; neg]; interaction with </a:t>
-            </a:r>
-            <a:r>
-              <a:rPr lang="en-US" sz="2200" b="0" i="0" u="none" strike="noStrike" dirty="0" err="1">
-                <a:solidFill>
-                  <a:srgbClr val="000000"/>
-                </a:solidFill>
-                <a:effectLst/>
-                <a:latin typeface="Times New Roman" panose="02020603050405020304" pitchFamily="18" charset="0"/>
-              </a:rPr>
-              <a:t>pos+neg</a:t>
-            </a:r>
-            <a:r>
-              <a:rPr lang="en-US" sz="2200" b="0" i="0" u="none" strike="noStrike" dirty="0">
-                <a:solidFill>
-                  <a:srgbClr val="000000"/>
-                </a:solidFill>
-                <a:effectLst/>
-                <a:latin typeface="Times New Roman" panose="02020603050405020304" pitchFamily="18" charset="0"/>
-              </a:rPr>
-              <a:t> but with just AIMS)</a:t>
+              <a:t>Absorption → resilience [both studies]</a:t>
             </a:r>
           </a:p>
           <a:p>
@@ -4541,40 +4373,31 @@
                   <a:srgbClr val="000000"/>
                 </a:solidFill>
                 <a:effectLst/>
-                <a:latin typeface="Times New Roman" panose="02020603050405020304" pitchFamily="18" charset="0"/>
               </a:rPr>
-              <a:t>Absorption → resilience</a:t>
-            </a:r>
-          </a:p>
-          <a:p>
-            <a:pPr rtl="0" fontAlgn="base">
-              <a:spcBef>
-                <a:spcPts val="0"/>
-              </a:spcBef>
-              <a:spcAft>
-                <a:spcPts val="0"/>
-              </a:spcAft>
-              <a:buFont typeface="+mj-lt"/>
-              <a:buAutoNum type="arabicPeriod"/>
-            </a:pPr>
+              <a:t>Mediation model (CHAOS - AIMS - resilience) / (</a:t>
+            </a:r>
+            <a:r>
+              <a:rPr lang="en-US" sz="2200" dirty="0">
+                <a:solidFill>
+                  <a:srgbClr val="000000"/>
+                </a:solidFill>
+                <a:highlight>
+                  <a:srgbClr val="FFFF00"/>
+                </a:highlight>
+              </a:rPr>
+              <a:t>check </a:t>
+            </a:r>
             <a:r>
               <a:rPr lang="en-US" sz="2200" b="0" i="0" u="none" strike="noStrike" dirty="0">
                 <a:solidFill>
                   <a:srgbClr val="000000"/>
                 </a:solidFill>
                 <a:effectLst/>
-                <a:latin typeface="Times New Roman" panose="02020603050405020304" pitchFamily="18" charset="0"/>
+                <a:highlight>
+                  <a:srgbClr val="FFFF00"/>
+                </a:highlight>
               </a:rPr>
-              <a:t>Mediation model (CHAOS - AIMS - resilience) / (</a:t>
-            </a:r>
-            <a:r>
-              <a:rPr lang="en-US" sz="2200" dirty="0">
-                <a:solidFill>
-                  <a:srgbClr val="000000"/>
-                </a:solidFill>
-                <a:latin typeface="Times New Roman" panose="02020603050405020304" pitchFamily="18" charset="0"/>
-              </a:rPr>
-              <a:t>check </a:t>
+              <a:t>STAI</a:t>
             </a:r>
             <a:r>
               <a:rPr lang="en-US" sz="2200" b="0" i="0" u="none" strike="noStrike" dirty="0">
@@ -4582,9 +4405,8 @@
                   <a:srgbClr val="000000"/>
                 </a:solidFill>
                 <a:effectLst/>
-                <a:latin typeface="Times New Roman" panose="02020603050405020304" pitchFamily="18" charset="0"/>
               </a:rPr>
-              <a:t>STAI)</a:t>
+              <a:t>)</a:t>
             </a:r>
           </a:p>
           <a:p>
@@ -4604,7 +4426,6 @@
                   <a:srgbClr val="000000"/>
                 </a:solidFill>
                 <a:effectLst/>
-                <a:latin typeface="Times New Roman" panose="02020603050405020304" pitchFamily="18" charset="0"/>
               </a:rPr>
               <a:t>N.s. for just childhood</a:t>
             </a:r>
@@ -4626,7 +4447,6 @@
                   <a:srgbClr val="000000"/>
                 </a:solidFill>
                 <a:effectLst/>
-                <a:latin typeface="Times New Roman" panose="02020603050405020304" pitchFamily="18" charset="0"/>
               </a:rPr>
               <a:t>Significant for adolescence</a:t>
             </a:r>
@@ -4648,9 +4468,113 @@
                   <a:srgbClr val="000000"/>
                 </a:solidFill>
                 <a:effectLst/>
-                <a:latin typeface="Times New Roman" panose="02020603050405020304" pitchFamily="18" charset="0"/>
               </a:rPr>
               <a:t>CHAOS mediation remained sig w/ age as a covariate (cite music reward decreasing of age/retrospective reporting could be confound)</a:t>
+            </a:r>
+          </a:p>
+          <a:p>
+            <a:pPr marL="457200" lvl="1" indent="0" rtl="0" fontAlgn="base">
+              <a:spcBef>
+                <a:spcPts val="0"/>
+              </a:spcBef>
+              <a:spcAft>
+                <a:spcPts val="0"/>
+              </a:spcAft>
+              <a:buNone/>
+            </a:pPr>
+            <a:endParaRPr lang="en-US" sz="2200" dirty="0">
+              <a:solidFill>
+                <a:srgbClr val="000000"/>
+              </a:solidFill>
+            </a:endParaRPr>
+          </a:p>
+          <a:p>
+            <a:pPr marL="457200" lvl="1" indent="0" rtl="0" fontAlgn="base">
+              <a:spcBef>
+                <a:spcPts val="0"/>
+              </a:spcBef>
+              <a:spcAft>
+                <a:spcPts val="0"/>
+              </a:spcAft>
+              <a:buNone/>
+            </a:pPr>
+            <a:r>
+              <a:rPr lang="en-US" sz="2200" dirty="0">
+                <a:solidFill>
+                  <a:srgbClr val="000000"/>
+                </a:solidFill>
+              </a:rPr>
+              <a:t>- could weave in temporally specific measures</a:t>
+            </a:r>
+          </a:p>
+          <a:p>
+            <a:pPr marL="457200" lvl="1" indent="0" rtl="0" fontAlgn="base">
+              <a:spcBef>
+                <a:spcPts val="0"/>
+              </a:spcBef>
+              <a:spcAft>
+                <a:spcPts val="0"/>
+              </a:spcAft>
+              <a:buNone/>
+            </a:pPr>
+            <a:r>
+              <a:rPr lang="en-US" sz="2200" dirty="0">
+                <a:solidFill>
+                  <a:srgbClr val="000000"/>
+                </a:solidFill>
+              </a:rPr>
+              <a:t>-consider </a:t>
+            </a:r>
+            <a:r>
+              <a:rPr lang="en-US" sz="2200" dirty="0" err="1">
+                <a:solidFill>
+                  <a:srgbClr val="000000"/>
+                </a:solidFill>
+              </a:rPr>
+              <a:t>goldMSI</a:t>
+            </a:r>
+            <a:r>
+              <a:rPr lang="en-US" sz="2200" dirty="0">
+                <a:solidFill>
+                  <a:srgbClr val="000000"/>
+                </a:solidFill>
+              </a:rPr>
+              <a:t> measures for specificity of AIMS effects (correlations w/ AIMS – explore w/ ELA/STAI/resilience)</a:t>
+            </a:r>
+          </a:p>
+          <a:p>
+            <a:pPr marL="457200" lvl="1" indent="0" rtl="0" fontAlgn="base">
+              <a:spcBef>
+                <a:spcPts val="0"/>
+              </a:spcBef>
+              <a:spcAft>
+                <a:spcPts val="0"/>
+              </a:spcAft>
+              <a:buNone/>
+            </a:pPr>
+            <a:r>
+              <a:rPr lang="en-US" sz="2200" dirty="0">
+                <a:solidFill>
+                  <a:srgbClr val="000000"/>
+                </a:solidFill>
+              </a:rPr>
+              <a:t>-was age related to any outcomes of interest outside of mediation model? (correlations w/ AIMS, </a:t>
+            </a:r>
+            <a:r>
+              <a:rPr lang="en-US" sz="2200" dirty="0" err="1">
+                <a:solidFill>
+                  <a:srgbClr val="000000"/>
+                </a:solidFill>
+              </a:rPr>
+              <a:t>eBMRQ</a:t>
+            </a:r>
+            <a:r>
+              <a:rPr lang="en-US" sz="2200" dirty="0">
+                <a:solidFill>
+                  <a:srgbClr val="000000"/>
+                </a:solidFill>
+              </a:rPr>
+              <a:t>[abs], STAI, resilience, escapism, HUMS)</a:t>
             </a:r>
           </a:p>
         </p:txBody>
@@ -4668,7 +4592,7 @@
 </p:sld>
 </file>
 
-<file path=ppt/slides/slide4.xml><?xml version="1.0" encoding="utf-8"?>
+<file path=ppt/slides/slide3.xml><?xml version="1.0" encoding="utf-8"?>
 <p:sld xmlns:a="http://schemas.openxmlformats.org/drawingml/2006/main" xmlns:r="http://schemas.openxmlformats.org/officeDocument/2006/relationships" xmlns:p="http://schemas.openxmlformats.org/presentationml/2006/main">
   <p:cSld>
     <p:spTree>
@@ -4756,6 +4680,483 @@
 </p:sld>
 </file>
 
+<file path=ppt/slides/slide4.xml><?xml version="1.0" encoding="utf-8"?>
+<p:sld xmlns:a="http://schemas.openxmlformats.org/drawingml/2006/main" xmlns:r="http://schemas.openxmlformats.org/officeDocument/2006/relationships" xmlns:p="http://schemas.openxmlformats.org/presentationml/2006/main">
+  <p:cSld>
+    <p:spTree>
+      <p:nvGrpSpPr>
+        <p:cNvPr id="1" name=""/>
+        <p:cNvGrpSpPr/>
+        <p:nvPr/>
+      </p:nvGrpSpPr>
+      <p:grpSpPr>
+        <a:xfrm>
+          <a:off x="0" y="0"/>
+          <a:ext cx="0" cy="0"/>
+          <a:chOff x="0" y="0"/>
+          <a:chExt cx="0" cy="0"/>
+        </a:xfrm>
+      </p:grpSpPr>
+      <p:sp>
+        <p:nvSpPr>
+          <p:cNvPr id="8" name="Title 1">
+            <a:extLst>
+              <a:ext uri="{FF2B5EF4-FFF2-40B4-BE49-F238E27FC236}">
+                <a16:creationId xmlns:a16="http://schemas.microsoft.com/office/drawing/2014/main" id="{780234DF-18DC-1AC0-5C6F-95EF6924A3A8}"/>
+              </a:ext>
+            </a:extLst>
+          </p:cNvPr>
+          <p:cNvSpPr>
+            <a:spLocks noGrp="1"/>
+          </p:cNvSpPr>
+          <p:nvPr>
+            <p:ph type="title"/>
+          </p:nvPr>
+        </p:nvSpPr>
+        <p:spPr>
+          <a:xfrm>
+            <a:off x="517994" y="-333435"/>
+            <a:ext cx="10515600" cy="1325563"/>
+          </a:xfrm>
+        </p:spPr>
+        <p:txBody>
+          <a:bodyPr/>
+          <a:lstStyle/>
+          <a:p>
+            <a:r>
+              <a:rPr lang="en-US" dirty="0"/>
+              <a:t>ELA &amp; Absorption Correlations</a:t>
+            </a:r>
+          </a:p>
+        </p:txBody>
+      </p:sp>
+      <p:grpSp>
+        <p:nvGrpSpPr>
+          <p:cNvPr id="11" name="Group 10">
+            <a:extLst>
+              <a:ext uri="{FF2B5EF4-FFF2-40B4-BE49-F238E27FC236}">
+                <a16:creationId xmlns:a16="http://schemas.microsoft.com/office/drawing/2014/main" id="{23D9DE74-0682-8351-016D-F4C9D69173BE}"/>
+              </a:ext>
+            </a:extLst>
+          </p:cNvPr>
+          <p:cNvGrpSpPr/>
+          <p:nvPr/>
+        </p:nvGrpSpPr>
+        <p:grpSpPr>
+          <a:xfrm>
+            <a:off x="517994" y="1216959"/>
+            <a:ext cx="6558147" cy="2709582"/>
+            <a:chOff x="838200" y="2420471"/>
+            <a:chExt cx="6558147" cy="2709582"/>
+          </a:xfrm>
+        </p:grpSpPr>
+        <p:pic>
+          <p:nvPicPr>
+            <p:cNvPr id="7" name="Picture 6" descr="A graph with a line and a blue line&#10;&#10;Description automatically generated">
+              <a:extLst>
+                <a:ext uri="{FF2B5EF4-FFF2-40B4-BE49-F238E27FC236}">
+                  <a16:creationId xmlns:a16="http://schemas.microsoft.com/office/drawing/2014/main" id="{C55324F2-A595-6E77-4724-2D54CC1CB39E}"/>
+                </a:ext>
+              </a:extLst>
+            </p:cNvPr>
+            <p:cNvPicPr>
+              <a:picLocks noChangeAspect="1"/>
+            </p:cNvPicPr>
+            <p:nvPr/>
+          </p:nvPicPr>
+          <p:blipFill>
+            <a:blip r:embed="rId3"/>
+            <a:stretch>
+              <a:fillRect/>
+            </a:stretch>
+          </p:blipFill>
+          <p:spPr>
+            <a:xfrm>
+              <a:off x="838200" y="2420471"/>
+              <a:ext cx="2709582" cy="2709582"/>
+            </a:xfrm>
+            <a:prstGeom prst="rect">
+              <a:avLst/>
+            </a:prstGeom>
+          </p:spPr>
+        </p:pic>
+        <p:sp>
+          <p:nvSpPr>
+            <p:cNvPr id="9" name="TextBox 8">
+              <a:extLst>
+                <a:ext uri="{FF2B5EF4-FFF2-40B4-BE49-F238E27FC236}">
+                  <a16:creationId xmlns:a16="http://schemas.microsoft.com/office/drawing/2014/main" id="{BC14458E-EE1F-3EF9-B81F-DAB5414C54B2}"/>
+                </a:ext>
+              </a:extLst>
+            </p:cNvPr>
+            <p:cNvSpPr txBox="1"/>
+            <p:nvPr/>
+          </p:nvSpPr>
+          <p:spPr>
+            <a:xfrm>
+              <a:off x="2609408" y="4535890"/>
+              <a:ext cx="4786939" cy="369332"/>
+            </a:xfrm>
+            <a:prstGeom prst="rect">
+              <a:avLst/>
+            </a:prstGeom>
+            <a:noFill/>
+          </p:spPr>
+          <p:txBody>
+            <a:bodyPr wrap="square">
+              <a:spAutoFit/>
+            </a:bodyPr>
+            <a:lstStyle/>
+            <a:p>
+              <a:r>
+                <a:rPr lang="en-US" dirty="0"/>
+                <a:t>r = 0.15*</a:t>
+              </a:r>
+            </a:p>
+          </p:txBody>
+        </p:sp>
+      </p:grpSp>
+      <p:grpSp>
+        <p:nvGrpSpPr>
+          <p:cNvPr id="16" name="Group 15">
+            <a:extLst>
+              <a:ext uri="{FF2B5EF4-FFF2-40B4-BE49-F238E27FC236}">
+                <a16:creationId xmlns:a16="http://schemas.microsoft.com/office/drawing/2014/main" id="{51EDB44F-57C6-00A7-BF25-E8A64F260451}"/>
+              </a:ext>
+            </a:extLst>
+          </p:cNvPr>
+          <p:cNvGrpSpPr/>
+          <p:nvPr/>
+        </p:nvGrpSpPr>
+        <p:grpSpPr>
+          <a:xfrm>
+            <a:off x="3855953" y="1216959"/>
+            <a:ext cx="7818053" cy="2709582"/>
+            <a:chOff x="5151206" y="1727947"/>
+            <a:chExt cx="7818053" cy="2709582"/>
+          </a:xfrm>
+        </p:grpSpPr>
+        <p:pic>
+          <p:nvPicPr>
+            <p:cNvPr id="14" name="Picture 13" descr="A graph with a blue line&#10;&#10;Description automatically generated">
+              <a:extLst>
+                <a:ext uri="{FF2B5EF4-FFF2-40B4-BE49-F238E27FC236}">
+                  <a16:creationId xmlns:a16="http://schemas.microsoft.com/office/drawing/2014/main" id="{D8894368-7A78-1DC0-7D5E-48658252D604}"/>
+                </a:ext>
+              </a:extLst>
+            </p:cNvPr>
+            <p:cNvPicPr>
+              <a:picLocks noChangeAspect="1"/>
+            </p:cNvPicPr>
+            <p:nvPr/>
+          </p:nvPicPr>
+          <p:blipFill>
+            <a:blip r:embed="rId4"/>
+            <a:stretch>
+              <a:fillRect/>
+            </a:stretch>
+          </p:blipFill>
+          <p:spPr>
+            <a:xfrm>
+              <a:off x="5151206" y="1727947"/>
+              <a:ext cx="2709582" cy="2709582"/>
+            </a:xfrm>
+            <a:prstGeom prst="rect">
+              <a:avLst/>
+            </a:prstGeom>
+          </p:spPr>
+        </p:pic>
+        <p:sp>
+          <p:nvSpPr>
+            <p:cNvPr id="15" name="TextBox 14">
+              <a:extLst>
+                <a:ext uri="{FF2B5EF4-FFF2-40B4-BE49-F238E27FC236}">
+                  <a16:creationId xmlns:a16="http://schemas.microsoft.com/office/drawing/2014/main" id="{D93DA45C-D49A-9E1C-CFA8-0431EE352937}"/>
+                </a:ext>
+              </a:extLst>
+            </p:cNvPr>
+            <p:cNvSpPr txBox="1"/>
+            <p:nvPr/>
+          </p:nvSpPr>
+          <p:spPr>
+            <a:xfrm>
+              <a:off x="6873259" y="3820847"/>
+              <a:ext cx="6096000" cy="369332"/>
+            </a:xfrm>
+            <a:prstGeom prst="rect">
+              <a:avLst/>
+            </a:prstGeom>
+            <a:noFill/>
+          </p:spPr>
+          <p:txBody>
+            <a:bodyPr wrap="square">
+              <a:spAutoFit/>
+            </a:bodyPr>
+            <a:lstStyle/>
+            <a:p>
+              <a:r>
+                <a:rPr lang="en-US" dirty="0"/>
+                <a:t>r = 0.17**</a:t>
+              </a:r>
+            </a:p>
+          </p:txBody>
+        </p:sp>
+      </p:grpSp>
+      <p:grpSp>
+        <p:nvGrpSpPr>
+          <p:cNvPr id="22" name="Group 21">
+            <a:extLst>
+              <a:ext uri="{FF2B5EF4-FFF2-40B4-BE49-F238E27FC236}">
+                <a16:creationId xmlns:a16="http://schemas.microsoft.com/office/drawing/2014/main" id="{CB6428E3-0EA7-75B7-2EDD-3DBEADC55CCE}"/>
+              </a:ext>
+            </a:extLst>
+          </p:cNvPr>
+          <p:cNvGrpSpPr/>
+          <p:nvPr/>
+        </p:nvGrpSpPr>
+        <p:grpSpPr>
+          <a:xfrm>
+            <a:off x="517994" y="4148418"/>
+            <a:ext cx="6558147" cy="2709582"/>
+            <a:chOff x="517994" y="4148418"/>
+            <a:chExt cx="6558147" cy="2709582"/>
+          </a:xfrm>
+        </p:grpSpPr>
+        <p:pic>
+          <p:nvPicPr>
+            <p:cNvPr id="20" name="Picture 19" descr="A graph with black dots&#10;&#10;Description automatically generated">
+              <a:extLst>
+                <a:ext uri="{FF2B5EF4-FFF2-40B4-BE49-F238E27FC236}">
+                  <a16:creationId xmlns:a16="http://schemas.microsoft.com/office/drawing/2014/main" id="{F0EB2BAE-60D8-0331-48BE-2432D4378E2A}"/>
+                </a:ext>
+              </a:extLst>
+            </p:cNvPr>
+            <p:cNvPicPr>
+              <a:picLocks noChangeAspect="1"/>
+            </p:cNvPicPr>
+            <p:nvPr/>
+          </p:nvPicPr>
+          <p:blipFill>
+            <a:blip r:embed="rId5"/>
+            <a:stretch>
+              <a:fillRect/>
+            </a:stretch>
+          </p:blipFill>
+          <p:spPr>
+            <a:xfrm>
+              <a:off x="517994" y="4148418"/>
+              <a:ext cx="2709582" cy="2709582"/>
+            </a:xfrm>
+            <a:prstGeom prst="rect">
+              <a:avLst/>
+            </a:prstGeom>
+          </p:spPr>
+        </p:pic>
+        <p:sp>
+          <p:nvSpPr>
+            <p:cNvPr id="21" name="TextBox 20">
+              <a:extLst>
+                <a:ext uri="{FF2B5EF4-FFF2-40B4-BE49-F238E27FC236}">
+                  <a16:creationId xmlns:a16="http://schemas.microsoft.com/office/drawing/2014/main" id="{55505707-200F-FACD-63C2-BE4F891FD7F2}"/>
+                </a:ext>
+              </a:extLst>
+            </p:cNvPr>
+            <p:cNvSpPr txBox="1"/>
+            <p:nvPr/>
+          </p:nvSpPr>
+          <p:spPr>
+            <a:xfrm>
+              <a:off x="2289202" y="6244272"/>
+              <a:ext cx="4786939" cy="369332"/>
+            </a:xfrm>
+            <a:prstGeom prst="rect">
+              <a:avLst/>
+            </a:prstGeom>
+            <a:noFill/>
+          </p:spPr>
+          <p:txBody>
+            <a:bodyPr wrap="square">
+              <a:spAutoFit/>
+            </a:bodyPr>
+            <a:lstStyle/>
+            <a:p>
+              <a:r>
+                <a:rPr lang="en-US" dirty="0"/>
+                <a:t>r = 0.13*</a:t>
+              </a:r>
+            </a:p>
+          </p:txBody>
+        </p:sp>
+      </p:grpSp>
+      <p:grpSp>
+        <p:nvGrpSpPr>
+          <p:cNvPr id="28" name="Group 27">
+            <a:extLst>
+              <a:ext uri="{FF2B5EF4-FFF2-40B4-BE49-F238E27FC236}">
+                <a16:creationId xmlns:a16="http://schemas.microsoft.com/office/drawing/2014/main" id="{AB072196-6FBE-C5AE-7034-5A2865AF37C0}"/>
+              </a:ext>
+            </a:extLst>
+          </p:cNvPr>
+          <p:cNvGrpSpPr/>
+          <p:nvPr/>
+        </p:nvGrpSpPr>
+        <p:grpSpPr>
+          <a:xfrm>
+            <a:off x="3855953" y="4238737"/>
+            <a:ext cx="6508992" cy="2528943"/>
+            <a:chOff x="3855953" y="4238737"/>
+            <a:chExt cx="6508992" cy="2528943"/>
+          </a:xfrm>
+        </p:grpSpPr>
+        <p:pic>
+          <p:nvPicPr>
+            <p:cNvPr id="26" name="Picture 25" descr="A graph with black dots and blue line&#10;&#10;Description automatically generated">
+              <a:extLst>
+                <a:ext uri="{FF2B5EF4-FFF2-40B4-BE49-F238E27FC236}">
+                  <a16:creationId xmlns:a16="http://schemas.microsoft.com/office/drawing/2014/main" id="{4869D3B0-617B-8FB5-4533-DF177E08ABD1}"/>
+                </a:ext>
+              </a:extLst>
+            </p:cNvPr>
+            <p:cNvPicPr>
+              <a:picLocks noChangeAspect="1"/>
+            </p:cNvPicPr>
+            <p:nvPr/>
+          </p:nvPicPr>
+          <p:blipFill>
+            <a:blip r:embed="rId6"/>
+            <a:stretch>
+              <a:fillRect/>
+            </a:stretch>
+          </p:blipFill>
+          <p:spPr>
+            <a:xfrm>
+              <a:off x="3855953" y="4238737"/>
+              <a:ext cx="2709582" cy="2528943"/>
+            </a:xfrm>
+            <a:prstGeom prst="rect">
+              <a:avLst/>
+            </a:prstGeom>
+          </p:spPr>
+        </p:pic>
+        <p:sp>
+          <p:nvSpPr>
+            <p:cNvPr id="27" name="TextBox 26">
+              <a:extLst>
+                <a:ext uri="{FF2B5EF4-FFF2-40B4-BE49-F238E27FC236}">
+                  <a16:creationId xmlns:a16="http://schemas.microsoft.com/office/drawing/2014/main" id="{5EEDB167-DAC4-55AA-8FC3-718FA75DA89E}"/>
+                </a:ext>
+              </a:extLst>
+            </p:cNvPr>
+            <p:cNvSpPr txBox="1"/>
+            <p:nvPr/>
+          </p:nvSpPr>
+          <p:spPr>
+            <a:xfrm>
+              <a:off x="5578006" y="6181681"/>
+              <a:ext cx="4786939" cy="369332"/>
+            </a:xfrm>
+            <a:prstGeom prst="rect">
+              <a:avLst/>
+            </a:prstGeom>
+            <a:noFill/>
+          </p:spPr>
+          <p:txBody>
+            <a:bodyPr wrap="square">
+              <a:spAutoFit/>
+            </a:bodyPr>
+            <a:lstStyle/>
+            <a:p>
+              <a:r>
+                <a:rPr lang="en-US" dirty="0"/>
+                <a:t>r = 0.12*</a:t>
+              </a:r>
+            </a:p>
+          </p:txBody>
+        </p:sp>
+      </p:grpSp>
+      <p:sp>
+        <p:nvSpPr>
+          <p:cNvPr id="29" name="TextBox 28">
+            <a:extLst>
+              <a:ext uri="{FF2B5EF4-FFF2-40B4-BE49-F238E27FC236}">
+                <a16:creationId xmlns:a16="http://schemas.microsoft.com/office/drawing/2014/main" id="{E63CA13A-B2EE-4D65-67E1-EC231675BE93}"/>
+              </a:ext>
+            </a:extLst>
+          </p:cNvPr>
+          <p:cNvSpPr txBox="1"/>
+          <p:nvPr/>
+        </p:nvSpPr>
+        <p:spPr>
+          <a:xfrm>
+            <a:off x="3048000" y="852407"/>
+            <a:ext cx="6096000" cy="369332"/>
+          </a:xfrm>
+          <a:prstGeom prst="rect">
+            <a:avLst/>
+          </a:prstGeom>
+          <a:noFill/>
+        </p:spPr>
+        <p:txBody>
+          <a:bodyPr wrap="square">
+            <a:spAutoFit/>
+          </a:bodyPr>
+          <a:lstStyle/>
+          <a:p>
+            <a:r>
+              <a:rPr lang="en-US" dirty="0"/>
+              <a:t>Study 1</a:t>
+            </a:r>
+          </a:p>
+        </p:txBody>
+      </p:sp>
+      <p:sp>
+        <p:nvSpPr>
+          <p:cNvPr id="30" name="TextBox 29">
+            <a:extLst>
+              <a:ext uri="{FF2B5EF4-FFF2-40B4-BE49-F238E27FC236}">
+                <a16:creationId xmlns:a16="http://schemas.microsoft.com/office/drawing/2014/main" id="{B8734B1A-3F1C-245D-18F0-5B7AC4407FCE}"/>
+              </a:ext>
+            </a:extLst>
+          </p:cNvPr>
+          <p:cNvSpPr txBox="1"/>
+          <p:nvPr/>
+        </p:nvSpPr>
+        <p:spPr>
+          <a:xfrm>
+            <a:off x="3048000" y="3872842"/>
+            <a:ext cx="6096000" cy="369332"/>
+          </a:xfrm>
+          <a:prstGeom prst="rect">
+            <a:avLst/>
+          </a:prstGeom>
+          <a:noFill/>
+        </p:spPr>
+        <p:txBody>
+          <a:bodyPr wrap="square">
+            <a:spAutoFit/>
+          </a:bodyPr>
+          <a:lstStyle/>
+          <a:p>
+            <a:r>
+              <a:rPr lang="en-US" dirty="0"/>
+              <a:t>Study 2</a:t>
+            </a:r>
+          </a:p>
+        </p:txBody>
+      </p:sp>
+    </p:spTree>
+    <p:extLst>
+      <p:ext uri="{BB962C8B-B14F-4D97-AF65-F5344CB8AC3E}">
+        <p14:creationId xmlns:p14="http://schemas.microsoft.com/office/powerpoint/2010/main" val="3900803046"/>
+      </p:ext>
+    </p:extLst>
+  </p:cSld>
+  <p:clrMapOvr>
+    <a:masterClrMapping/>
+  </p:clrMapOvr>
+</p:sld>
+</file>
+
 <file path=ppt/slides/slide5.xml><?xml version="1.0" encoding="utf-8"?>
 <p:sld xmlns:a="http://schemas.openxmlformats.org/drawingml/2006/main" xmlns:r="http://schemas.openxmlformats.org/officeDocument/2006/relationships" xmlns:p="http://schemas.openxmlformats.org/presentationml/2006/main">
   <p:cSld>
@@ -4791,19 +5192,19 @@
         </p:nvSpPr>
         <p:spPr>
           <a:xfrm>
-            <a:off x="440267" y="365125"/>
+            <a:off x="278423" y="0"/>
             <a:ext cx="10913533" cy="1325563"/>
           </a:xfrm>
         </p:spPr>
         <p:txBody>
           <a:bodyPr>
-            <a:normAutofit fontScale="90000"/>
+            <a:normAutofit/>
           </a:bodyPr>
           <a:lstStyle/>
           <a:p>
             <a:r>
               <a:rPr lang="en-US" sz="3600" dirty="0"/>
-              <a:t>All dimensions of ELA are positively associated with reports of absorption into music</a:t>
+              <a:t>Correlation matrices for ELA + music measures </a:t>
             </a:r>
             <a:br>
               <a:rPr lang="en-US" dirty="0"/>
@@ -4840,14 +5241,119 @@
         </p:blipFill>
         <p:spPr>
           <a:xfrm>
-            <a:off x="2876150" y="-330203"/>
-            <a:ext cx="7518406" cy="7518406"/>
+            <a:off x="0" y="235832"/>
+            <a:ext cx="6386336" cy="6386336"/>
           </a:xfrm>
           <a:prstGeom prst="rect">
             <a:avLst/>
           </a:prstGeom>
         </p:spPr>
       </p:pic>
+      <p:pic>
+        <p:nvPicPr>
+          <p:cNvPr id="3" name="Picture 2">
+            <a:extLst>
+              <a:ext uri="{FF2B5EF4-FFF2-40B4-BE49-F238E27FC236}">
+                <a16:creationId xmlns:a16="http://schemas.microsoft.com/office/drawing/2014/main" id="{F65447AE-7280-D081-6B18-506FA040E80A}"/>
+              </a:ext>
+            </a:extLst>
+          </p:cNvPr>
+          <p:cNvPicPr>
+            <a:picLocks noChangeAspect="1"/>
+          </p:cNvPicPr>
+          <p:nvPr/>
+        </p:nvPicPr>
+        <p:blipFill rotWithShape="1">
+          <a:blip r:embed="rId3">
+            <a:extLst>
+              <a:ext uri="{28A0092B-C50C-407E-A947-70E740481C1C}">
+                <a14:useLocalDpi xmlns:a14="http://schemas.microsoft.com/office/drawing/2010/main" val="0"/>
+              </a:ext>
+            </a:extLst>
+          </a:blip>
+          <a:srcRect t="16078" b="12960"/>
+          <a:stretch/>
+        </p:blipFill>
+        <p:spPr>
+          <a:xfrm>
+            <a:off x="6254659" y="1655766"/>
+            <a:ext cx="5808173" cy="4121579"/>
+          </a:xfrm>
+          <a:prstGeom prst="rect">
+            <a:avLst/>
+          </a:prstGeom>
+        </p:spPr>
+      </p:pic>
+      <p:sp>
+        <p:nvSpPr>
+          <p:cNvPr id="4" name="TextBox 3">
+            <a:extLst>
+              <a:ext uri="{FF2B5EF4-FFF2-40B4-BE49-F238E27FC236}">
+                <a16:creationId xmlns:a16="http://schemas.microsoft.com/office/drawing/2014/main" id="{AEF23771-B655-6CFB-A610-9A1ADDFC2EA6}"/>
+              </a:ext>
+            </a:extLst>
+          </p:cNvPr>
+          <p:cNvSpPr txBox="1"/>
+          <p:nvPr/>
+        </p:nvSpPr>
+        <p:spPr>
+          <a:xfrm>
+            <a:off x="1231900" y="1289193"/>
+            <a:ext cx="6096000" cy="369332"/>
+          </a:xfrm>
+          <a:prstGeom prst="rect">
+            <a:avLst/>
+          </a:prstGeom>
+          <a:noFill/>
+        </p:spPr>
+        <p:txBody>
+          <a:bodyPr wrap="square">
+            <a:spAutoFit/>
+          </a:bodyPr>
+          <a:lstStyle/>
+          <a:p>
+            <a:r>
+              <a:rPr lang="en-US" dirty="0"/>
+              <a:t>Study 1</a:t>
+            </a:r>
+          </a:p>
+        </p:txBody>
+      </p:sp>
+      <p:sp>
+        <p:nvSpPr>
+          <p:cNvPr id="5" name="TextBox 4">
+            <a:extLst>
+              <a:ext uri="{FF2B5EF4-FFF2-40B4-BE49-F238E27FC236}">
+                <a16:creationId xmlns:a16="http://schemas.microsoft.com/office/drawing/2014/main" id="{61FE3815-B385-0C92-F53A-18449DF5CE5D}"/>
+              </a:ext>
+            </a:extLst>
+          </p:cNvPr>
+          <p:cNvSpPr txBox="1"/>
+          <p:nvPr/>
+        </p:nvSpPr>
+        <p:spPr>
+          <a:xfrm>
+            <a:off x="7027984" y="1187197"/>
+            <a:ext cx="6096000" cy="369332"/>
+          </a:xfrm>
+          <a:prstGeom prst="rect">
+            <a:avLst/>
+          </a:prstGeom>
+          <a:noFill/>
+        </p:spPr>
+        <p:txBody>
+          <a:bodyPr wrap="square">
+            <a:spAutoFit/>
+          </a:bodyPr>
+          <a:lstStyle/>
+          <a:p>
+            <a:r>
+              <a:rPr lang="en-US" dirty="0"/>
+              <a:t>Study 2</a:t>
+            </a:r>
+          </a:p>
+        </p:txBody>
+      </p:sp>
     </p:spTree>
     <p:extLst>
       <p:ext uri="{BB962C8B-B14F-4D97-AF65-F5344CB8AC3E}">
@@ -4894,10 +5400,15 @@
             <p:ph type="title"/>
           </p:nvPr>
         </p:nvSpPr>
-        <p:spPr/>
+        <p:spPr>
+          <a:xfrm>
+            <a:off x="838200" y="112712"/>
+            <a:ext cx="10515600" cy="1325563"/>
+          </a:xfrm>
+        </p:spPr>
         <p:txBody>
           <a:bodyPr>
-            <a:normAutofit/>
+            <a:normAutofit fontScale="90000"/>
           </a:bodyPr>
           <a:lstStyle/>
           <a:p>
@@ -4907,18 +5418,88 @@
                   <a:srgbClr val="000000"/>
                 </a:solidFill>
               </a:rPr>
-              <a:t>Study 1: Absorption related to both healthy + unhealthy music usage, but more strongly associated with healthy music usage</a:t>
+              <a:t>Absorption related to both healthy + unhealthy music usage, but more strongly associated with healthy music usage across both studies</a:t>
             </a:r>
             <a:endParaRPr lang="en-US" sz="3200" dirty="0"/>
+          </a:p>
+        </p:txBody>
+      </p:sp>
+      <p:sp>
+        <p:nvSpPr>
+          <p:cNvPr id="5" name="TextBox 4">
+            <a:extLst>
+              <a:ext uri="{FF2B5EF4-FFF2-40B4-BE49-F238E27FC236}">
+                <a16:creationId xmlns:a16="http://schemas.microsoft.com/office/drawing/2014/main" id="{13FE3D4E-0931-E804-3E60-EFF529CA6E52}"/>
+              </a:ext>
+            </a:extLst>
+          </p:cNvPr>
+          <p:cNvSpPr txBox="1"/>
+          <p:nvPr/>
+        </p:nvSpPr>
+        <p:spPr>
+          <a:xfrm>
+            <a:off x="8140700" y="1253609"/>
+            <a:ext cx="6096000" cy="369332"/>
+          </a:xfrm>
+          <a:prstGeom prst="rect">
+            <a:avLst/>
+          </a:prstGeom>
+          <a:noFill/>
+        </p:spPr>
+        <p:txBody>
+          <a:bodyPr wrap="square">
+            <a:spAutoFit/>
+          </a:bodyPr>
+          <a:lstStyle/>
+          <a:p>
+            <a:r>
+              <a:rPr lang="en-US" dirty="0"/>
+              <a:t>Study 2</a:t>
+            </a:r>
+          </a:p>
+        </p:txBody>
+      </p:sp>
+      <p:sp>
+        <p:nvSpPr>
+          <p:cNvPr id="6" name="TextBox 5">
+            <a:extLst>
+              <a:ext uri="{FF2B5EF4-FFF2-40B4-BE49-F238E27FC236}">
+                <a16:creationId xmlns:a16="http://schemas.microsoft.com/office/drawing/2014/main" id="{EE28BA72-AC4A-8FBB-7785-1A43D75CF1F4}"/>
+              </a:ext>
+            </a:extLst>
+          </p:cNvPr>
+          <p:cNvSpPr txBox="1"/>
+          <p:nvPr/>
+        </p:nvSpPr>
+        <p:spPr>
+          <a:xfrm>
+            <a:off x="2374900" y="1253609"/>
+            <a:ext cx="6096000" cy="369332"/>
+          </a:xfrm>
+          <a:prstGeom prst="rect">
+            <a:avLst/>
+          </a:prstGeom>
+          <a:noFill/>
+        </p:spPr>
+        <p:txBody>
+          <a:bodyPr wrap="square">
+            <a:spAutoFit/>
+          </a:bodyPr>
+          <a:lstStyle/>
+          <a:p>
+            <a:r>
+              <a:rPr lang="en-US" dirty="0"/>
+              <a:t>Study 1</a:t>
+            </a:r>
           </a:p>
         </p:txBody>
       </p:sp>
       <p:pic>
         <p:nvPicPr>
-          <p:cNvPr id="12" name="Picture 11" descr="A graph of different colored lines&#10;&#10;Description automatically generated">
-            <a:extLst>
-              <a:ext uri="{FF2B5EF4-FFF2-40B4-BE49-F238E27FC236}">
-                <a16:creationId xmlns:a16="http://schemas.microsoft.com/office/drawing/2014/main" id="{D6917EA8-5D49-C9C9-8EBB-EA2659D6C4B7}"/>
+          <p:cNvPr id="7" name="Picture 6" descr="A graph of a music score&#10;&#10;Description automatically generated with medium confidence">
+            <a:extLst>
+              <a:ext uri="{FF2B5EF4-FFF2-40B4-BE49-F238E27FC236}">
+                <a16:creationId xmlns:a16="http://schemas.microsoft.com/office/drawing/2014/main" id="{993C3E30-517E-1589-0036-0F4D3EA06850}"/>
               </a:ext>
             </a:extLst>
           </p:cNvPr>
@@ -4935,8 +5516,96 @@
         </p:blipFill>
         <p:spPr>
           <a:xfrm>
-            <a:off x="2895600" y="1574800"/>
+            <a:off x="6212609" y="1690688"/>
             <a:ext cx="5054600" cy="5054600"/>
+          </a:xfrm>
+          <a:prstGeom prst="rect">
+            <a:avLst/>
+          </a:prstGeom>
+        </p:spPr>
+      </p:pic>
+      <p:pic>
+        <p:nvPicPr>
+          <p:cNvPr id="14" name="Picture 13" descr="A graph of music usage score&#10;&#10;Description automatically generated">
+            <a:extLst>
+              <a:ext uri="{FF2B5EF4-FFF2-40B4-BE49-F238E27FC236}">
+                <a16:creationId xmlns:a16="http://schemas.microsoft.com/office/drawing/2014/main" id="{C613D8B4-C6EB-18E4-3C68-80155E9E7E80}"/>
+              </a:ext>
+            </a:extLst>
+          </p:cNvPr>
+          <p:cNvPicPr>
+            <a:picLocks noChangeAspect="1"/>
+          </p:cNvPicPr>
+          <p:nvPr/>
+        </p:nvPicPr>
+        <p:blipFill>
+          <a:blip r:embed="rId4"/>
+          <a:stretch>
+            <a:fillRect/>
+          </a:stretch>
+        </p:blipFill>
+        <p:spPr>
+          <a:xfrm>
+            <a:off x="406399" y="1690688"/>
+            <a:ext cx="5054601" cy="5054601"/>
+          </a:xfrm>
+          <a:prstGeom prst="rect">
+            <a:avLst/>
+          </a:prstGeom>
+        </p:spPr>
+      </p:pic>
+      <p:pic>
+        <p:nvPicPr>
+          <p:cNvPr id="11" name="Picture 10" descr="A graph with text on it&#10;&#10;Description automatically generated">
+            <a:extLst>
+              <a:ext uri="{FF2B5EF4-FFF2-40B4-BE49-F238E27FC236}">
+                <a16:creationId xmlns:a16="http://schemas.microsoft.com/office/drawing/2014/main" id="{6303C63D-E044-B7FD-C26A-4683BC99CE6B}"/>
+              </a:ext>
+            </a:extLst>
+          </p:cNvPr>
+          <p:cNvPicPr>
+            <a:picLocks noChangeAspect="1"/>
+          </p:cNvPicPr>
+          <p:nvPr/>
+        </p:nvPicPr>
+        <p:blipFill rotWithShape="1">
+          <a:blip r:embed="rId5"/>
+          <a:srcRect l="31599" t="4957" r="46716" b="88628"/>
+          <a:stretch/>
+        </p:blipFill>
+        <p:spPr>
+          <a:xfrm>
+            <a:off x="2145144" y="2964873"/>
+            <a:ext cx="1006890" cy="297873"/>
+          </a:xfrm>
+          <a:prstGeom prst="rect">
+            <a:avLst/>
+          </a:prstGeom>
+        </p:spPr>
+      </p:pic>
+      <p:pic>
+        <p:nvPicPr>
+          <p:cNvPr id="15" name="Picture 14" descr="A graph with text on it&#10;&#10;Description automatically generated">
+            <a:extLst>
+              <a:ext uri="{FF2B5EF4-FFF2-40B4-BE49-F238E27FC236}">
+                <a16:creationId xmlns:a16="http://schemas.microsoft.com/office/drawing/2014/main" id="{46834C41-D32A-7A24-DE42-5A6B579E560E}"/>
+              </a:ext>
+            </a:extLst>
+          </p:cNvPr>
+          <p:cNvPicPr>
+            <a:picLocks noChangeAspect="1"/>
+          </p:cNvPicPr>
+          <p:nvPr/>
+        </p:nvPicPr>
+        <p:blipFill rotWithShape="1">
+          <a:blip r:embed="rId5"/>
+          <a:srcRect l="36769" t="82736" r="41124" b="6864"/>
+          <a:stretch/>
+        </p:blipFill>
+        <p:spPr>
+          <a:xfrm>
+            <a:off x="3408217" y="5167312"/>
+            <a:ext cx="1103659" cy="519196"/>
           </a:xfrm>
           <a:prstGeom prst="rect">
             <a:avLst/>
@@ -4978,7 +5647,7 @@
           <p:cNvPr id="2" name="Title 1">
             <a:extLst>
               <a:ext uri="{FF2B5EF4-FFF2-40B4-BE49-F238E27FC236}">
-                <a16:creationId xmlns:a16="http://schemas.microsoft.com/office/drawing/2014/main" id="{A3190345-97BC-7CC5-DC57-E4DB3EFC6265}"/>
+                <a16:creationId xmlns:a16="http://schemas.microsoft.com/office/drawing/2014/main" id="{1C0B92B0-B777-087E-FF15-B5A5D74CDAAF}"/>
               </a:ext>
             </a:extLst>
           </p:cNvPr>
@@ -4991,27 +5660,34 @@
         </p:nvSpPr>
         <p:spPr>
           <a:xfrm>
-            <a:off x="838200" y="0"/>
+            <a:off x="838200" y="144991"/>
             <a:ext cx="10515600" cy="1325563"/>
           </a:xfrm>
         </p:spPr>
         <p:txBody>
-          <a:bodyPr/>
-          <a:lstStyle/>
-          <a:p>
-            <a:r>
-              <a:rPr lang="en-US" dirty="0"/>
-              <a:t>Study 2 Conceptual Replication</a:t>
-            </a:r>
+          <a:bodyPr>
+            <a:normAutofit/>
+          </a:bodyPr>
+          <a:lstStyle/>
+          <a:p>
+            <a:r>
+              <a:rPr lang="en-US" sz="3200" dirty="0">
+                <a:solidFill>
+                  <a:srgbClr val="000000"/>
+                </a:solidFill>
+              </a:rPr>
+              <a:t>Absorption also positively related to resilience</a:t>
+            </a:r>
+            <a:endParaRPr lang="en-US" sz="3200" dirty="0"/>
           </a:p>
         </p:txBody>
       </p:sp>
       <p:pic>
         <p:nvPicPr>
-          <p:cNvPr id="12" name="Picture 11" descr="A graph of a music score&#10;&#10;Description automatically generated with medium confidence">
-            <a:extLst>
-              <a:ext uri="{FF2B5EF4-FFF2-40B4-BE49-F238E27FC236}">
-                <a16:creationId xmlns:a16="http://schemas.microsoft.com/office/drawing/2014/main" id="{3A252C55-C523-F653-E375-06ADDCBAF1FB}"/>
+          <p:cNvPr id="4" name="Picture 3">
+            <a:extLst>
+              <a:ext uri="{FF2B5EF4-FFF2-40B4-BE49-F238E27FC236}">
+                <a16:creationId xmlns:a16="http://schemas.microsoft.com/office/drawing/2014/main" id="{54849EC7-DE02-BDEC-6831-A657A05FEBC9}"/>
               </a:ext>
             </a:extLst>
           </p:cNvPr>
@@ -5021,25 +5697,66 @@
           <p:nvPr/>
         </p:nvPicPr>
         <p:blipFill>
-          <a:blip r:embed="rId2"/>
+          <a:blip r:embed="rId3">
+            <a:extLst>
+              <a:ext uri="{28A0092B-C50C-407E-A947-70E740481C1C}">
+                <a14:useLocalDpi xmlns:a14="http://schemas.microsoft.com/office/drawing/2010/main" val="0"/>
+              </a:ext>
+            </a:extLst>
+          </a:blip>
           <a:stretch>
             <a:fillRect/>
           </a:stretch>
         </p:blipFill>
         <p:spPr>
           <a:xfrm>
-            <a:off x="2933700" y="1325563"/>
-            <a:ext cx="5092700" cy="5092700"/>
+            <a:off x="140439" y="1894676"/>
+            <a:ext cx="4340352" cy="4340352"/>
           </a:xfrm>
           <a:prstGeom prst="rect">
             <a:avLst/>
           </a:prstGeom>
         </p:spPr>
       </p:pic>
+      <p:sp>
+        <p:nvSpPr>
+          <p:cNvPr id="3" name="TextBox 2">
+            <a:extLst>
+              <a:ext uri="{FF2B5EF4-FFF2-40B4-BE49-F238E27FC236}">
+                <a16:creationId xmlns:a16="http://schemas.microsoft.com/office/drawing/2014/main" id="{85EA9805-79A4-B1A6-AC97-03B2E117888E}"/>
+              </a:ext>
+            </a:extLst>
+          </p:cNvPr>
+          <p:cNvSpPr txBox="1"/>
+          <p:nvPr/>
+        </p:nvSpPr>
+        <p:spPr>
+          <a:xfrm>
+            <a:off x="2014681" y="1470554"/>
+            <a:ext cx="6096000" cy="369332"/>
+          </a:xfrm>
+          <a:prstGeom prst="rect">
+            <a:avLst/>
+          </a:prstGeom>
+          <a:noFill/>
+        </p:spPr>
+        <p:txBody>
+          <a:bodyPr wrap="square">
+            <a:spAutoFit/>
+          </a:bodyPr>
+          <a:lstStyle/>
+          <a:p>
+            <a:r>
+              <a:rPr lang="en-US" dirty="0"/>
+              <a:t>Study 1</a:t>
+            </a:r>
+          </a:p>
+        </p:txBody>
+      </p:sp>
     </p:spTree>
     <p:extLst>
       <p:ext uri="{BB962C8B-B14F-4D97-AF65-F5344CB8AC3E}">
-        <p14:creationId xmlns:p14="http://schemas.microsoft.com/office/powerpoint/2010/main" val="2008467378"/>
+        <p14:creationId xmlns:p14="http://schemas.microsoft.com/office/powerpoint/2010/main" val="885908273"/>
       </p:ext>
     </p:extLst>
   </p:cSld>
@@ -5071,7 +5788,7 @@
           <p:cNvPr id="2" name="Title 1">
             <a:extLst>
               <a:ext uri="{FF2B5EF4-FFF2-40B4-BE49-F238E27FC236}">
-                <a16:creationId xmlns:a16="http://schemas.microsoft.com/office/drawing/2014/main" id="{1C0B92B0-B777-087E-FF15-B5A5D74CDAAF}"/>
+                <a16:creationId xmlns:a16="http://schemas.microsoft.com/office/drawing/2014/main" id="{F17B7E66-9999-1D14-D0E7-3A0F39500B18}"/>
               </a:ext>
             </a:extLst>
           </p:cNvPr>
@@ -5082,12 +5799,7 @@
             <p:ph type="title"/>
           </p:nvPr>
         </p:nvSpPr>
-        <p:spPr>
-          <a:xfrm>
-            <a:off x="838200" y="144991"/>
-            <a:ext cx="10515600" cy="1325563"/>
-          </a:xfrm>
-        </p:spPr>
+        <p:spPr/>
         <p:txBody>
           <a:bodyPr>
             <a:normAutofit/>
@@ -5100,7 +5812,7 @@
                   <a:srgbClr val="000000"/>
                 </a:solidFill>
               </a:rPr>
-              <a:t>Absorption also positively related to resilience</a:t>
+              <a:t>Absorption into music associated with using music for escapism </a:t>
             </a:r>
             <a:endParaRPr lang="en-US" sz="3200" dirty="0"/>
           </a:p>
@@ -5111,7 +5823,7 @@
           <p:cNvPr id="4" name="Picture 3">
             <a:extLst>
               <a:ext uri="{FF2B5EF4-FFF2-40B4-BE49-F238E27FC236}">
-                <a16:creationId xmlns:a16="http://schemas.microsoft.com/office/drawing/2014/main" id="{54849EC7-DE02-BDEC-6831-A657A05FEBC9}"/>
+                <a16:creationId xmlns:a16="http://schemas.microsoft.com/office/drawing/2014/main" id="{9076CF1D-1B20-829C-75A0-0E4AE579B2CC}"/>
               </a:ext>
             </a:extLst>
           </p:cNvPr>
@@ -5121,7 +5833,7 @@
           <p:nvPr/>
         </p:nvPicPr>
         <p:blipFill>
-          <a:blip r:embed="rId2">
+          <a:blip r:embed="rId3">
             <a:extLst>
               <a:ext uri="{28A0092B-C50C-407E-A947-70E740481C1C}">
                 <a14:useLocalDpi xmlns:a14="http://schemas.microsoft.com/office/drawing/2010/main" val="0"/>
@@ -5134,8 +5846,8 @@
         </p:blipFill>
         <p:spPr>
           <a:xfrm>
-            <a:off x="3669792" y="1934159"/>
-            <a:ext cx="4340352" cy="4340352"/>
+            <a:off x="3355448" y="2161691"/>
+            <a:ext cx="5481104" cy="3836773"/>
           </a:xfrm>
           <a:prstGeom prst="rect">
             <a:avLst/>
@@ -5145,7 +5857,7 @@
     </p:spTree>
     <p:extLst>
       <p:ext uri="{BB962C8B-B14F-4D97-AF65-F5344CB8AC3E}">
-        <p14:creationId xmlns:p14="http://schemas.microsoft.com/office/powerpoint/2010/main" val="885908273"/>
+        <p14:creationId xmlns:p14="http://schemas.microsoft.com/office/powerpoint/2010/main" val="3956141494"/>
       </p:ext>
     </p:extLst>
   </p:cSld>
@@ -5177,7 +5889,7 @@
           <p:cNvPr id="2" name="Title 1">
             <a:extLst>
               <a:ext uri="{FF2B5EF4-FFF2-40B4-BE49-F238E27FC236}">
-                <a16:creationId xmlns:a16="http://schemas.microsoft.com/office/drawing/2014/main" id="{15E84D18-01E5-31EC-7C9A-668060D494A2}"/>
+                <a16:creationId xmlns:a16="http://schemas.microsoft.com/office/drawing/2014/main" id="{A075C297-C22E-60CC-8F6A-9C0AB8157215}"/>
               </a:ext>
             </a:extLst>
           </p:cNvPr>
@@ -5188,28 +5900,64 @@
             <p:ph type="title"/>
           </p:nvPr>
         </p:nvSpPr>
+        <p:spPr/>
+        <p:txBody>
+          <a:bodyPr>
+            <a:normAutofit/>
+          </a:bodyPr>
+          <a:lstStyle/>
+          <a:p>
+            <a:r>
+              <a:rPr lang="en-US" sz="3200" dirty="0">
+                <a:solidFill>
+                  <a:srgbClr val="000000"/>
+                </a:solidFill>
+              </a:rPr>
+              <a:t>Absorption mediates the relationship between CHAOS and resilience</a:t>
+            </a:r>
+            <a:endParaRPr lang="en-US" sz="3200" dirty="0"/>
+          </a:p>
+        </p:txBody>
+      </p:sp>
+      <p:pic>
+        <p:nvPicPr>
+          <p:cNvPr id="4" name="Picture 3">
+            <a:extLst>
+              <a:ext uri="{FF2B5EF4-FFF2-40B4-BE49-F238E27FC236}">
+                <a16:creationId xmlns:a16="http://schemas.microsoft.com/office/drawing/2014/main" id="{7608EBE1-D671-B28C-6D61-6737521F1EBE}"/>
+              </a:ext>
+            </a:extLst>
+          </p:cNvPr>
+          <p:cNvPicPr>
+            <a:picLocks noChangeAspect="1"/>
+          </p:cNvPicPr>
+          <p:nvPr/>
+        </p:nvPicPr>
+        <p:blipFill rotWithShape="1">
+          <a:blip r:embed="rId2">
+            <a:extLst>
+              <a:ext uri="{28A0092B-C50C-407E-A947-70E740481C1C}">
+                <a14:useLocalDpi xmlns:a14="http://schemas.microsoft.com/office/drawing/2010/main" val="0"/>
+              </a:ext>
+            </a:extLst>
+          </a:blip>
+          <a:srcRect t="7955" b="58712"/>
+          <a:stretch/>
+        </p:blipFill>
         <p:spPr>
           <a:xfrm>
-            <a:off x="838200" y="2766218"/>
-            <a:ext cx="10515600" cy="1325563"/>
+            <a:off x="3564075" y="2273000"/>
+            <a:ext cx="5063850" cy="4219875"/>
           </a:xfrm>
+          <a:prstGeom prst="rect">
+            <a:avLst/>
+          </a:prstGeom>
         </p:spPr>
-        <p:txBody>
-          <a:bodyPr/>
-          <a:lstStyle/>
-          <a:p>
-            <a:pPr algn="ctr"/>
-            <a:r>
-              <a:rPr lang="en-US" dirty="0"/>
-              <a:t>Study 2</a:t>
-            </a:r>
-          </a:p>
-        </p:txBody>
-      </p:sp>
+      </p:pic>
     </p:spTree>
     <p:extLst>
       <p:ext uri="{BB962C8B-B14F-4D97-AF65-F5344CB8AC3E}">
-        <p14:creationId xmlns:p14="http://schemas.microsoft.com/office/powerpoint/2010/main" val="3638951400"/>
+        <p14:creationId xmlns:p14="http://schemas.microsoft.com/office/powerpoint/2010/main" val="1933607349"/>
       </p:ext>
     </p:extLst>
   </p:cSld>

</xml_diff>